<commit_message>
Update to presentation for audit
</commit_message>
<xml_diff>
--- a/Documentation/CrowSoft Audit.pptx
+++ b/Documentation/CrowSoft Audit.pptx
@@ -119,7 +119,7 @@
   </p:defaultTextStyle>
   <p:extLst>
     <p:ext uri="{EFAFB233-063F-42B5-8137-9DF3F51BA10A}">
-      <p15:sldGuideLst xmlns="" xmlns:p15="http://schemas.microsoft.com/office/powerpoint/2012/main">
+      <p15:sldGuideLst xmlns:p15="http://schemas.microsoft.com/office/powerpoint/2012/main" xmlns="">
         <p15:guide id="1" orient="horz" pos="2160">
           <p15:clr>
             <a:srgbClr val="A4A3A4"/>
@@ -349,7 +349,7 @@
           <a:p>
             <a:fld id="{AC7D8286-6A45-451E-A956-25899882B2DA}" type="datetimeFigureOut">
               <a:rPr lang="en-US" smtClean="0"/>
-              <a:t>4/6/2019</a:t>
+              <a:t>4/7/2019</a:t>
             </a:fld>
             <a:endParaRPr lang="en-US"/>
           </a:p>
@@ -640,7 +640,7 @@
           <a:p>
             <a:fld id="{AC7D8286-6A45-451E-A956-25899882B2DA}" type="datetimeFigureOut">
               <a:rPr lang="en-US" smtClean="0"/>
-              <a:t>4/6/2019</a:t>
+              <a:t>4/7/2019</a:t>
             </a:fld>
             <a:endParaRPr lang="en-US"/>
           </a:p>
@@ -899,7 +899,7 @@
           <a:p>
             <a:fld id="{AC7D8286-6A45-451E-A956-25899882B2DA}" type="datetimeFigureOut">
               <a:rPr lang="en-US" smtClean="0"/>
-              <a:t>4/6/2019</a:t>
+              <a:t>4/7/2019</a:t>
             </a:fld>
             <a:endParaRPr lang="en-US"/>
           </a:p>
@@ -1368,7 +1368,7 @@
           <a:p>
             <a:fld id="{AC7D8286-6A45-451E-A956-25899882B2DA}" type="datetimeFigureOut">
               <a:rPr lang="en-US" smtClean="0"/>
-              <a:t>4/6/2019</a:t>
+              <a:t>4/7/2019</a:t>
             </a:fld>
             <a:endParaRPr lang="en-US"/>
           </a:p>
@@ -1548,7 +1548,7 @@
           <a:p>
             <a:fld id="{AC7D8286-6A45-451E-A956-25899882B2DA}" type="datetimeFigureOut">
               <a:rPr lang="en-US" smtClean="0"/>
-              <a:t>4/6/2019</a:t>
+              <a:t>4/7/2019</a:t>
             </a:fld>
             <a:endParaRPr lang="en-US"/>
           </a:p>
@@ -2124,7 +2124,7 @@
           <a:p>
             <a:fld id="{AC7D8286-6A45-451E-A956-25899882B2DA}" type="datetimeFigureOut">
               <a:rPr lang="en-US" smtClean="0"/>
-              <a:t>4/6/2019</a:t>
+              <a:t>4/7/2019</a:t>
             </a:fld>
             <a:endParaRPr lang="en-US"/>
           </a:p>
@@ -2456,7 +2456,7 @@
           <a:p>
             <a:fld id="{AC7D8286-6A45-451E-A956-25899882B2DA}" type="datetimeFigureOut">
               <a:rPr lang="en-US" smtClean="0"/>
-              <a:t>4/6/2019</a:t>
+              <a:t>4/7/2019</a:t>
             </a:fld>
             <a:endParaRPr lang="en-US"/>
           </a:p>
@@ -2631,7 +2631,7 @@
           <a:p>
             <a:fld id="{AC7D8286-6A45-451E-A956-25899882B2DA}" type="datetimeFigureOut">
               <a:rPr lang="en-US" smtClean="0"/>
-              <a:t>4/6/2019</a:t>
+              <a:t>4/7/2019</a:t>
             </a:fld>
             <a:endParaRPr lang="en-US"/>
           </a:p>
@@ -2811,7 +2811,7 @@
           <a:p>
             <a:fld id="{AC7D8286-6A45-451E-A956-25899882B2DA}" type="datetimeFigureOut">
               <a:rPr lang="en-US" smtClean="0"/>
-              <a:t>4/6/2019</a:t>
+              <a:t>4/7/2019</a:t>
             </a:fld>
             <a:endParaRPr lang="en-US"/>
           </a:p>
@@ -2981,7 +2981,7 @@
           <a:p>
             <a:fld id="{AC7D8286-6A45-451E-A956-25899882B2DA}" type="datetimeFigureOut">
               <a:rPr lang="en-US" smtClean="0"/>
-              <a:t>4/6/2019</a:t>
+              <a:t>4/7/2019</a:t>
             </a:fld>
             <a:endParaRPr lang="en-US"/>
           </a:p>
@@ -3238,7 +3238,7 @@
           <a:p>
             <a:fld id="{AC7D8286-6A45-451E-A956-25899882B2DA}" type="datetimeFigureOut">
               <a:rPr lang="en-US" smtClean="0"/>
-              <a:t>4/6/2019</a:t>
+              <a:t>4/7/2019</a:t>
             </a:fld>
             <a:endParaRPr lang="en-US"/>
           </a:p>
@@ -3530,7 +3530,7 @@
           <a:p>
             <a:fld id="{AC7D8286-6A45-451E-A956-25899882B2DA}" type="datetimeFigureOut">
               <a:rPr lang="en-US" smtClean="0"/>
-              <a:t>4/6/2019</a:t>
+              <a:t>4/7/2019</a:t>
             </a:fld>
             <a:endParaRPr lang="en-US"/>
           </a:p>
@@ -3960,7 +3960,7 @@
           <a:p>
             <a:fld id="{AC7D8286-6A45-451E-A956-25899882B2DA}" type="datetimeFigureOut">
               <a:rPr lang="en-US" smtClean="0"/>
-              <a:t>4/6/2019</a:t>
+              <a:t>4/7/2019</a:t>
             </a:fld>
             <a:endParaRPr lang="en-US"/>
           </a:p>
@@ -4078,7 +4078,7 @@
           <a:p>
             <a:fld id="{AC7D8286-6A45-451E-A956-25899882B2DA}" type="datetimeFigureOut">
               <a:rPr lang="en-US" smtClean="0"/>
-              <a:t>4/6/2019</a:t>
+              <a:t>4/7/2019</a:t>
             </a:fld>
             <a:endParaRPr lang="en-US"/>
           </a:p>
@@ -4173,7 +4173,7 @@
           <a:p>
             <a:fld id="{AC7D8286-6A45-451E-A956-25899882B2DA}" type="datetimeFigureOut">
               <a:rPr lang="en-US" smtClean="0"/>
-              <a:t>4/6/2019</a:t>
+              <a:t>4/7/2019</a:t>
             </a:fld>
             <a:endParaRPr lang="en-US"/>
           </a:p>
@@ -4456,7 +4456,7 @@
           <a:p>
             <a:fld id="{AC7D8286-6A45-451E-A956-25899882B2DA}" type="datetimeFigureOut">
               <a:rPr lang="en-US" smtClean="0"/>
-              <a:t>4/6/2019</a:t>
+              <a:t>4/7/2019</a:t>
             </a:fld>
             <a:endParaRPr lang="en-US"/>
           </a:p>
@@ -4747,7 +4747,7 @@
           <a:p>
             <a:fld id="{AC7D8286-6A45-451E-A956-25899882B2DA}" type="datetimeFigureOut">
               <a:rPr lang="en-US" smtClean="0"/>
-              <a:t>4/6/2019</a:t>
+              <a:t>4/7/2019</a:t>
             </a:fld>
             <a:endParaRPr lang="en-US"/>
           </a:p>
@@ -4978,7 +4978,7 @@
           <a:p>
             <a:fld id="{AC7D8286-6A45-451E-A956-25899882B2DA}" type="datetimeFigureOut">
               <a:rPr lang="en-US" smtClean="0"/>
-              <a:t>4/6/2019</a:t>
+              <a:t>4/7/2019</a:t>
             </a:fld>
             <a:endParaRPr lang="en-US"/>
           </a:p>
@@ -5752,7 +5752,7 @@
           <p:cNvPr id="2" name="Title 1">
             <a:extLst>
               <a:ext uri="{FF2B5EF4-FFF2-40B4-BE49-F238E27FC236}">
-                <a16:creationId xmlns="" xmlns:a16="http://schemas.microsoft.com/office/drawing/2014/main" id="{A97CC6BA-1822-42DF-B266-BD2E4F6E0AA7}"/>
+                <a16:creationId xmlns:a16="http://schemas.microsoft.com/office/drawing/2014/main" xmlns="" id="{A97CC6BA-1822-42DF-B266-BD2E4F6E0AA7}"/>
               </a:ext>
             </a:extLst>
           </p:cNvPr>
@@ -5806,7 +5806,7 @@
           <p:cNvPr id="3" name="Subtitle 2">
             <a:extLst>
               <a:ext uri="{FF2B5EF4-FFF2-40B4-BE49-F238E27FC236}">
-                <a16:creationId xmlns="" xmlns:a16="http://schemas.microsoft.com/office/drawing/2014/main" id="{61680A1D-38F1-411F-8AEA-01155C295C03}"/>
+                <a16:creationId xmlns:a16="http://schemas.microsoft.com/office/drawing/2014/main" xmlns="" id="{61680A1D-38F1-411F-8AEA-01155C295C03}"/>
               </a:ext>
             </a:extLst>
           </p:cNvPr>
@@ -6103,7 +6103,7 @@
           <p:cNvPr id="2" name="Title 1">
             <a:extLst>
               <a:ext uri="{FF2B5EF4-FFF2-40B4-BE49-F238E27FC236}">
-                <a16:creationId xmlns="" xmlns:a16="http://schemas.microsoft.com/office/drawing/2014/main" id="{D97765D5-3401-4A9A-A22D-1A26A1C1D8FC}"/>
+                <a16:creationId xmlns:a16="http://schemas.microsoft.com/office/drawing/2014/main" xmlns="" id="{D97765D5-3401-4A9A-A22D-1A26A1C1D8FC}"/>
               </a:ext>
             </a:extLst>
           </p:cNvPr>
@@ -6146,7 +6146,7 @@
           <p:cNvPr id="9" name="Picture 8">
             <a:extLst>
               <a:ext uri="{FF2B5EF4-FFF2-40B4-BE49-F238E27FC236}">
-                <a16:creationId xmlns="" xmlns:a16="http://schemas.microsoft.com/office/drawing/2014/main" id="{87C2624D-6B5C-40ED-A15A-6A1AFF8534F5}"/>
+                <a16:creationId xmlns:a16="http://schemas.microsoft.com/office/drawing/2014/main" xmlns="" id="{87C2624D-6B5C-40ED-A15A-6A1AFF8534F5}"/>
               </a:ext>
             </a:extLst>
           </p:cNvPr>
@@ -6304,7 +6304,12 @@
             <p:ph idx="1"/>
           </p:nvPr>
         </p:nvSpPr>
-        <p:spPr/>
+        <p:spPr>
+          <a:xfrm>
+            <a:off x="1141413" y="1228165"/>
+            <a:ext cx="9905998" cy="5145741"/>
+          </a:xfrm>
+        </p:spPr>
         <p:txBody>
           <a:bodyPr/>
           <a:lstStyle/>
@@ -6372,31 +6377,66 @@
           <a:p>
             <a:r>
               <a:rPr lang="en-IE" dirty="0" smtClean="0"/>
-              <a:t>SLA</a:t>
+              <a:t>Service Level Agreement</a:t>
             </a:r>
             <a:endParaRPr lang="en-IE" dirty="0"/>
           </a:p>
         </p:txBody>
       </p:sp>
-      <p:sp>
-        <p:nvSpPr>
-          <p:cNvPr id="3" name="Content Placeholder 2"/>
-          <p:cNvSpPr>
-            <a:spLocks noGrp="1"/>
-          </p:cNvSpPr>
+      <p:pic>
+        <p:nvPicPr>
+          <p:cNvPr id="1026" name="Picture 2"/>
+          <p:cNvPicPr>
+            <a:picLocks noGrp="1" noChangeAspect="1" noChangeArrowheads="1"/>
+          </p:cNvPicPr>
           <p:nvPr>
             <p:ph idx="1"/>
           </p:nvPr>
-        </p:nvSpPr>
-        <p:spPr/>
-        <p:txBody>
-          <a:bodyPr/>
-          <a:lstStyle/>
-          <a:p>
-            <a:endParaRPr lang="en-IE" dirty="0"/>
-          </a:p>
-        </p:txBody>
-      </p:sp>
+        </p:nvPicPr>
+        <p:blipFill>
+          <a:blip r:embed="rId2">
+            <a:extLst>
+              <a:ext uri="{28A0092B-C50C-407E-A947-70E740481C1C}">
+                <a14:useLocalDpi xmlns:a14="http://schemas.microsoft.com/office/drawing/2010/main" val="0"/>
+              </a:ext>
+            </a:extLst>
+          </a:blip>
+          <a:srcRect/>
+          <a:stretch>
+            <a:fillRect/>
+          </a:stretch>
+        </p:blipFill>
+        <p:spPr bwMode="auto">
+          <a:xfrm>
+            <a:off x="1290918" y="1389529"/>
+            <a:ext cx="9637058" cy="4858871"/>
+          </a:xfrm>
+          <a:prstGeom prst="rect">
+            <a:avLst/>
+          </a:prstGeom>
+          <a:noFill/>
+          <a:ln w="127000" cmpd="sng">
+            <a:solidFill>
+              <a:schemeClr val="bg1">
+                <a:lumMod val="50000"/>
+                <a:lumOff val="50000"/>
+              </a:schemeClr>
+            </a:solidFill>
+            <a:miter lim="800000"/>
+            <a:headEnd/>
+            <a:tailEnd/>
+          </a:ln>
+          <a:extLst>
+            <a:ext uri="{909E8E84-426E-40DD-AFC4-6F175D3DCCD1}">
+              <a14:hiddenFill xmlns:a14="http://schemas.microsoft.com/office/drawing/2010/main">
+                <a:solidFill>
+                  <a:schemeClr val="accent1"/>
+                </a:solidFill>
+              </a14:hiddenFill>
+            </a:ext>
+          </a:extLst>
+        </p:spPr>
+      </p:pic>
     </p:spTree>
     <p:extLst>
       <p:ext uri="{BB962C8B-B14F-4D97-AF65-F5344CB8AC3E}">
@@ -6469,7 +6509,7 @@
           <p:cNvPr id="2" name="Title 1">
             <a:extLst>
               <a:ext uri="{FF2B5EF4-FFF2-40B4-BE49-F238E27FC236}">
-                <a16:creationId xmlns="" xmlns:a16="http://schemas.microsoft.com/office/drawing/2014/main" id="{BB7DE4E6-DFB0-403A-A3D4-7A47423178D1}"/>
+                <a16:creationId xmlns:a16="http://schemas.microsoft.com/office/drawing/2014/main" xmlns="" id="{BB7DE4E6-DFB0-403A-A3D4-7A47423178D1}"/>
               </a:ext>
             </a:extLst>
           </p:cNvPr>
@@ -6525,7 +6565,7 @@
           <p:cNvPr id="3" name="Content Placeholder 2">
             <a:extLst>
               <a:ext uri="{FF2B5EF4-FFF2-40B4-BE49-F238E27FC236}">
-                <a16:creationId xmlns="" xmlns:a16="http://schemas.microsoft.com/office/drawing/2014/main" id="{1BAF3E77-EC7E-456C-BC8B-B4359E59B210}"/>
+                <a16:creationId xmlns:a16="http://schemas.microsoft.com/office/drawing/2014/main" xmlns="" id="{1BAF3E77-EC7E-456C-BC8B-B4359E59B210}"/>
               </a:ext>
             </a:extLst>
           </p:cNvPr>
@@ -6807,7 +6847,7 @@
           <p:cNvPr id="2" name="Title 1">
             <a:extLst>
               <a:ext uri="{FF2B5EF4-FFF2-40B4-BE49-F238E27FC236}">
-                <a16:creationId xmlns="" xmlns:a16="http://schemas.microsoft.com/office/drawing/2014/main" id="{060567F0-368C-4EE8-A1E0-EEF5756B5F55}"/>
+                <a16:creationId xmlns:a16="http://schemas.microsoft.com/office/drawing/2014/main" xmlns="" id="{060567F0-368C-4EE8-A1E0-EEF5756B5F55}"/>
               </a:ext>
             </a:extLst>
           </p:cNvPr>
@@ -6856,7 +6896,7 @@
           <p:cNvPr id="4" name="Rectangle: Rounded Corners 91">
             <a:extLst>
               <a:ext uri="{FF2B5EF4-FFF2-40B4-BE49-F238E27FC236}">
-                <a16:creationId xmlns="" xmlns:a16="http://schemas.microsoft.com/office/drawing/2014/main" id="{1D838972-D107-4FC0-86F6-111F21BB8F67}"/>
+                <a16:creationId xmlns:a16="http://schemas.microsoft.com/office/drawing/2014/main" xmlns="" id="{1D838972-D107-4FC0-86F6-111F21BB8F67}"/>
               </a:ext>
             </a:extLst>
           </p:cNvPr>
@@ -7021,7 +7061,7 @@
           <p:cNvPr id="5" name="Rectangle: Rounded Corners 92">
             <a:extLst>
               <a:ext uri="{FF2B5EF4-FFF2-40B4-BE49-F238E27FC236}">
-                <a16:creationId xmlns="" xmlns:a16="http://schemas.microsoft.com/office/drawing/2014/main" id="{3361B1F7-61DA-41EA-A158-80D47FBC601B}"/>
+                <a16:creationId xmlns:a16="http://schemas.microsoft.com/office/drawing/2014/main" xmlns="" id="{3361B1F7-61DA-41EA-A158-80D47FBC601B}"/>
               </a:ext>
             </a:extLst>
           </p:cNvPr>
@@ -7188,7 +7228,7 @@
           <p:cNvPr id="6" name="Picture 5" descr="Related image">
             <a:extLst>
               <a:ext uri="{FF2B5EF4-FFF2-40B4-BE49-F238E27FC236}">
-                <a16:creationId xmlns="" xmlns:a16="http://schemas.microsoft.com/office/drawing/2014/main" id="{8913D232-6DF1-48E3-A429-AE211CF7127D}"/>
+                <a16:creationId xmlns:a16="http://schemas.microsoft.com/office/drawing/2014/main" xmlns="" id="{8913D232-6DF1-48E3-A429-AE211CF7127D}"/>
               </a:ext>
             </a:extLst>
           </p:cNvPr>
@@ -7235,7 +7275,7 @@
           <p:cNvPr id="7" name="Rectangle: Rounded Corners 94">
             <a:extLst>
               <a:ext uri="{FF2B5EF4-FFF2-40B4-BE49-F238E27FC236}">
-                <a16:creationId xmlns="" xmlns:a16="http://schemas.microsoft.com/office/drawing/2014/main" id="{026577BB-D8B8-49E0-8B70-1B84A8B8C33B}"/>
+                <a16:creationId xmlns:a16="http://schemas.microsoft.com/office/drawing/2014/main" xmlns="" id="{026577BB-D8B8-49E0-8B70-1B84A8B8C33B}"/>
               </a:ext>
             </a:extLst>
           </p:cNvPr>
@@ -7400,7 +7440,7 @@
           <p:cNvPr id="8" name="Picture 7">
             <a:extLst>
               <a:ext uri="{FF2B5EF4-FFF2-40B4-BE49-F238E27FC236}">
-                <a16:creationId xmlns="" xmlns:a16="http://schemas.microsoft.com/office/drawing/2014/main" id="{5AC3D39C-1E7D-4D10-8B3F-7F6EB9B0ED46}"/>
+                <a16:creationId xmlns:a16="http://schemas.microsoft.com/office/drawing/2014/main" xmlns="" id="{5AC3D39C-1E7D-4D10-8B3F-7F6EB9B0ED46}"/>
               </a:ext>
             </a:extLst>
           </p:cNvPr>
@@ -7436,7 +7476,7 @@
           <p:cNvPr id="9" name="Rectangle: Rounded Corners 96">
             <a:extLst>
               <a:ext uri="{FF2B5EF4-FFF2-40B4-BE49-F238E27FC236}">
-                <a16:creationId xmlns="" xmlns:a16="http://schemas.microsoft.com/office/drawing/2014/main" id="{D5A10EA0-9538-4294-9A39-376087F91AA9}"/>
+                <a16:creationId xmlns:a16="http://schemas.microsoft.com/office/drawing/2014/main" xmlns="" id="{D5A10EA0-9538-4294-9A39-376087F91AA9}"/>
               </a:ext>
             </a:extLst>
           </p:cNvPr>
@@ -7601,7 +7641,7 @@
           <p:cNvPr id="10" name="Rectangle: Rounded Corners 97">
             <a:extLst>
               <a:ext uri="{FF2B5EF4-FFF2-40B4-BE49-F238E27FC236}">
-                <a16:creationId xmlns="" xmlns:a16="http://schemas.microsoft.com/office/drawing/2014/main" id="{F6E1CC74-9639-445F-9926-FC0AF8932A1A}"/>
+                <a16:creationId xmlns:a16="http://schemas.microsoft.com/office/drawing/2014/main" xmlns="" id="{F6E1CC74-9639-445F-9926-FC0AF8932A1A}"/>
               </a:ext>
             </a:extLst>
           </p:cNvPr>
@@ -7766,7 +7806,7 @@
           <p:cNvPr id="11" name="Picture 10">
             <a:extLst>
               <a:ext uri="{FF2B5EF4-FFF2-40B4-BE49-F238E27FC236}">
-                <a16:creationId xmlns="" xmlns:a16="http://schemas.microsoft.com/office/drawing/2014/main" id="{6A2D1D4E-E637-41B0-9A80-E88C62213FA5}"/>
+                <a16:creationId xmlns:a16="http://schemas.microsoft.com/office/drawing/2014/main" xmlns="" id="{6A2D1D4E-E637-41B0-9A80-E88C62213FA5}"/>
               </a:ext>
             </a:extLst>
           </p:cNvPr>
@@ -7802,7 +7842,7 @@
           <p:cNvPr id="12" name="Picture 11">
             <a:extLst>
               <a:ext uri="{FF2B5EF4-FFF2-40B4-BE49-F238E27FC236}">
-                <a16:creationId xmlns="" xmlns:a16="http://schemas.microsoft.com/office/drawing/2014/main" id="{7A664BF7-2BED-4529-AF18-7CD31084EDBC}"/>
+                <a16:creationId xmlns:a16="http://schemas.microsoft.com/office/drawing/2014/main" xmlns="" id="{7A664BF7-2BED-4529-AF18-7CD31084EDBC}"/>
               </a:ext>
             </a:extLst>
           </p:cNvPr>
@@ -7838,7 +7878,7 @@
           <p:cNvPr id="13" name="Picture 12" descr="Related image">
             <a:extLst>
               <a:ext uri="{FF2B5EF4-FFF2-40B4-BE49-F238E27FC236}">
-                <a16:creationId xmlns="" xmlns:a16="http://schemas.microsoft.com/office/drawing/2014/main" id="{D3474849-1B27-4378-8BAC-4A0E031BC269}"/>
+                <a16:creationId xmlns:a16="http://schemas.microsoft.com/office/drawing/2014/main" xmlns="" id="{D3474849-1B27-4378-8BAC-4A0E031BC269}"/>
               </a:ext>
             </a:extLst>
           </p:cNvPr>
@@ -7885,7 +7925,7 @@
           <p:cNvPr id="14" name="Picture 13">
             <a:extLst>
               <a:ext uri="{FF2B5EF4-FFF2-40B4-BE49-F238E27FC236}">
-                <a16:creationId xmlns="" xmlns:a16="http://schemas.microsoft.com/office/drawing/2014/main" id="{B94385D5-98B6-4AC7-B7CD-65B49EF4CA03}"/>
+                <a16:creationId xmlns:a16="http://schemas.microsoft.com/office/drawing/2014/main" xmlns="" id="{B94385D5-98B6-4AC7-B7CD-65B49EF4CA03}"/>
               </a:ext>
             </a:extLst>
           </p:cNvPr>
@@ -7921,7 +7961,7 @@
           <p:cNvPr id="15" name="Straight Connector 14">
             <a:extLst>
               <a:ext uri="{FF2B5EF4-FFF2-40B4-BE49-F238E27FC236}">
-                <a16:creationId xmlns="" xmlns:a16="http://schemas.microsoft.com/office/drawing/2014/main" id="{323884FB-A247-4387-9215-9A9E8470F2A0}"/>
+                <a16:creationId xmlns:a16="http://schemas.microsoft.com/office/drawing/2014/main" xmlns="" id="{323884FB-A247-4387-9215-9A9E8470F2A0}"/>
               </a:ext>
             </a:extLst>
           </p:cNvPr>
@@ -7960,7 +8000,7 @@
           <p:cNvPr id="16" name="Straight Connector 15">
             <a:extLst>
               <a:ext uri="{FF2B5EF4-FFF2-40B4-BE49-F238E27FC236}">
-                <a16:creationId xmlns="" xmlns:a16="http://schemas.microsoft.com/office/drawing/2014/main" id="{EDBCDB02-1877-48E1-8234-82F5C68048D2}"/>
+                <a16:creationId xmlns:a16="http://schemas.microsoft.com/office/drawing/2014/main" xmlns="" id="{EDBCDB02-1877-48E1-8234-82F5C68048D2}"/>
               </a:ext>
             </a:extLst>
           </p:cNvPr>
@@ -7999,7 +8039,7 @@
           <p:cNvPr id="17" name="Picture 16">
             <a:extLst>
               <a:ext uri="{FF2B5EF4-FFF2-40B4-BE49-F238E27FC236}">
-                <a16:creationId xmlns="" xmlns:a16="http://schemas.microsoft.com/office/drawing/2014/main" id="{E63422CD-2838-4A04-81ED-A278AEC41896}"/>
+                <a16:creationId xmlns:a16="http://schemas.microsoft.com/office/drawing/2014/main" xmlns="" id="{E63422CD-2838-4A04-81ED-A278AEC41896}"/>
               </a:ext>
             </a:extLst>
           </p:cNvPr>
@@ -8035,7 +8075,7 @@
           <p:cNvPr id="18" name="Straight Connector 17">
             <a:extLst>
               <a:ext uri="{FF2B5EF4-FFF2-40B4-BE49-F238E27FC236}">
-                <a16:creationId xmlns="" xmlns:a16="http://schemas.microsoft.com/office/drawing/2014/main" id="{33381917-C21F-4F2D-87AA-7E079E65AD3F}"/>
+                <a16:creationId xmlns:a16="http://schemas.microsoft.com/office/drawing/2014/main" xmlns="" id="{33381917-C21F-4F2D-87AA-7E079E65AD3F}"/>
               </a:ext>
             </a:extLst>
           </p:cNvPr>
@@ -8074,7 +8114,7 @@
           <p:cNvPr id="19" name="Rectangle: Rounded Corners 106">
             <a:extLst>
               <a:ext uri="{FF2B5EF4-FFF2-40B4-BE49-F238E27FC236}">
-                <a16:creationId xmlns="" xmlns:a16="http://schemas.microsoft.com/office/drawing/2014/main" id="{1A4C5F64-6070-4AA7-B3C8-B87CA784202B}"/>
+                <a16:creationId xmlns:a16="http://schemas.microsoft.com/office/drawing/2014/main" xmlns="" id="{1A4C5F64-6070-4AA7-B3C8-B87CA784202B}"/>
               </a:ext>
             </a:extLst>
           </p:cNvPr>
@@ -8240,7 +8280,7 @@
           <p:cNvPr id="20" name="Picture 19">
             <a:extLst>
               <a:ext uri="{FF2B5EF4-FFF2-40B4-BE49-F238E27FC236}">
-                <a16:creationId xmlns="" xmlns:a16="http://schemas.microsoft.com/office/drawing/2014/main" id="{72721FF6-1EE4-4E1C-AD01-BC2F7761B051}"/>
+                <a16:creationId xmlns:a16="http://schemas.microsoft.com/office/drawing/2014/main" xmlns="" id="{72721FF6-1EE4-4E1C-AD01-BC2F7761B051}"/>
               </a:ext>
             </a:extLst>
           </p:cNvPr>
@@ -8276,7 +8316,7 @@
           <p:cNvPr id="21" name="Rectangle: Rounded Corners 108">
             <a:extLst>
               <a:ext uri="{FF2B5EF4-FFF2-40B4-BE49-F238E27FC236}">
-                <a16:creationId xmlns="" xmlns:a16="http://schemas.microsoft.com/office/drawing/2014/main" id="{40DDAFC7-2343-4D18-84DB-27D82A318D14}"/>
+                <a16:creationId xmlns:a16="http://schemas.microsoft.com/office/drawing/2014/main" xmlns="" id="{40DDAFC7-2343-4D18-84DB-27D82A318D14}"/>
               </a:ext>
             </a:extLst>
           </p:cNvPr>
@@ -8448,7 +8488,7 @@
           <p:cNvPr id="22" name="Rectangle: Rounded Corners 109">
             <a:extLst>
               <a:ext uri="{FF2B5EF4-FFF2-40B4-BE49-F238E27FC236}">
-                <a16:creationId xmlns="" xmlns:a16="http://schemas.microsoft.com/office/drawing/2014/main" id="{46AFC2AF-CFE6-4A1C-A681-9C5F8CDC4E08}"/>
+                <a16:creationId xmlns:a16="http://schemas.microsoft.com/office/drawing/2014/main" xmlns="" id="{46AFC2AF-CFE6-4A1C-A681-9C5F8CDC4E08}"/>
               </a:ext>
             </a:extLst>
           </p:cNvPr>
@@ -8613,7 +8653,7 @@
           <p:cNvPr id="23" name="Straight Connector 22">
             <a:extLst>
               <a:ext uri="{FF2B5EF4-FFF2-40B4-BE49-F238E27FC236}">
-                <a16:creationId xmlns="" xmlns:a16="http://schemas.microsoft.com/office/drawing/2014/main" id="{F3E1E8B7-7631-4D72-A00F-E23044A1BE1F}"/>
+                <a16:creationId xmlns:a16="http://schemas.microsoft.com/office/drawing/2014/main" xmlns="" id="{F3E1E8B7-7631-4D72-A00F-E23044A1BE1F}"/>
               </a:ext>
             </a:extLst>
           </p:cNvPr>
@@ -8652,7 +8692,7 @@
           <p:cNvPr id="24" name="Straight Connector 23">
             <a:extLst>
               <a:ext uri="{FF2B5EF4-FFF2-40B4-BE49-F238E27FC236}">
-                <a16:creationId xmlns="" xmlns:a16="http://schemas.microsoft.com/office/drawing/2014/main" id="{F663B159-7BFE-4C43-8BAD-54538C2CE6DE}"/>
+                <a16:creationId xmlns:a16="http://schemas.microsoft.com/office/drawing/2014/main" xmlns="" id="{F663B159-7BFE-4C43-8BAD-54538C2CE6DE}"/>
               </a:ext>
             </a:extLst>
           </p:cNvPr>
@@ -8691,7 +8731,7 @@
           <p:cNvPr id="25" name="Straight Connector 24">
             <a:extLst>
               <a:ext uri="{FF2B5EF4-FFF2-40B4-BE49-F238E27FC236}">
-                <a16:creationId xmlns="" xmlns:a16="http://schemas.microsoft.com/office/drawing/2014/main" id="{AB4FE091-356B-4BA5-B45C-01D19290C22F}"/>
+                <a16:creationId xmlns:a16="http://schemas.microsoft.com/office/drawing/2014/main" xmlns="" id="{AB4FE091-356B-4BA5-B45C-01D19290C22F}"/>
               </a:ext>
             </a:extLst>
           </p:cNvPr>
@@ -8730,7 +8770,7 @@
           <p:cNvPr id="26" name="Straight Connector 25">
             <a:extLst>
               <a:ext uri="{FF2B5EF4-FFF2-40B4-BE49-F238E27FC236}">
-                <a16:creationId xmlns="" xmlns:a16="http://schemas.microsoft.com/office/drawing/2014/main" id="{609F955E-CFBC-4484-ADFC-62A6ADD6D07B}"/>
+                <a16:creationId xmlns:a16="http://schemas.microsoft.com/office/drawing/2014/main" xmlns="" id="{609F955E-CFBC-4484-ADFC-62A6ADD6D07B}"/>
               </a:ext>
             </a:extLst>
           </p:cNvPr>
@@ -8769,7 +8809,7 @@
           <p:cNvPr id="27" name="Straight Connector 26">
             <a:extLst>
               <a:ext uri="{FF2B5EF4-FFF2-40B4-BE49-F238E27FC236}">
-                <a16:creationId xmlns="" xmlns:a16="http://schemas.microsoft.com/office/drawing/2014/main" id="{FDEA3AF4-4A30-4B3D-B6B2-0102418C87C1}"/>
+                <a16:creationId xmlns:a16="http://schemas.microsoft.com/office/drawing/2014/main" xmlns="" id="{FDEA3AF4-4A30-4B3D-B6B2-0102418C87C1}"/>
               </a:ext>
             </a:extLst>
           </p:cNvPr>
@@ -8808,7 +8848,7 @@
           <p:cNvPr id="28" name="Straight Connector 27">
             <a:extLst>
               <a:ext uri="{FF2B5EF4-FFF2-40B4-BE49-F238E27FC236}">
-                <a16:creationId xmlns="" xmlns:a16="http://schemas.microsoft.com/office/drawing/2014/main" id="{2F22BA16-D3B7-4B43-AFCE-ACF8AAE6F2AB}"/>
+                <a16:creationId xmlns:a16="http://schemas.microsoft.com/office/drawing/2014/main" xmlns="" id="{2F22BA16-D3B7-4B43-AFCE-ACF8AAE6F2AB}"/>
               </a:ext>
             </a:extLst>
           </p:cNvPr>
@@ -8847,7 +8887,7 @@
           <p:cNvPr id="29" name="Picture 28" descr="Related image">
             <a:extLst>
               <a:ext uri="{FF2B5EF4-FFF2-40B4-BE49-F238E27FC236}">
-                <a16:creationId xmlns="" xmlns:a16="http://schemas.microsoft.com/office/drawing/2014/main" id="{401ACDE4-B7D9-4196-A8AD-4186CA769FD5}"/>
+                <a16:creationId xmlns:a16="http://schemas.microsoft.com/office/drawing/2014/main" xmlns="" id="{401ACDE4-B7D9-4196-A8AD-4186CA769FD5}"/>
               </a:ext>
             </a:extLst>
           </p:cNvPr>
@@ -8879,7 +8919,7 @@
           <p:cNvPr id="30" name="Picture 29" descr="Image result for slack icon">
             <a:extLst>
               <a:ext uri="{FF2B5EF4-FFF2-40B4-BE49-F238E27FC236}">
-                <a16:creationId xmlns="" xmlns:a16="http://schemas.microsoft.com/office/drawing/2014/main" id="{3B4F4157-5C39-468E-B4EB-4D9FFA4C75D1}"/>
+                <a16:creationId xmlns:a16="http://schemas.microsoft.com/office/drawing/2014/main" xmlns="" id="{3B4F4157-5C39-468E-B4EB-4D9FFA4C75D1}"/>
               </a:ext>
             </a:extLst>
           </p:cNvPr>
@@ -8911,7 +8951,7 @@
           <p:cNvPr id="31" name="Picture 30" descr="Image result for Zoom.us icon">
             <a:extLst>
               <a:ext uri="{FF2B5EF4-FFF2-40B4-BE49-F238E27FC236}">
-                <a16:creationId xmlns="" xmlns:a16="http://schemas.microsoft.com/office/drawing/2014/main" id="{2F2E3B5D-CE69-4ADA-A498-65222952DD56}"/>
+                <a16:creationId xmlns:a16="http://schemas.microsoft.com/office/drawing/2014/main" xmlns="" id="{2F2E3B5D-CE69-4ADA-A498-65222952DD56}"/>
               </a:ext>
             </a:extLst>
           </p:cNvPr>
@@ -8943,7 +8983,7 @@
           <p:cNvPr id="32" name="Picture 31">
             <a:extLst>
               <a:ext uri="{FF2B5EF4-FFF2-40B4-BE49-F238E27FC236}">
-                <a16:creationId xmlns="" xmlns:a16="http://schemas.microsoft.com/office/drawing/2014/main" id="{A272410F-9916-48B3-AAB7-2F12300A37B1}"/>
+                <a16:creationId xmlns:a16="http://schemas.microsoft.com/office/drawing/2014/main" xmlns="" id="{A272410F-9916-48B3-AAB7-2F12300A37B1}"/>
               </a:ext>
             </a:extLst>
           </p:cNvPr>
@@ -8982,7 +9022,7 @@
           <p:cNvPr id="33" name="TextBox 60">
             <a:extLst>
               <a:ext uri="{FF2B5EF4-FFF2-40B4-BE49-F238E27FC236}">
-                <a16:creationId xmlns="" xmlns:a16="http://schemas.microsoft.com/office/drawing/2014/main" id="{E61ACCCE-3C6E-46EB-B66E-50745C51DE4A}"/>
+                <a16:creationId xmlns:a16="http://schemas.microsoft.com/office/drawing/2014/main" xmlns="" id="{E61ACCCE-3C6E-46EB-B66E-50745C51DE4A}"/>
               </a:ext>
             </a:extLst>
           </p:cNvPr>
@@ -9191,7 +9231,7 @@
           <p:cNvPr id="34" name="Picture 33" descr="Related image">
             <a:extLst>
               <a:ext uri="{FF2B5EF4-FFF2-40B4-BE49-F238E27FC236}">
-                <a16:creationId xmlns="" xmlns:a16="http://schemas.microsoft.com/office/drawing/2014/main" id="{008D268E-D1DB-43FB-9F12-C5E2CCA12318}"/>
+                <a16:creationId xmlns:a16="http://schemas.microsoft.com/office/drawing/2014/main" xmlns="" id="{008D268E-D1DB-43FB-9F12-C5E2CCA12318}"/>
               </a:ext>
             </a:extLst>
           </p:cNvPr>
@@ -9223,7 +9263,7 @@
           <p:cNvPr id="35" name="Picture 34" descr="Related image">
             <a:extLst>
               <a:ext uri="{FF2B5EF4-FFF2-40B4-BE49-F238E27FC236}">
-                <a16:creationId xmlns="" xmlns:a16="http://schemas.microsoft.com/office/drawing/2014/main" id="{4861B1E8-4350-452C-B15F-DCAF10295865}"/>
+                <a16:creationId xmlns:a16="http://schemas.microsoft.com/office/drawing/2014/main" xmlns="" id="{4861B1E8-4350-452C-B15F-DCAF10295865}"/>
               </a:ext>
             </a:extLst>
           </p:cNvPr>
@@ -9255,7 +9295,7 @@
           <p:cNvPr id="36" name="Picture 35" descr="Related image">
             <a:extLst>
               <a:ext uri="{FF2B5EF4-FFF2-40B4-BE49-F238E27FC236}">
-                <a16:creationId xmlns="" xmlns:a16="http://schemas.microsoft.com/office/drawing/2014/main" id="{5019FCB9-A345-42F5-9602-81AE2CA39175}"/>
+                <a16:creationId xmlns:a16="http://schemas.microsoft.com/office/drawing/2014/main" xmlns="" id="{5019FCB9-A345-42F5-9602-81AE2CA39175}"/>
               </a:ext>
             </a:extLst>
           </p:cNvPr>
@@ -9287,7 +9327,7 @@
           <p:cNvPr id="38" name="Picture 37" descr="Image result for monit icon images">
             <a:extLst>
               <a:ext uri="{FF2B5EF4-FFF2-40B4-BE49-F238E27FC236}">
-                <a16:creationId xmlns="" xmlns:a16="http://schemas.microsoft.com/office/drawing/2014/main" id="{AAFFF1A1-64CD-49A6-8815-15B8508ADC74}"/>
+                <a16:creationId xmlns:a16="http://schemas.microsoft.com/office/drawing/2014/main" xmlns="" id="{AAFFF1A1-64CD-49A6-8815-15B8508ADC74}"/>
               </a:ext>
             </a:extLst>
           </p:cNvPr>
@@ -9465,7 +9505,7 @@
           <p:cNvPr id="2" name="Title 1">
             <a:extLst>
               <a:ext uri="{FF2B5EF4-FFF2-40B4-BE49-F238E27FC236}">
-                <a16:creationId xmlns="" xmlns:a16="http://schemas.microsoft.com/office/drawing/2014/main" id="{D2213D03-BB56-4285-96A8-A7901DD60035}"/>
+                <a16:creationId xmlns:a16="http://schemas.microsoft.com/office/drawing/2014/main" xmlns="" id="{D2213D03-BB56-4285-96A8-A7901DD60035}"/>
               </a:ext>
             </a:extLst>
           </p:cNvPr>
@@ -9506,7 +9546,7 @@
           <p:cNvPr id="4" name="Content Placeholder 3">
             <a:extLst>
               <a:ext uri="{FF2B5EF4-FFF2-40B4-BE49-F238E27FC236}">
-                <a16:creationId xmlns="" xmlns:a16="http://schemas.microsoft.com/office/drawing/2014/main" id="{88EACB63-DCE3-4A41-A128-3B53822C87AD}"/>
+                <a16:creationId xmlns:a16="http://schemas.microsoft.com/office/drawing/2014/main" xmlns="" id="{88EACB63-DCE3-4A41-A128-3B53822C87AD}"/>
               </a:ext>
             </a:extLst>
           </p:cNvPr>
@@ -9610,7 +9650,7 @@
           <p:cNvPr id="7" name="Picture 6">
             <a:extLst>
               <a:ext uri="{FF2B5EF4-FFF2-40B4-BE49-F238E27FC236}">
-                <a16:creationId xmlns="" xmlns:a16="http://schemas.microsoft.com/office/drawing/2014/main" id="{B94385D5-98B6-4AC7-B7CD-65B49EF4CA03}"/>
+                <a16:creationId xmlns:a16="http://schemas.microsoft.com/office/drawing/2014/main" xmlns="" id="{B94385D5-98B6-4AC7-B7CD-65B49EF4CA03}"/>
               </a:ext>
             </a:extLst>
           </p:cNvPr>
@@ -10505,7 +10545,7 @@
           <p:cNvPr id="2" name="Title 1">
             <a:extLst>
               <a:ext uri="{FF2B5EF4-FFF2-40B4-BE49-F238E27FC236}">
-                <a16:creationId xmlns="" xmlns:a16="http://schemas.microsoft.com/office/drawing/2014/main" id="{F80389EE-9E58-48FF-89C5-3FBADBA31B30}"/>
+                <a16:creationId xmlns:a16="http://schemas.microsoft.com/office/drawing/2014/main" xmlns="" id="{F80389EE-9E58-48FF-89C5-3FBADBA31B30}"/>
               </a:ext>
             </a:extLst>
           </p:cNvPr>
@@ -11259,7 +11299,7 @@
           <p:cNvPr id="2" name="Title 1">
             <a:extLst>
               <a:ext uri="{FF2B5EF4-FFF2-40B4-BE49-F238E27FC236}">
-                <a16:creationId xmlns="" xmlns:a16="http://schemas.microsoft.com/office/drawing/2014/main" id="{7D9F7F4A-86AD-47F3-BFAB-E016FC5547ED}"/>
+                <a16:creationId xmlns:a16="http://schemas.microsoft.com/office/drawing/2014/main" xmlns="" id="{7D9F7F4A-86AD-47F3-BFAB-E016FC5547ED}"/>
               </a:ext>
             </a:extLst>
           </p:cNvPr>
@@ -11295,7 +11335,7 @@
           <p:cNvPr id="3" name="Content Placeholder 2">
             <a:extLst>
               <a:ext uri="{FF2B5EF4-FFF2-40B4-BE49-F238E27FC236}">
-                <a16:creationId xmlns="" xmlns:a16="http://schemas.microsoft.com/office/drawing/2014/main" id="{4B67892F-7F4B-4080-AB9E-8D9B3675FD68}"/>
+                <a16:creationId xmlns:a16="http://schemas.microsoft.com/office/drawing/2014/main" xmlns="" id="{4B67892F-7F4B-4080-AB9E-8D9B3675FD68}"/>
               </a:ext>
             </a:extLst>
           </p:cNvPr>
@@ -11422,7 +11462,7 @@
           <p:cNvPr id="7" name="Title 1">
             <a:extLst>
               <a:ext uri="{FF2B5EF4-FFF2-40B4-BE49-F238E27FC236}">
-                <a16:creationId xmlns="" xmlns:a16="http://schemas.microsoft.com/office/drawing/2014/main" id="{7D9F7F4A-86AD-47F3-BFAB-E016FC5547ED}"/>
+                <a16:creationId xmlns:a16="http://schemas.microsoft.com/office/drawing/2014/main" xmlns="" id="{7D9F7F4A-86AD-47F3-BFAB-E016FC5547ED}"/>
               </a:ext>
             </a:extLst>
           </p:cNvPr>
@@ -11825,7 +11865,7 @@
   <a:extraClrSchemeLst/>
   <a:extLst>
     <a:ext uri="{05A4C25C-085E-4340-85A3-A5531E510DB2}">
-      <thm15:themeFamily xmlns="" xmlns:thm15="http://schemas.microsoft.com/office/thememl/2012/main" name="Mesh" id="{789EC3FE-34FD-429C-9918-760025E6C145}" vid="{B8BE45C0-8141-4D58-8C71-A009BC26FBBB}"/>
+      <thm15:themeFamily xmlns:thm15="http://schemas.microsoft.com/office/thememl/2012/main" xmlns="" name="Mesh" id="{789EC3FE-34FD-429C-9918-760025E6C145}" vid="{B8BE45C0-8141-4D58-8C71-A009BC26FBBB}"/>
     </a:ext>
   </a:extLst>
 </a:theme>

</xml_diff>

<commit_message>
Please review document @ ALL
</commit_message>
<xml_diff>
--- a/Documentation/CrowSoft Audit.pptx
+++ b/Documentation/CrowSoft Audit.pptx
@@ -16,9 +16,11 @@
     <p:sldId id="260" r:id="rId10"/>
     <p:sldId id="270" r:id="rId11"/>
     <p:sldId id="261" r:id="rId12"/>
-    <p:sldId id="264" r:id="rId13"/>
-    <p:sldId id="268" r:id="rId14"/>
-    <p:sldId id="265" r:id="rId15"/>
+    <p:sldId id="271" r:id="rId13"/>
+    <p:sldId id="264" r:id="rId14"/>
+    <p:sldId id="268" r:id="rId15"/>
+    <p:sldId id="272" r:id="rId16"/>
+    <p:sldId id="265" r:id="rId17"/>
   </p:sldIdLst>
   <p:sldSz cx="12192000" cy="6858000"/>
   <p:notesSz cx="6858000" cy="9144000"/>
@@ -119,7 +121,7 @@
   </p:defaultTextStyle>
   <p:extLst>
     <p:ext uri="{EFAFB233-063F-42B5-8137-9DF3F51BA10A}">
-      <p15:sldGuideLst xmlns:p15="http://schemas.microsoft.com/office/powerpoint/2012/main" xmlns="">
+      <p15:sldGuideLst xmlns:p15="http://schemas.microsoft.com/office/powerpoint/2012/main">
         <p15:guide id="1" orient="horz" pos="2160">
           <p15:clr>
             <a:srgbClr val="A4A3A4"/>
@@ -349,7 +351,7 @@
           <a:p>
             <a:fld id="{AC7D8286-6A45-451E-A956-25899882B2DA}" type="datetimeFigureOut">
               <a:rPr lang="en-US" smtClean="0"/>
-              <a:t>4/7/2019</a:t>
+              <a:t>4/8/2019</a:t>
             </a:fld>
             <a:endParaRPr lang="en-US"/>
           </a:p>
@@ -640,7 +642,7 @@
           <a:p>
             <a:fld id="{AC7D8286-6A45-451E-A956-25899882B2DA}" type="datetimeFigureOut">
               <a:rPr lang="en-US" smtClean="0"/>
-              <a:t>4/7/2019</a:t>
+              <a:t>4/8/2019</a:t>
             </a:fld>
             <a:endParaRPr lang="en-US"/>
           </a:p>
@@ -899,7 +901,7 @@
           <a:p>
             <a:fld id="{AC7D8286-6A45-451E-A956-25899882B2DA}" type="datetimeFigureOut">
               <a:rPr lang="en-US" smtClean="0"/>
-              <a:t>4/7/2019</a:t>
+              <a:t>4/8/2019</a:t>
             </a:fld>
             <a:endParaRPr lang="en-US"/>
           </a:p>
@@ -1368,7 +1370,7 @@
           <a:p>
             <a:fld id="{AC7D8286-6A45-451E-A956-25899882B2DA}" type="datetimeFigureOut">
               <a:rPr lang="en-US" smtClean="0"/>
-              <a:t>4/7/2019</a:t>
+              <a:t>4/8/2019</a:t>
             </a:fld>
             <a:endParaRPr lang="en-US"/>
           </a:p>
@@ -1548,7 +1550,7 @@
           <a:p>
             <a:fld id="{AC7D8286-6A45-451E-A956-25899882B2DA}" type="datetimeFigureOut">
               <a:rPr lang="en-US" smtClean="0"/>
-              <a:t>4/7/2019</a:t>
+              <a:t>4/8/2019</a:t>
             </a:fld>
             <a:endParaRPr lang="en-US"/>
           </a:p>
@@ -2124,7 +2126,7 @@
           <a:p>
             <a:fld id="{AC7D8286-6A45-451E-A956-25899882B2DA}" type="datetimeFigureOut">
               <a:rPr lang="en-US" smtClean="0"/>
-              <a:t>4/7/2019</a:t>
+              <a:t>4/8/2019</a:t>
             </a:fld>
             <a:endParaRPr lang="en-US"/>
           </a:p>
@@ -2456,7 +2458,7 @@
           <a:p>
             <a:fld id="{AC7D8286-6A45-451E-A956-25899882B2DA}" type="datetimeFigureOut">
               <a:rPr lang="en-US" smtClean="0"/>
-              <a:t>4/7/2019</a:t>
+              <a:t>4/8/2019</a:t>
             </a:fld>
             <a:endParaRPr lang="en-US"/>
           </a:p>
@@ -2631,7 +2633,7 @@
           <a:p>
             <a:fld id="{AC7D8286-6A45-451E-A956-25899882B2DA}" type="datetimeFigureOut">
               <a:rPr lang="en-US" smtClean="0"/>
-              <a:t>4/7/2019</a:t>
+              <a:t>4/8/2019</a:t>
             </a:fld>
             <a:endParaRPr lang="en-US"/>
           </a:p>
@@ -2811,7 +2813,7 @@
           <a:p>
             <a:fld id="{AC7D8286-6A45-451E-A956-25899882B2DA}" type="datetimeFigureOut">
               <a:rPr lang="en-US" smtClean="0"/>
-              <a:t>4/7/2019</a:t>
+              <a:t>4/8/2019</a:t>
             </a:fld>
             <a:endParaRPr lang="en-US"/>
           </a:p>
@@ -2981,7 +2983,7 @@
           <a:p>
             <a:fld id="{AC7D8286-6A45-451E-A956-25899882B2DA}" type="datetimeFigureOut">
               <a:rPr lang="en-US" smtClean="0"/>
-              <a:t>4/7/2019</a:t>
+              <a:t>4/8/2019</a:t>
             </a:fld>
             <a:endParaRPr lang="en-US"/>
           </a:p>
@@ -3238,7 +3240,7 @@
           <a:p>
             <a:fld id="{AC7D8286-6A45-451E-A956-25899882B2DA}" type="datetimeFigureOut">
               <a:rPr lang="en-US" smtClean="0"/>
-              <a:t>4/7/2019</a:t>
+              <a:t>4/8/2019</a:t>
             </a:fld>
             <a:endParaRPr lang="en-US"/>
           </a:p>
@@ -3530,7 +3532,7 @@
           <a:p>
             <a:fld id="{AC7D8286-6A45-451E-A956-25899882B2DA}" type="datetimeFigureOut">
               <a:rPr lang="en-US" smtClean="0"/>
-              <a:t>4/7/2019</a:t>
+              <a:t>4/8/2019</a:t>
             </a:fld>
             <a:endParaRPr lang="en-US"/>
           </a:p>
@@ -3960,7 +3962,7 @@
           <a:p>
             <a:fld id="{AC7D8286-6A45-451E-A956-25899882B2DA}" type="datetimeFigureOut">
               <a:rPr lang="en-US" smtClean="0"/>
-              <a:t>4/7/2019</a:t>
+              <a:t>4/8/2019</a:t>
             </a:fld>
             <a:endParaRPr lang="en-US"/>
           </a:p>
@@ -4078,7 +4080,7 @@
           <a:p>
             <a:fld id="{AC7D8286-6A45-451E-A956-25899882B2DA}" type="datetimeFigureOut">
               <a:rPr lang="en-US" smtClean="0"/>
-              <a:t>4/7/2019</a:t>
+              <a:t>4/8/2019</a:t>
             </a:fld>
             <a:endParaRPr lang="en-US"/>
           </a:p>
@@ -4173,7 +4175,7 @@
           <a:p>
             <a:fld id="{AC7D8286-6A45-451E-A956-25899882B2DA}" type="datetimeFigureOut">
               <a:rPr lang="en-US" smtClean="0"/>
-              <a:t>4/7/2019</a:t>
+              <a:t>4/8/2019</a:t>
             </a:fld>
             <a:endParaRPr lang="en-US"/>
           </a:p>
@@ -4456,7 +4458,7 @@
           <a:p>
             <a:fld id="{AC7D8286-6A45-451E-A956-25899882B2DA}" type="datetimeFigureOut">
               <a:rPr lang="en-US" smtClean="0"/>
-              <a:t>4/7/2019</a:t>
+              <a:t>4/8/2019</a:t>
             </a:fld>
             <a:endParaRPr lang="en-US"/>
           </a:p>
@@ -4747,7 +4749,7 @@
           <a:p>
             <a:fld id="{AC7D8286-6A45-451E-A956-25899882B2DA}" type="datetimeFigureOut">
               <a:rPr lang="en-US" smtClean="0"/>
-              <a:t>4/7/2019</a:t>
+              <a:t>4/8/2019</a:t>
             </a:fld>
             <a:endParaRPr lang="en-US"/>
           </a:p>
@@ -4978,7 +4980,7 @@
           <a:p>
             <a:fld id="{AC7D8286-6A45-451E-A956-25899882B2DA}" type="datetimeFigureOut">
               <a:rPr lang="en-US" smtClean="0"/>
-              <a:t>4/7/2019</a:t>
+              <a:t>4/8/2019</a:t>
             </a:fld>
             <a:endParaRPr lang="en-US"/>
           </a:p>
@@ -5752,7 +5754,7 @@
           <p:cNvPr id="2" name="Title 1">
             <a:extLst>
               <a:ext uri="{FF2B5EF4-FFF2-40B4-BE49-F238E27FC236}">
-                <a16:creationId xmlns:a16="http://schemas.microsoft.com/office/drawing/2014/main" xmlns="" id="{A97CC6BA-1822-42DF-B266-BD2E4F6E0AA7}"/>
+                <a16:creationId xmlns:a16="http://schemas.microsoft.com/office/drawing/2014/main" id="{A97CC6BA-1822-42DF-B266-BD2E4F6E0AA7}"/>
               </a:ext>
             </a:extLst>
           </p:cNvPr>
@@ -5781,12 +5783,6 @@
               </a:rPr>
               <a:t>CrowSoft</a:t>
             </a:r>
-            <a:r>
-              <a:rPr lang="en-US" cap="none" dirty="0">
-                <a:latin typeface="Centaur" panose="02030504050205020304" pitchFamily="18" charset="0"/>
-              </a:rPr>
-              <a:t/>
-            </a:r>
             <a:br>
               <a:rPr lang="en-US" cap="none" dirty="0">
                 <a:latin typeface="Centaur" panose="02030504050205020304" pitchFamily="18" charset="0"/>
@@ -5806,7 +5802,7 @@
           <p:cNvPr id="3" name="Subtitle 2">
             <a:extLst>
               <a:ext uri="{FF2B5EF4-FFF2-40B4-BE49-F238E27FC236}">
-                <a16:creationId xmlns:a16="http://schemas.microsoft.com/office/drawing/2014/main" xmlns="" id="{61680A1D-38F1-411F-8AEA-01155C295C03}"/>
+                <a16:creationId xmlns:a16="http://schemas.microsoft.com/office/drawing/2014/main" id="{61680A1D-38F1-411F-8AEA-01155C295C03}"/>
               </a:ext>
             </a:extLst>
           </p:cNvPr>
@@ -5831,16 +5827,12 @@
           <a:p>
             <a:r>
               <a:rPr lang="en-US" sz="2600" b="1" dirty="0"/>
-              <a:t>Ruth </a:t>
-            </a:r>
-            <a:r>
-              <a:rPr lang="en-US" sz="2600" b="1" dirty="0" smtClean="0"/>
-              <a:t>Lennon P.O.</a:t>
-            </a:r>
-          </a:p>
-          <a:p>
-            <a:r>
-              <a:rPr lang="en-US" dirty="0" smtClean="0"/>
+              <a:t>Ruth Lennon P.O.</a:t>
+            </a:r>
+          </a:p>
+          <a:p>
+            <a:r>
+              <a:rPr lang="en-US" dirty="0"/>
               <a:t>Charles </a:t>
             </a:r>
             <a:r>
@@ -5851,7 +5843,6 @@
               <a:rPr lang="en-US" dirty="0"/>
               <a:t> </a:t>
             </a:r>
-            <a:endParaRPr lang="en-US" dirty="0" smtClean="0"/>
           </a:p>
           <a:p>
             <a:r>
@@ -5859,25 +5850,25 @@
               <a:t>Mary Walsh </a:t>
             </a:r>
             <a:r>
-              <a:rPr lang="en-US" dirty="0" err="1" smtClean="0"/>
+              <a:rPr lang="en-US" dirty="0" err="1"/>
               <a:t>McGinty</a:t>
             </a:r>
-            <a:endParaRPr lang="en-US" dirty="0" smtClean="0"/>
-          </a:p>
-          <a:p>
-            <a:r>
-              <a:rPr lang="en-US" dirty="0" err="1" smtClean="0"/>
+            <a:endParaRPr lang="en-US" dirty="0"/>
+          </a:p>
+          <a:p>
+            <a:r>
+              <a:rPr lang="en-US" dirty="0" err="1"/>
               <a:t>Joji</a:t>
             </a:r>
             <a:r>
-              <a:rPr lang="en-US" dirty="0" smtClean="0"/>
+              <a:rPr lang="en-US" dirty="0"/>
               <a:t> </a:t>
             </a:r>
             <a:r>
-              <a:rPr lang="en-US" dirty="0" err="1" smtClean="0"/>
+              <a:rPr lang="en-US" dirty="0" err="1"/>
               <a:t>Thokala</a:t>
             </a:r>
-            <a:endParaRPr lang="en-US" dirty="0" smtClean="0"/>
+            <a:endParaRPr lang="en-US" dirty="0"/>
           </a:p>
           <a:p>
             <a:r>
@@ -5885,10 +5876,10 @@
               <a:t>Matthew Mc </a:t>
             </a:r>
             <a:r>
-              <a:rPr lang="en-US" dirty="0" err="1" smtClean="0"/>
+              <a:rPr lang="en-US" dirty="0" err="1"/>
               <a:t>Colgan</a:t>
             </a:r>
-            <a:endParaRPr lang="en-US" dirty="0" smtClean="0"/>
+            <a:endParaRPr lang="en-US" dirty="0"/>
           </a:p>
           <a:p>
             <a:r>
@@ -5900,10 +5891,10 @@
               <a:t> </a:t>
             </a:r>
             <a:r>
-              <a:rPr lang="en-US" dirty="0" err="1" smtClean="0"/>
+              <a:rPr lang="en-US" dirty="0" err="1"/>
               <a:t>Gadhiraju</a:t>
             </a:r>
-            <a:endParaRPr lang="en-US" dirty="0" smtClean="0"/>
+            <a:endParaRPr lang="en-US" dirty="0"/>
           </a:p>
           <a:p>
             <a:r>
@@ -5918,7 +5909,6 @@
               <a:rPr lang="en-US" dirty="0"/>
               <a:t> </a:t>
             </a:r>
-            <a:endParaRPr lang="en-US" dirty="0" smtClean="0"/>
           </a:p>
           <a:p>
             <a:r>
@@ -5936,12 +5926,8 @@
           </a:p>
           <a:p>
             <a:r>
-              <a:rPr lang="en-US" dirty="0" smtClean="0"/>
-              <a:t>Colin </a:t>
-            </a:r>
-            <a:r>
               <a:rPr lang="en-US" dirty="0"/>
-              <a:t>Kenny</a:t>
+              <a:t>Colin Kenny</a:t>
             </a:r>
           </a:p>
           <a:p>
@@ -5959,13 +5945,6 @@
   <p:clrMapOvr>
     <a:masterClrMapping/>
   </p:clrMapOvr>
-  <p:timing>
-    <p:tnLst>
-      <p:par>
-        <p:cTn id="1" dur="indefinite" restart="never" nodeType="tmRoot"/>
-      </p:par>
-    </p:tnLst>
-  </p:timing>
 </p:sld>
 </file>
 
@@ -6007,10 +5986,9 @@
           <a:lstStyle/>
           <a:p>
             <a:r>
-              <a:rPr lang="en-IE" dirty="0" smtClean="0"/>
+              <a:rPr lang="en-IE" dirty="0"/>
               <a:t>System Context</a:t>
             </a:r>
-            <a:endParaRPr lang="en-IE" dirty="0"/>
           </a:p>
         </p:txBody>
       </p:sp>
@@ -6103,7 +6081,7 @@
           <p:cNvPr id="2" name="Title 1">
             <a:extLst>
               <a:ext uri="{FF2B5EF4-FFF2-40B4-BE49-F238E27FC236}">
-                <a16:creationId xmlns:a16="http://schemas.microsoft.com/office/drawing/2014/main" xmlns="" id="{D97765D5-3401-4A9A-A22D-1A26A1C1D8FC}"/>
+                <a16:creationId xmlns:a16="http://schemas.microsoft.com/office/drawing/2014/main" id="{D97765D5-3401-4A9A-A22D-1A26A1C1D8FC}"/>
               </a:ext>
             </a:extLst>
           </p:cNvPr>
@@ -6146,7 +6124,7 @@
           <p:cNvPr id="9" name="Picture 8">
             <a:extLst>
               <a:ext uri="{FF2B5EF4-FFF2-40B4-BE49-F238E27FC236}">
-                <a16:creationId xmlns:a16="http://schemas.microsoft.com/office/drawing/2014/main" xmlns="" id="{87C2624D-6B5C-40ED-A15A-6A1AFF8534F5}"/>
+                <a16:creationId xmlns:a16="http://schemas.microsoft.com/office/drawing/2014/main" id="{87C2624D-6B5C-40ED-A15A-6A1AFF8534F5}"/>
               </a:ext>
             </a:extLst>
           </p:cNvPr>
@@ -6240,13 +6218,6 @@
   <p:clrMapOvr>
     <a:masterClrMapping/>
   </p:clrMapOvr>
-  <p:timing>
-    <p:tnLst>
-      <p:par>
-        <p:cTn id="1" dur="indefinite" restart="never" nodeType="tmRoot"/>
-      </p:par>
-    </p:tnLst>
-  </p:timing>
 </p:sld>
 </file>
 
@@ -6269,7 +6240,13 @@
       </p:grpSpPr>
       <p:sp>
         <p:nvSpPr>
-          <p:cNvPr id="2" name="Title 1"/>
+          <p:cNvPr id="2" name="Title 1">
+            <a:extLst>
+              <a:ext uri="{FF2B5EF4-FFF2-40B4-BE49-F238E27FC236}">
+                <a16:creationId xmlns:a16="http://schemas.microsoft.com/office/drawing/2014/main" id="{18E6919F-DBB5-47C7-92A4-2D9B367BA063}"/>
+              </a:ext>
+            </a:extLst>
+          </p:cNvPr>
           <p:cNvSpPr>
             <a:spLocks noGrp="1"/>
           </p:cNvSpPr>
@@ -6279,62 +6256,131 @@
         </p:nvSpPr>
         <p:spPr>
           <a:xfrm>
-            <a:off x="1141413" y="313766"/>
-            <a:ext cx="9905998" cy="770963"/>
-          </a:xfrm>
-        </p:spPr>
-        <p:txBody>
-          <a:bodyPr/>
+            <a:off x="774441" y="349858"/>
+            <a:ext cx="10898154" cy="397566"/>
+          </a:xfrm>
+        </p:spPr>
+        <p:txBody>
+          <a:bodyPr>
+            <a:noAutofit/>
+          </a:bodyPr>
           <a:lstStyle/>
           <a:p>
             <a:r>
-              <a:rPr lang="en-IE" dirty="0"/>
-              <a:t>Security</a:t>
-            </a:r>
-          </a:p>
-        </p:txBody>
-      </p:sp>
-      <p:sp>
-        <p:nvSpPr>
-          <p:cNvPr id="3" name="Content Placeholder 2"/>
-          <p:cNvSpPr>
-            <a:spLocks noGrp="1"/>
-          </p:cNvSpPr>
+              <a:rPr lang="en-US" b="1" dirty="0"/>
+              <a:t>GitHub</a:t>
+            </a:r>
+            <a:r>
+              <a:rPr lang="en-US" dirty="0"/>
+              <a:t> </a:t>
+            </a:r>
+            <a:r>
+              <a:rPr lang="en-US" dirty="0" err="1"/>
+              <a:t>DeV</a:t>
+            </a:r>
+            <a:r>
+              <a:rPr lang="en-US" dirty="0"/>
+              <a:t> Branch  &amp; Documentation Branch</a:t>
+            </a:r>
+          </a:p>
+        </p:txBody>
+      </p:sp>
+      <p:pic>
+        <p:nvPicPr>
+          <p:cNvPr id="4" name="Content Placeholder 3">
+            <a:extLst>
+              <a:ext uri="{FF2B5EF4-FFF2-40B4-BE49-F238E27FC236}">
+                <a16:creationId xmlns:a16="http://schemas.microsoft.com/office/drawing/2014/main" id="{25F52DD1-AC36-4ADF-A7C9-1959FECD4A3E}"/>
+              </a:ext>
+            </a:extLst>
+          </p:cNvPr>
+          <p:cNvPicPr>
+            <a:picLocks noGrp="1" noChangeAspect="1"/>
+          </p:cNvPicPr>
           <p:nvPr>
             <p:ph idx="1"/>
           </p:nvPr>
-        </p:nvSpPr>
+        </p:nvPicPr>
+        <p:blipFill>
+          <a:blip r:embed="rId2"/>
+          <a:stretch>
+            <a:fillRect/>
+          </a:stretch>
+        </p:blipFill>
         <p:spPr>
           <a:xfrm>
-            <a:off x="1141413" y="1228165"/>
-            <a:ext cx="9905998" cy="5145741"/>
-          </a:xfrm>
-        </p:spPr>
-        <p:txBody>
-          <a:bodyPr/>
-          <a:lstStyle/>
-          <a:p>
-            <a:endParaRPr lang="en-IE" dirty="0"/>
-          </a:p>
-        </p:txBody>
-      </p:sp>
+            <a:off x="1371470" y="989045"/>
+            <a:ext cx="9423315" cy="2032451"/>
+          </a:xfrm>
+          <a:prstGeom prst="rect">
+            <a:avLst/>
+          </a:prstGeom>
+          <a:ln w="88900" cap="sq" cmpd="thickThin">
+            <a:solidFill>
+              <a:srgbClr val="000000"/>
+            </a:solidFill>
+            <a:prstDash val="solid"/>
+            <a:miter lim="800000"/>
+          </a:ln>
+          <a:effectLst>
+            <a:innerShdw blurRad="76200">
+              <a:srgbClr val="000000"/>
+            </a:innerShdw>
+          </a:effectLst>
+        </p:spPr>
+      </p:pic>
+      <p:pic>
+        <p:nvPicPr>
+          <p:cNvPr id="5" name="Picture 4">
+            <a:extLst>
+              <a:ext uri="{FF2B5EF4-FFF2-40B4-BE49-F238E27FC236}">
+                <a16:creationId xmlns:a16="http://schemas.microsoft.com/office/drawing/2014/main" id="{41CFB6F5-FE14-419A-B0AE-9FF4B4F2E04E}"/>
+              </a:ext>
+            </a:extLst>
+          </p:cNvPr>
+          <p:cNvPicPr>
+            <a:picLocks noChangeAspect="1"/>
+          </p:cNvPicPr>
+          <p:nvPr/>
+        </p:nvPicPr>
+        <p:blipFill>
+          <a:blip r:embed="rId3"/>
+          <a:stretch>
+            <a:fillRect/>
+          </a:stretch>
+        </p:blipFill>
+        <p:spPr>
+          <a:xfrm>
+            <a:off x="1385887" y="3486648"/>
+            <a:ext cx="9420225" cy="2826688"/>
+          </a:xfrm>
+          <a:prstGeom prst="rect">
+            <a:avLst/>
+          </a:prstGeom>
+          <a:ln w="88900" cap="sq" cmpd="thickThin">
+            <a:solidFill>
+              <a:srgbClr val="000000"/>
+            </a:solidFill>
+            <a:prstDash val="solid"/>
+            <a:miter lim="800000"/>
+          </a:ln>
+          <a:effectLst>
+            <a:innerShdw blurRad="76200">
+              <a:srgbClr val="000000"/>
+            </a:innerShdw>
+          </a:effectLst>
+        </p:spPr>
+      </p:pic>
     </p:spTree>
     <p:extLst>
       <p:ext uri="{BB962C8B-B14F-4D97-AF65-F5344CB8AC3E}">
-        <p14:creationId xmlns:p14="http://schemas.microsoft.com/office/powerpoint/2010/main" val="3211917232"/>
+        <p14:creationId xmlns:p14="http://schemas.microsoft.com/office/powerpoint/2010/main" val="2918187612"/>
       </p:ext>
     </p:extLst>
   </p:cSld>
   <p:clrMapOvr>
     <a:masterClrMapping/>
   </p:clrMapOvr>
-  <p:timing>
-    <p:tnLst>
-      <p:par>
-        <p:cTn id="1" dur="indefinite" restart="never" nodeType="tmRoot"/>
-      </p:par>
-    </p:tnLst>
-  </p:timing>
 </p:sld>
 </file>
 
@@ -6367,8 +6413,8 @@
         </p:nvSpPr>
         <p:spPr>
           <a:xfrm>
-            <a:off x="1096589" y="0"/>
-            <a:ext cx="9905998" cy="1398494"/>
+            <a:off x="1141413" y="313766"/>
+            <a:ext cx="9905998" cy="770963"/>
           </a:xfrm>
         </p:spPr>
         <p:txBody>
@@ -6376,71 +6422,143 @@
           <a:lstStyle/>
           <a:p>
             <a:r>
-              <a:rPr lang="en-IE" dirty="0" smtClean="0"/>
-              <a:t>Service Level Agreement</a:t>
-            </a:r>
+              <a:rPr lang="en-IE" dirty="0"/>
+              <a:t>Security / Risk</a:t>
+            </a:r>
+          </a:p>
+        </p:txBody>
+      </p:sp>
+      <p:sp>
+        <p:nvSpPr>
+          <p:cNvPr id="3" name="Content Placeholder 2"/>
+          <p:cNvSpPr>
+            <a:spLocks noGrp="1"/>
+          </p:cNvSpPr>
+          <p:nvPr>
+            <p:ph idx="1"/>
+          </p:nvPr>
+        </p:nvSpPr>
+        <p:spPr>
+          <a:xfrm>
+            <a:off x="1141413" y="1228165"/>
+            <a:ext cx="9905998" cy="5145741"/>
+          </a:xfrm>
+        </p:spPr>
+        <p:txBody>
+          <a:bodyPr/>
+          <a:lstStyle/>
+          <a:p>
+            <a:r>
+              <a:rPr lang="en-IE" dirty="0">
+                <a:latin typeface="Courier New" panose="02070309020205020404" pitchFamily="49" charset="0"/>
+                <a:cs typeface="Courier New" panose="02070309020205020404" pitchFamily="49" charset="0"/>
+              </a:rPr>
+              <a:t>Security is still in the planning stage </a:t>
+            </a:r>
+          </a:p>
+          <a:p>
+            <a:r>
+              <a:rPr lang="en-IE" dirty="0">
+                <a:latin typeface="Courier New" panose="02070309020205020404" pitchFamily="49" charset="0"/>
+                <a:cs typeface="Courier New" panose="02070309020205020404" pitchFamily="49" charset="0"/>
+              </a:rPr>
+              <a:t>Application groups permissions are in progress</a:t>
+            </a:r>
+          </a:p>
+          <a:p>
+            <a:r>
+              <a:rPr lang="en-IE" dirty="0">
+                <a:latin typeface="Courier New" panose="02070309020205020404" pitchFamily="49" charset="0"/>
+                <a:cs typeface="Courier New" panose="02070309020205020404" pitchFamily="49" charset="0"/>
+              </a:rPr>
+              <a:t>Application monitoring Via </a:t>
+            </a:r>
+            <a:r>
+              <a:rPr lang="en-IE" dirty="0" err="1">
+                <a:latin typeface="Courier New" panose="02070309020205020404" pitchFamily="49" charset="0"/>
+                <a:cs typeface="Courier New" panose="02070309020205020404" pitchFamily="49" charset="0"/>
+              </a:rPr>
+              <a:t>Monit</a:t>
+            </a:r>
+            <a:r>
+              <a:rPr lang="en-IE" dirty="0">
+                <a:latin typeface="Courier New" panose="02070309020205020404" pitchFamily="49" charset="0"/>
+                <a:cs typeface="Courier New" panose="02070309020205020404" pitchFamily="49" charset="0"/>
+              </a:rPr>
+              <a:t> </a:t>
+            </a:r>
+          </a:p>
+          <a:p>
+            <a:r>
+              <a:rPr lang="en-IE" dirty="0">
+                <a:latin typeface="Courier New" panose="02070309020205020404" pitchFamily="49" charset="0"/>
+                <a:cs typeface="Courier New" panose="02070309020205020404" pitchFamily="49" charset="0"/>
+              </a:rPr>
+              <a:t>Proposed Standards 	to be adopted </a:t>
+            </a:r>
+          </a:p>
+          <a:p>
+            <a:pPr lvl="2"/>
+            <a:r>
+              <a:rPr lang="en-IE" sz="1400" dirty="0">
+                <a:latin typeface="Courier New" panose="02070309020205020404" pitchFamily="49" charset="0"/>
+                <a:cs typeface="Courier New" panose="02070309020205020404" pitchFamily="49" charset="0"/>
+              </a:rPr>
+              <a:t>PCI</a:t>
+            </a:r>
+          </a:p>
+          <a:p>
+            <a:pPr lvl="2"/>
+            <a:r>
+              <a:rPr lang="en-IE" sz="1400" dirty="0">
+                <a:latin typeface="Courier New" panose="02070309020205020404" pitchFamily="49" charset="0"/>
+                <a:cs typeface="Courier New" panose="02070309020205020404" pitchFamily="49" charset="0"/>
+              </a:rPr>
+              <a:t>SOX</a:t>
+            </a:r>
+          </a:p>
+          <a:p>
+            <a:pPr lvl="2"/>
+            <a:r>
+              <a:rPr lang="en-IE" sz="1400" dirty="0">
+                <a:latin typeface="Courier New" panose="02070309020205020404" pitchFamily="49" charset="0"/>
+                <a:cs typeface="Courier New" panose="02070309020205020404" pitchFamily="49" charset="0"/>
+              </a:rPr>
+              <a:t>ISO27000</a:t>
+            </a:r>
+          </a:p>
+          <a:p>
+            <a:pPr lvl="2"/>
+            <a:r>
+              <a:rPr lang="en-IE" sz="1400" dirty="0">
+                <a:latin typeface="Courier New" panose="02070309020205020404" pitchFamily="49" charset="0"/>
+                <a:cs typeface="Courier New" panose="02070309020205020404" pitchFamily="49" charset="0"/>
+              </a:rPr>
+              <a:t>HIPAA</a:t>
+            </a:r>
+          </a:p>
+          <a:p>
+            <a:pPr lvl="2"/>
+            <a:r>
+              <a:rPr lang="en-IE" sz="1400" dirty="0">
+                <a:latin typeface="Courier New" panose="02070309020205020404" pitchFamily="49" charset="0"/>
+                <a:cs typeface="Courier New" panose="02070309020205020404" pitchFamily="49" charset="0"/>
+              </a:rPr>
+              <a:t>NIST		</a:t>
+            </a:r>
+          </a:p>
+          <a:p>
             <a:endParaRPr lang="en-IE" dirty="0"/>
           </a:p>
-        </p:txBody>
-      </p:sp>
-      <p:pic>
-        <p:nvPicPr>
-          <p:cNvPr id="1026" name="Picture 2"/>
-          <p:cNvPicPr>
-            <a:picLocks noGrp="1" noChangeAspect="1" noChangeArrowheads="1"/>
-          </p:cNvPicPr>
-          <p:nvPr>
-            <p:ph idx="1"/>
-          </p:nvPr>
-        </p:nvPicPr>
-        <p:blipFill>
-          <a:blip r:embed="rId2">
-            <a:extLst>
-              <a:ext uri="{28A0092B-C50C-407E-A947-70E740481C1C}">
-                <a14:useLocalDpi xmlns:a14="http://schemas.microsoft.com/office/drawing/2010/main" val="0"/>
-              </a:ext>
-            </a:extLst>
-          </a:blip>
-          <a:srcRect/>
-          <a:stretch>
-            <a:fillRect/>
-          </a:stretch>
-        </p:blipFill>
-        <p:spPr bwMode="auto">
-          <a:xfrm>
-            <a:off x="1290918" y="1389529"/>
-            <a:ext cx="9637058" cy="4858871"/>
-          </a:xfrm>
-          <a:prstGeom prst="rect">
-            <a:avLst/>
-          </a:prstGeom>
-          <a:noFill/>
-          <a:ln w="127000" cmpd="sng">
-            <a:solidFill>
-              <a:schemeClr val="bg1">
-                <a:lumMod val="50000"/>
-                <a:lumOff val="50000"/>
-              </a:schemeClr>
-            </a:solidFill>
-            <a:miter lim="800000"/>
-            <a:headEnd/>
-            <a:tailEnd/>
-          </a:ln>
-          <a:extLst>
-            <a:ext uri="{909E8E84-426E-40DD-AFC4-6F175D3DCCD1}">
-              <a14:hiddenFill xmlns:a14="http://schemas.microsoft.com/office/drawing/2010/main">
-                <a:solidFill>
-                  <a:schemeClr val="accent1"/>
-                </a:solidFill>
-              </a14:hiddenFill>
-            </a:ext>
-          </a:extLst>
-        </p:spPr>
-      </p:pic>
+          <a:p>
+            <a:endParaRPr lang="en-IE" dirty="0"/>
+          </a:p>
+        </p:txBody>
+      </p:sp>
     </p:spTree>
     <p:extLst>
       <p:ext uri="{BB962C8B-B14F-4D97-AF65-F5344CB8AC3E}">
-        <p14:creationId xmlns:p14="http://schemas.microsoft.com/office/powerpoint/2010/main" val="2359836205"/>
+        <p14:creationId xmlns:p14="http://schemas.microsoft.com/office/powerpoint/2010/main" val="3211917232"/>
       </p:ext>
     </p:extLst>
   </p:cSld>
@@ -6467,6 +6585,200 @@
           <a:chExt cx="0" cy="0"/>
         </a:xfrm>
       </p:grpSpPr>
+      <p:sp>
+        <p:nvSpPr>
+          <p:cNvPr id="2" name="Title 1"/>
+          <p:cNvSpPr>
+            <a:spLocks noGrp="1"/>
+          </p:cNvSpPr>
+          <p:nvPr>
+            <p:ph type="title"/>
+          </p:nvPr>
+        </p:nvSpPr>
+        <p:spPr>
+          <a:xfrm>
+            <a:off x="1096589" y="0"/>
+            <a:ext cx="9905998" cy="1398494"/>
+          </a:xfrm>
+        </p:spPr>
+        <p:txBody>
+          <a:bodyPr/>
+          <a:lstStyle/>
+          <a:p>
+            <a:r>
+              <a:rPr lang="en-IE" dirty="0"/>
+              <a:t>Service Level Agreement</a:t>
+            </a:r>
+          </a:p>
+        </p:txBody>
+      </p:sp>
+      <p:pic>
+        <p:nvPicPr>
+          <p:cNvPr id="1026" name="Picture 2"/>
+          <p:cNvPicPr>
+            <a:picLocks noGrp="1" noChangeAspect="1" noChangeArrowheads="1"/>
+          </p:cNvPicPr>
+          <p:nvPr>
+            <p:ph idx="1"/>
+          </p:nvPr>
+        </p:nvPicPr>
+        <p:blipFill>
+          <a:blip r:embed="rId2">
+            <a:extLst>
+              <a:ext uri="{28A0092B-C50C-407E-A947-70E740481C1C}">
+                <a14:useLocalDpi xmlns:a14="http://schemas.microsoft.com/office/drawing/2010/main" val="0"/>
+              </a:ext>
+            </a:extLst>
+          </a:blip>
+          <a:srcRect/>
+          <a:stretch>
+            <a:fillRect/>
+          </a:stretch>
+        </p:blipFill>
+        <p:spPr bwMode="auto">
+          <a:xfrm>
+            <a:off x="1290918" y="1389529"/>
+            <a:ext cx="9637058" cy="4858871"/>
+          </a:xfrm>
+          <a:prstGeom prst="rect">
+            <a:avLst/>
+          </a:prstGeom>
+          <a:noFill/>
+          <a:ln w="127000" cmpd="sng">
+            <a:solidFill>
+              <a:schemeClr val="bg1">
+                <a:lumMod val="50000"/>
+                <a:lumOff val="50000"/>
+              </a:schemeClr>
+            </a:solidFill>
+            <a:miter lim="800000"/>
+            <a:headEnd/>
+            <a:tailEnd/>
+          </a:ln>
+          <a:extLst>
+            <a:ext uri="{909E8E84-426E-40DD-AFC4-6F175D3DCCD1}">
+              <a14:hiddenFill xmlns:a14="http://schemas.microsoft.com/office/drawing/2010/main">
+                <a:solidFill>
+                  <a:schemeClr val="accent1"/>
+                </a:solidFill>
+              </a14:hiddenFill>
+            </a:ext>
+          </a:extLst>
+        </p:spPr>
+      </p:pic>
+    </p:spTree>
+    <p:extLst>
+      <p:ext uri="{BB962C8B-B14F-4D97-AF65-F5344CB8AC3E}">
+        <p14:creationId xmlns:p14="http://schemas.microsoft.com/office/powerpoint/2010/main" val="2359836205"/>
+      </p:ext>
+    </p:extLst>
+  </p:cSld>
+  <p:clrMapOvr>
+    <a:masterClrMapping/>
+  </p:clrMapOvr>
+</p:sld>
+</file>
+
+<file path=ppt/slides/slide15.xml><?xml version="1.0" encoding="utf-8"?>
+<p:sld xmlns:a="http://schemas.openxmlformats.org/drawingml/2006/main" xmlns:r="http://schemas.openxmlformats.org/officeDocument/2006/relationships" xmlns:p="http://schemas.openxmlformats.org/presentationml/2006/main">
+  <p:cSld>
+    <p:spTree>
+      <p:nvGrpSpPr>
+        <p:cNvPr id="1" name=""/>
+        <p:cNvGrpSpPr/>
+        <p:nvPr/>
+      </p:nvGrpSpPr>
+      <p:grpSpPr>
+        <a:xfrm>
+          <a:off x="0" y="0"/>
+          <a:ext cx="0" cy="0"/>
+          <a:chOff x="0" y="0"/>
+          <a:chExt cx="0" cy="0"/>
+        </a:xfrm>
+      </p:grpSpPr>
+      <p:sp>
+        <p:nvSpPr>
+          <p:cNvPr id="2" name="Title 1">
+            <a:extLst>
+              <a:ext uri="{FF2B5EF4-FFF2-40B4-BE49-F238E27FC236}">
+                <a16:creationId xmlns:a16="http://schemas.microsoft.com/office/drawing/2014/main" id="{4828B85F-3116-42E8-AED7-4557E085990F}"/>
+              </a:ext>
+            </a:extLst>
+          </p:cNvPr>
+          <p:cNvSpPr>
+            <a:spLocks noGrp="1"/>
+          </p:cNvSpPr>
+          <p:nvPr>
+            <p:ph type="title"/>
+          </p:nvPr>
+        </p:nvSpPr>
+        <p:spPr/>
+        <p:txBody>
+          <a:bodyPr/>
+          <a:lstStyle/>
+          <a:p>
+            <a:r>
+              <a:rPr lang="en-US" dirty="0"/>
+              <a:t>Questions</a:t>
+            </a:r>
+          </a:p>
+        </p:txBody>
+      </p:sp>
+      <p:sp>
+        <p:nvSpPr>
+          <p:cNvPr id="3" name="Content Placeholder 2">
+            <a:extLst>
+              <a:ext uri="{FF2B5EF4-FFF2-40B4-BE49-F238E27FC236}">
+                <a16:creationId xmlns:a16="http://schemas.microsoft.com/office/drawing/2014/main" id="{AB9BF701-F1C1-41B3-8CC9-FA6AEFADDC46}"/>
+              </a:ext>
+            </a:extLst>
+          </p:cNvPr>
+          <p:cNvSpPr>
+            <a:spLocks noGrp="1"/>
+          </p:cNvSpPr>
+          <p:nvPr>
+            <p:ph idx="1"/>
+          </p:nvPr>
+        </p:nvSpPr>
+        <p:spPr/>
+        <p:txBody>
+          <a:bodyPr/>
+          <a:lstStyle/>
+          <a:p>
+            <a:endParaRPr lang="en-US" dirty="0"/>
+          </a:p>
+        </p:txBody>
+      </p:sp>
+    </p:spTree>
+    <p:extLst>
+      <p:ext uri="{BB962C8B-B14F-4D97-AF65-F5344CB8AC3E}">
+        <p14:creationId xmlns:p14="http://schemas.microsoft.com/office/powerpoint/2010/main" val="2591294104"/>
+      </p:ext>
+    </p:extLst>
+  </p:cSld>
+  <p:clrMapOvr>
+    <a:masterClrMapping/>
+  </p:clrMapOvr>
+</p:sld>
+</file>
+
+<file path=ppt/slides/slide16.xml><?xml version="1.0" encoding="utf-8"?>
+<p:sld xmlns:a="http://schemas.openxmlformats.org/drawingml/2006/main" xmlns:r="http://schemas.openxmlformats.org/officeDocument/2006/relationships" xmlns:p="http://schemas.openxmlformats.org/presentationml/2006/main">
+  <p:cSld>
+    <p:spTree>
+      <p:nvGrpSpPr>
+        <p:cNvPr id="1" name=""/>
+        <p:cNvGrpSpPr/>
+        <p:nvPr/>
+      </p:nvGrpSpPr>
+      <p:grpSpPr>
+        <a:xfrm>
+          <a:off x="0" y="0"/>
+          <a:ext cx="0" cy="0"/>
+          <a:chOff x="0" y="0"/>
+          <a:chExt cx="0" cy="0"/>
+        </a:xfrm>
+      </p:grpSpPr>
     </p:spTree>
     <p:extLst>
       <p:ext uri="{BB962C8B-B14F-4D97-AF65-F5344CB8AC3E}">
@@ -6477,13 +6789,6 @@
   <p:clrMapOvr>
     <a:masterClrMapping/>
   </p:clrMapOvr>
-  <p:timing>
-    <p:tnLst>
-      <p:par>
-        <p:cTn id="1" dur="indefinite" restart="never" nodeType="tmRoot"/>
-      </p:par>
-    </p:tnLst>
-  </p:timing>
 </p:sld>
 </file>
 
@@ -6509,7 +6814,7 @@
           <p:cNvPr id="2" name="Title 1">
             <a:extLst>
               <a:ext uri="{FF2B5EF4-FFF2-40B4-BE49-F238E27FC236}">
-                <a16:creationId xmlns:a16="http://schemas.microsoft.com/office/drawing/2014/main" xmlns="" id="{BB7DE4E6-DFB0-403A-A3D4-7A47423178D1}"/>
+                <a16:creationId xmlns:a16="http://schemas.microsoft.com/office/drawing/2014/main" id="{BB7DE4E6-DFB0-403A-A3D4-7A47423178D1}"/>
               </a:ext>
             </a:extLst>
           </p:cNvPr>
@@ -6545,12 +6850,6 @@
               </a:rPr>
               <a:t>Online Business Intelligence to analyze building suitability and running costs.</a:t>
             </a:r>
-            <a:r>
-              <a:rPr lang="en-US" dirty="0">
-                <a:effectLst/>
-              </a:rPr>
-              <a:t/>
-            </a:r>
             <a:br>
               <a:rPr lang="en-US" dirty="0">
                 <a:effectLst/>
@@ -6565,7 +6864,7 @@
           <p:cNvPr id="3" name="Content Placeholder 2">
             <a:extLst>
               <a:ext uri="{FF2B5EF4-FFF2-40B4-BE49-F238E27FC236}">
-                <a16:creationId xmlns:a16="http://schemas.microsoft.com/office/drawing/2014/main" xmlns="" id="{1BAF3E77-EC7E-456C-BC8B-B4359E59B210}"/>
+                <a16:creationId xmlns:a16="http://schemas.microsoft.com/office/drawing/2014/main" id="{1BAF3E77-EC7E-456C-BC8B-B4359E59B210}"/>
               </a:ext>
             </a:extLst>
           </p:cNvPr>
@@ -6681,7 +6980,7 @@
                 <a:latin typeface="Courier New" panose="02070309020205020404" pitchFamily="49" charset="0"/>
                 <a:cs typeface="Courier New" panose="02070309020205020404" pitchFamily="49" charset="0"/>
               </a:rPr>
-              <a:t>The analysis system should be clean and simple. </a:t>
+              <a:t>The analysis system should be clean and simple </a:t>
             </a:r>
           </a:p>
           <a:p>
@@ -6692,7 +6991,7 @@
                 <a:latin typeface="Courier New" panose="02070309020205020404" pitchFamily="49" charset="0"/>
                 <a:cs typeface="Courier New" panose="02070309020205020404" pitchFamily="49" charset="0"/>
               </a:rPr>
-              <a:t>simplified graphics. </a:t>
+              <a:t>simplified graphics </a:t>
             </a:r>
           </a:p>
           <a:p>
@@ -6714,7 +7013,7 @@
                 <a:latin typeface="Courier New" panose="02070309020205020404" pitchFamily="49" charset="0"/>
                 <a:cs typeface="Courier New" panose="02070309020205020404" pitchFamily="49" charset="0"/>
               </a:rPr>
-              <a:t>Once a client enters details it should not be able to be changed by the client.</a:t>
+              <a:t>Once a client enters details it should not be able to be changed by the client</a:t>
             </a:r>
             <a:endParaRPr lang="en-US" sz="2000" b="1" dirty="0">
               <a:latin typeface="Courier New" panose="02070309020205020404" pitchFamily="49" charset="0"/>
@@ -6733,13 +7032,6 @@
   <p:clrMapOvr>
     <a:masterClrMapping/>
   </p:clrMapOvr>
-  <p:timing>
-    <p:tnLst>
-      <p:par>
-        <p:cTn id="1" dur="indefinite" restart="never" nodeType="tmRoot"/>
-      </p:par>
-    </p:tnLst>
-  </p:timing>
 </p:sld>
 </file>
 
@@ -6772,8 +7064,8 @@
         </p:nvSpPr>
         <p:spPr>
           <a:xfrm>
-            <a:off x="1141413" y="609600"/>
-            <a:ext cx="9905998" cy="1165412"/>
+            <a:off x="1141413" y="222638"/>
+            <a:ext cx="9905998" cy="731520"/>
           </a:xfrm>
         </p:spPr>
         <p:txBody>
@@ -6781,10 +7073,9 @@
           <a:lstStyle/>
           <a:p>
             <a:r>
-              <a:rPr lang="en-IE" dirty="0" smtClean="0"/>
-              <a:t>Schedule </a:t>
-            </a:r>
-            <a:endParaRPr lang="en-IE" dirty="0"/>
+              <a:rPr lang="en-IE" dirty="0"/>
+              <a:t>Schedule / Goals</a:t>
+            </a:r>
           </a:p>
         </p:txBody>
       </p:sp>
@@ -6800,13 +7091,98 @@
         </p:nvSpPr>
         <p:spPr>
           <a:xfrm>
-            <a:off x="1141413" y="1918447"/>
-            <a:ext cx="9905998" cy="3872753"/>
+            <a:off x="437322" y="882595"/>
+            <a:ext cx="11306755" cy="4908605"/>
           </a:xfrm>
         </p:spPr>
         <p:txBody>
           <a:bodyPr/>
           <a:lstStyle/>
+          <a:p>
+            <a:endParaRPr lang="en-IE" dirty="0">
+              <a:latin typeface="Courier New" panose="02070309020205020404" pitchFamily="49" charset="0"/>
+              <a:cs typeface="Courier New" panose="02070309020205020404" pitchFamily="49" charset="0"/>
+            </a:endParaRPr>
+          </a:p>
+          <a:p>
+            <a:r>
+              <a:rPr lang="en-IE" dirty="0" err="1">
+                <a:latin typeface="Courier New" panose="02070309020205020404" pitchFamily="49" charset="0"/>
+                <a:cs typeface="Courier New" panose="02070309020205020404" pitchFamily="49" charset="0"/>
+              </a:rPr>
+              <a:t>CrowSoft</a:t>
+            </a:r>
+            <a:r>
+              <a:rPr lang="en-IE" dirty="0">
+                <a:latin typeface="Courier New" panose="02070309020205020404" pitchFamily="49" charset="0"/>
+                <a:cs typeface="Courier New" panose="02070309020205020404" pitchFamily="49" charset="0"/>
+              </a:rPr>
+              <a:t> is currently in the Prototype Development stage </a:t>
+            </a:r>
+          </a:p>
+          <a:p>
+            <a:pPr marL="0" indent="0">
+              <a:buNone/>
+            </a:pPr>
+            <a:r>
+              <a:rPr lang="en-IE" dirty="0">
+                <a:latin typeface="Courier New" panose="02070309020205020404" pitchFamily="49" charset="0"/>
+                <a:cs typeface="Courier New" panose="02070309020205020404" pitchFamily="49" charset="0"/>
+              </a:rPr>
+              <a:t>	planning to go live in the second quarter</a:t>
+            </a:r>
+          </a:p>
+          <a:p>
+            <a:r>
+              <a:rPr lang="en-IE" dirty="0">
+                <a:latin typeface="Courier New" panose="02070309020205020404" pitchFamily="49" charset="0"/>
+                <a:cs typeface="Courier New" panose="02070309020205020404" pitchFamily="49" charset="0"/>
+              </a:rPr>
+              <a:t>Environments are running on VMs hosted by LYIT Datacentre (Scalable)</a:t>
+            </a:r>
+          </a:p>
+          <a:p>
+            <a:r>
+              <a:rPr lang="en-IE" dirty="0">
+                <a:latin typeface="Courier New" panose="02070309020205020404" pitchFamily="49" charset="0"/>
+                <a:cs typeface="Courier New" panose="02070309020205020404" pitchFamily="49" charset="0"/>
+              </a:rPr>
+              <a:t>No patents sought to date or intellectual property issues</a:t>
+            </a:r>
+          </a:p>
+          <a:p>
+            <a:r>
+              <a:rPr lang="en-IE" dirty="0">
+                <a:latin typeface="Courier New" panose="02070309020205020404" pitchFamily="49" charset="0"/>
+                <a:cs typeface="Courier New" panose="02070309020205020404" pitchFamily="49" charset="0"/>
+              </a:rPr>
+              <a:t>Due to project limitations Open Source software has been used </a:t>
+            </a:r>
+          </a:p>
+          <a:p>
+            <a:r>
+              <a:rPr lang="en-IE" dirty="0">
+                <a:latin typeface="Courier New" panose="02070309020205020404" pitchFamily="49" charset="0"/>
+                <a:cs typeface="Courier New" panose="02070309020205020404" pitchFamily="49" charset="0"/>
+              </a:rPr>
+              <a:t>SLA draft is in place to be signed off by Project Owner</a:t>
+            </a:r>
+          </a:p>
+          <a:p>
+            <a:endParaRPr lang="en-IE" dirty="0">
+              <a:latin typeface="Courier New" panose="02070309020205020404" pitchFamily="49" charset="0"/>
+              <a:cs typeface="Courier New" panose="02070309020205020404" pitchFamily="49" charset="0"/>
+            </a:endParaRPr>
+          </a:p>
+          <a:p>
+            <a:endParaRPr lang="en-IE" dirty="0"/>
+          </a:p>
+          <a:p>
+            <a:endParaRPr lang="en-IE" dirty="0"/>
+          </a:p>
+          <a:p>
+            <a:endParaRPr lang="en-IE" dirty="0"/>
+          </a:p>
           <a:p>
             <a:endParaRPr lang="en-IE" dirty="0"/>
           </a:p>
@@ -6847,7 +7223,7 @@
           <p:cNvPr id="2" name="Title 1">
             <a:extLst>
               <a:ext uri="{FF2B5EF4-FFF2-40B4-BE49-F238E27FC236}">
-                <a16:creationId xmlns:a16="http://schemas.microsoft.com/office/drawing/2014/main" xmlns="" id="{060567F0-368C-4EE8-A1E0-EEF5756B5F55}"/>
+                <a16:creationId xmlns:a16="http://schemas.microsoft.com/office/drawing/2014/main" id="{060567F0-368C-4EE8-A1E0-EEF5756B5F55}"/>
               </a:ext>
             </a:extLst>
           </p:cNvPr>
@@ -6872,7 +7248,7 @@
           <a:p>
             <a:pPr algn="ctr"/>
             <a:r>
-              <a:rPr lang="en-US" b="1" dirty="0" smtClean="0">
+              <a:rPr lang="en-US" b="1" dirty="0">
                 <a:effectLst/>
               </a:rPr>
               <a:t>Technologies &amp; </a:t>
@@ -6882,7 +7258,7 @@
               <a:t>DevOps Process</a:t>
             </a:r>
             <a:r>
-              <a:rPr lang="en-US" b="1" dirty="0" smtClean="0">
+              <a:rPr lang="en-US" b="1" dirty="0">
                 <a:effectLst/>
               </a:rPr>
               <a:t> </a:t>
@@ -6896,7 +7272,7 @@
           <p:cNvPr id="4" name="Rectangle: Rounded Corners 91">
             <a:extLst>
               <a:ext uri="{FF2B5EF4-FFF2-40B4-BE49-F238E27FC236}">
-                <a16:creationId xmlns:a16="http://schemas.microsoft.com/office/drawing/2014/main" xmlns="" id="{1D838972-D107-4FC0-86F6-111F21BB8F67}"/>
+                <a16:creationId xmlns:a16="http://schemas.microsoft.com/office/drawing/2014/main" id="{1D838972-D107-4FC0-86F6-111F21BB8F67}"/>
               </a:ext>
             </a:extLst>
           </p:cNvPr>
@@ -7061,7 +7437,7 @@
           <p:cNvPr id="5" name="Rectangle: Rounded Corners 92">
             <a:extLst>
               <a:ext uri="{FF2B5EF4-FFF2-40B4-BE49-F238E27FC236}">
-                <a16:creationId xmlns:a16="http://schemas.microsoft.com/office/drawing/2014/main" xmlns="" id="{3361B1F7-61DA-41EA-A158-80D47FBC601B}"/>
+                <a16:creationId xmlns:a16="http://schemas.microsoft.com/office/drawing/2014/main" id="{3361B1F7-61DA-41EA-A158-80D47FBC601B}"/>
               </a:ext>
             </a:extLst>
           </p:cNvPr>
@@ -7228,7 +7604,7 @@
           <p:cNvPr id="6" name="Picture 5" descr="Related image">
             <a:extLst>
               <a:ext uri="{FF2B5EF4-FFF2-40B4-BE49-F238E27FC236}">
-                <a16:creationId xmlns:a16="http://schemas.microsoft.com/office/drawing/2014/main" xmlns="" id="{8913D232-6DF1-48E3-A429-AE211CF7127D}"/>
+                <a16:creationId xmlns:a16="http://schemas.microsoft.com/office/drawing/2014/main" id="{8913D232-6DF1-48E3-A429-AE211CF7127D}"/>
               </a:ext>
             </a:extLst>
           </p:cNvPr>
@@ -7275,7 +7651,7 @@
           <p:cNvPr id="7" name="Rectangle: Rounded Corners 94">
             <a:extLst>
               <a:ext uri="{FF2B5EF4-FFF2-40B4-BE49-F238E27FC236}">
-                <a16:creationId xmlns:a16="http://schemas.microsoft.com/office/drawing/2014/main" xmlns="" id="{026577BB-D8B8-49E0-8B70-1B84A8B8C33B}"/>
+                <a16:creationId xmlns:a16="http://schemas.microsoft.com/office/drawing/2014/main" id="{026577BB-D8B8-49E0-8B70-1B84A8B8C33B}"/>
               </a:ext>
             </a:extLst>
           </p:cNvPr>
@@ -7440,7 +7816,7 @@
           <p:cNvPr id="8" name="Picture 7">
             <a:extLst>
               <a:ext uri="{FF2B5EF4-FFF2-40B4-BE49-F238E27FC236}">
-                <a16:creationId xmlns:a16="http://schemas.microsoft.com/office/drawing/2014/main" xmlns="" id="{5AC3D39C-1E7D-4D10-8B3F-7F6EB9B0ED46}"/>
+                <a16:creationId xmlns:a16="http://schemas.microsoft.com/office/drawing/2014/main" id="{5AC3D39C-1E7D-4D10-8B3F-7F6EB9B0ED46}"/>
               </a:ext>
             </a:extLst>
           </p:cNvPr>
@@ -7476,7 +7852,7 @@
           <p:cNvPr id="9" name="Rectangle: Rounded Corners 96">
             <a:extLst>
               <a:ext uri="{FF2B5EF4-FFF2-40B4-BE49-F238E27FC236}">
-                <a16:creationId xmlns:a16="http://schemas.microsoft.com/office/drawing/2014/main" xmlns="" id="{D5A10EA0-9538-4294-9A39-376087F91AA9}"/>
+                <a16:creationId xmlns:a16="http://schemas.microsoft.com/office/drawing/2014/main" id="{D5A10EA0-9538-4294-9A39-376087F91AA9}"/>
               </a:ext>
             </a:extLst>
           </p:cNvPr>
@@ -7641,7 +8017,7 @@
           <p:cNvPr id="10" name="Rectangle: Rounded Corners 97">
             <a:extLst>
               <a:ext uri="{FF2B5EF4-FFF2-40B4-BE49-F238E27FC236}">
-                <a16:creationId xmlns:a16="http://schemas.microsoft.com/office/drawing/2014/main" xmlns="" id="{F6E1CC74-9639-445F-9926-FC0AF8932A1A}"/>
+                <a16:creationId xmlns:a16="http://schemas.microsoft.com/office/drawing/2014/main" id="{F6E1CC74-9639-445F-9926-FC0AF8932A1A}"/>
               </a:ext>
             </a:extLst>
           </p:cNvPr>
@@ -7806,7 +8182,7 @@
           <p:cNvPr id="11" name="Picture 10">
             <a:extLst>
               <a:ext uri="{FF2B5EF4-FFF2-40B4-BE49-F238E27FC236}">
-                <a16:creationId xmlns:a16="http://schemas.microsoft.com/office/drawing/2014/main" xmlns="" id="{6A2D1D4E-E637-41B0-9A80-E88C62213FA5}"/>
+                <a16:creationId xmlns:a16="http://schemas.microsoft.com/office/drawing/2014/main" id="{6A2D1D4E-E637-41B0-9A80-E88C62213FA5}"/>
               </a:ext>
             </a:extLst>
           </p:cNvPr>
@@ -7842,7 +8218,7 @@
           <p:cNvPr id="12" name="Picture 11">
             <a:extLst>
               <a:ext uri="{FF2B5EF4-FFF2-40B4-BE49-F238E27FC236}">
-                <a16:creationId xmlns:a16="http://schemas.microsoft.com/office/drawing/2014/main" xmlns="" id="{7A664BF7-2BED-4529-AF18-7CD31084EDBC}"/>
+                <a16:creationId xmlns:a16="http://schemas.microsoft.com/office/drawing/2014/main" id="{7A664BF7-2BED-4529-AF18-7CD31084EDBC}"/>
               </a:ext>
             </a:extLst>
           </p:cNvPr>
@@ -7878,7 +8254,7 @@
           <p:cNvPr id="13" name="Picture 12" descr="Related image">
             <a:extLst>
               <a:ext uri="{FF2B5EF4-FFF2-40B4-BE49-F238E27FC236}">
-                <a16:creationId xmlns:a16="http://schemas.microsoft.com/office/drawing/2014/main" xmlns="" id="{D3474849-1B27-4378-8BAC-4A0E031BC269}"/>
+                <a16:creationId xmlns:a16="http://schemas.microsoft.com/office/drawing/2014/main" id="{D3474849-1B27-4378-8BAC-4A0E031BC269}"/>
               </a:ext>
             </a:extLst>
           </p:cNvPr>
@@ -7925,7 +8301,7 @@
           <p:cNvPr id="14" name="Picture 13">
             <a:extLst>
               <a:ext uri="{FF2B5EF4-FFF2-40B4-BE49-F238E27FC236}">
-                <a16:creationId xmlns:a16="http://schemas.microsoft.com/office/drawing/2014/main" xmlns="" id="{B94385D5-98B6-4AC7-B7CD-65B49EF4CA03}"/>
+                <a16:creationId xmlns:a16="http://schemas.microsoft.com/office/drawing/2014/main" id="{B94385D5-98B6-4AC7-B7CD-65B49EF4CA03}"/>
               </a:ext>
             </a:extLst>
           </p:cNvPr>
@@ -7961,7 +8337,7 @@
           <p:cNvPr id="15" name="Straight Connector 14">
             <a:extLst>
               <a:ext uri="{FF2B5EF4-FFF2-40B4-BE49-F238E27FC236}">
-                <a16:creationId xmlns:a16="http://schemas.microsoft.com/office/drawing/2014/main" xmlns="" id="{323884FB-A247-4387-9215-9A9E8470F2A0}"/>
+                <a16:creationId xmlns:a16="http://schemas.microsoft.com/office/drawing/2014/main" id="{323884FB-A247-4387-9215-9A9E8470F2A0}"/>
               </a:ext>
             </a:extLst>
           </p:cNvPr>
@@ -8000,7 +8376,7 @@
           <p:cNvPr id="16" name="Straight Connector 15">
             <a:extLst>
               <a:ext uri="{FF2B5EF4-FFF2-40B4-BE49-F238E27FC236}">
-                <a16:creationId xmlns:a16="http://schemas.microsoft.com/office/drawing/2014/main" xmlns="" id="{EDBCDB02-1877-48E1-8234-82F5C68048D2}"/>
+                <a16:creationId xmlns:a16="http://schemas.microsoft.com/office/drawing/2014/main" id="{EDBCDB02-1877-48E1-8234-82F5C68048D2}"/>
               </a:ext>
             </a:extLst>
           </p:cNvPr>
@@ -8039,7 +8415,7 @@
           <p:cNvPr id="17" name="Picture 16">
             <a:extLst>
               <a:ext uri="{FF2B5EF4-FFF2-40B4-BE49-F238E27FC236}">
-                <a16:creationId xmlns:a16="http://schemas.microsoft.com/office/drawing/2014/main" xmlns="" id="{E63422CD-2838-4A04-81ED-A278AEC41896}"/>
+                <a16:creationId xmlns:a16="http://schemas.microsoft.com/office/drawing/2014/main" id="{E63422CD-2838-4A04-81ED-A278AEC41896}"/>
               </a:ext>
             </a:extLst>
           </p:cNvPr>
@@ -8075,7 +8451,7 @@
           <p:cNvPr id="18" name="Straight Connector 17">
             <a:extLst>
               <a:ext uri="{FF2B5EF4-FFF2-40B4-BE49-F238E27FC236}">
-                <a16:creationId xmlns:a16="http://schemas.microsoft.com/office/drawing/2014/main" xmlns="" id="{33381917-C21F-4F2D-87AA-7E079E65AD3F}"/>
+                <a16:creationId xmlns:a16="http://schemas.microsoft.com/office/drawing/2014/main" id="{33381917-C21F-4F2D-87AA-7E079E65AD3F}"/>
               </a:ext>
             </a:extLst>
           </p:cNvPr>
@@ -8114,7 +8490,7 @@
           <p:cNvPr id="19" name="Rectangle: Rounded Corners 106">
             <a:extLst>
               <a:ext uri="{FF2B5EF4-FFF2-40B4-BE49-F238E27FC236}">
-                <a16:creationId xmlns:a16="http://schemas.microsoft.com/office/drawing/2014/main" xmlns="" id="{1A4C5F64-6070-4AA7-B3C8-B87CA784202B}"/>
+                <a16:creationId xmlns:a16="http://schemas.microsoft.com/office/drawing/2014/main" id="{1A4C5F64-6070-4AA7-B3C8-B87CA784202B}"/>
               </a:ext>
             </a:extLst>
           </p:cNvPr>
@@ -8268,7 +8644,7 @@
           <a:p>
             <a:pPr algn="ctr"/>
             <a:r>
-              <a:rPr lang="en-US" sz="1600" smtClean="0"/>
+              <a:rPr lang="en-US" sz="1600"/>
               <a:t>Automated Testing</a:t>
             </a:r>
             <a:endParaRPr lang="en-US" sz="1600" dirty="0"/>
@@ -8280,7 +8656,7 @@
           <p:cNvPr id="20" name="Picture 19">
             <a:extLst>
               <a:ext uri="{FF2B5EF4-FFF2-40B4-BE49-F238E27FC236}">
-                <a16:creationId xmlns:a16="http://schemas.microsoft.com/office/drawing/2014/main" xmlns="" id="{72721FF6-1EE4-4E1C-AD01-BC2F7761B051}"/>
+                <a16:creationId xmlns:a16="http://schemas.microsoft.com/office/drawing/2014/main" id="{72721FF6-1EE4-4E1C-AD01-BC2F7761B051}"/>
               </a:ext>
             </a:extLst>
           </p:cNvPr>
@@ -8316,7 +8692,7 @@
           <p:cNvPr id="21" name="Rectangle: Rounded Corners 108">
             <a:extLst>
               <a:ext uri="{FF2B5EF4-FFF2-40B4-BE49-F238E27FC236}">
-                <a16:creationId xmlns:a16="http://schemas.microsoft.com/office/drawing/2014/main" xmlns="" id="{40DDAFC7-2343-4D18-84DB-27D82A318D14}"/>
+                <a16:creationId xmlns:a16="http://schemas.microsoft.com/office/drawing/2014/main" id="{40DDAFC7-2343-4D18-84DB-27D82A318D14}"/>
               </a:ext>
             </a:extLst>
           </p:cNvPr>
@@ -8488,7 +8864,7 @@
           <p:cNvPr id="22" name="Rectangle: Rounded Corners 109">
             <a:extLst>
               <a:ext uri="{FF2B5EF4-FFF2-40B4-BE49-F238E27FC236}">
-                <a16:creationId xmlns:a16="http://schemas.microsoft.com/office/drawing/2014/main" xmlns="" id="{46AFC2AF-CFE6-4A1C-A681-9C5F8CDC4E08}"/>
+                <a16:creationId xmlns:a16="http://schemas.microsoft.com/office/drawing/2014/main" id="{46AFC2AF-CFE6-4A1C-A681-9C5F8CDC4E08}"/>
               </a:ext>
             </a:extLst>
           </p:cNvPr>
@@ -8653,7 +9029,7 @@
           <p:cNvPr id="23" name="Straight Connector 22">
             <a:extLst>
               <a:ext uri="{FF2B5EF4-FFF2-40B4-BE49-F238E27FC236}">
-                <a16:creationId xmlns:a16="http://schemas.microsoft.com/office/drawing/2014/main" xmlns="" id="{F3E1E8B7-7631-4D72-A00F-E23044A1BE1F}"/>
+                <a16:creationId xmlns:a16="http://schemas.microsoft.com/office/drawing/2014/main" id="{F3E1E8B7-7631-4D72-A00F-E23044A1BE1F}"/>
               </a:ext>
             </a:extLst>
           </p:cNvPr>
@@ -8692,7 +9068,7 @@
           <p:cNvPr id="24" name="Straight Connector 23">
             <a:extLst>
               <a:ext uri="{FF2B5EF4-FFF2-40B4-BE49-F238E27FC236}">
-                <a16:creationId xmlns:a16="http://schemas.microsoft.com/office/drawing/2014/main" xmlns="" id="{F663B159-7BFE-4C43-8BAD-54538C2CE6DE}"/>
+                <a16:creationId xmlns:a16="http://schemas.microsoft.com/office/drawing/2014/main" id="{F663B159-7BFE-4C43-8BAD-54538C2CE6DE}"/>
               </a:ext>
             </a:extLst>
           </p:cNvPr>
@@ -8731,7 +9107,7 @@
           <p:cNvPr id="25" name="Straight Connector 24">
             <a:extLst>
               <a:ext uri="{FF2B5EF4-FFF2-40B4-BE49-F238E27FC236}">
-                <a16:creationId xmlns:a16="http://schemas.microsoft.com/office/drawing/2014/main" xmlns="" id="{AB4FE091-356B-4BA5-B45C-01D19290C22F}"/>
+                <a16:creationId xmlns:a16="http://schemas.microsoft.com/office/drawing/2014/main" id="{AB4FE091-356B-4BA5-B45C-01D19290C22F}"/>
               </a:ext>
             </a:extLst>
           </p:cNvPr>
@@ -8770,7 +9146,7 @@
           <p:cNvPr id="26" name="Straight Connector 25">
             <a:extLst>
               <a:ext uri="{FF2B5EF4-FFF2-40B4-BE49-F238E27FC236}">
-                <a16:creationId xmlns:a16="http://schemas.microsoft.com/office/drawing/2014/main" xmlns="" id="{609F955E-CFBC-4484-ADFC-62A6ADD6D07B}"/>
+                <a16:creationId xmlns:a16="http://schemas.microsoft.com/office/drawing/2014/main" id="{609F955E-CFBC-4484-ADFC-62A6ADD6D07B}"/>
               </a:ext>
             </a:extLst>
           </p:cNvPr>
@@ -8809,7 +9185,7 @@
           <p:cNvPr id="27" name="Straight Connector 26">
             <a:extLst>
               <a:ext uri="{FF2B5EF4-FFF2-40B4-BE49-F238E27FC236}">
-                <a16:creationId xmlns:a16="http://schemas.microsoft.com/office/drawing/2014/main" xmlns="" id="{FDEA3AF4-4A30-4B3D-B6B2-0102418C87C1}"/>
+                <a16:creationId xmlns:a16="http://schemas.microsoft.com/office/drawing/2014/main" id="{FDEA3AF4-4A30-4B3D-B6B2-0102418C87C1}"/>
               </a:ext>
             </a:extLst>
           </p:cNvPr>
@@ -8848,7 +9224,7 @@
           <p:cNvPr id="28" name="Straight Connector 27">
             <a:extLst>
               <a:ext uri="{FF2B5EF4-FFF2-40B4-BE49-F238E27FC236}">
-                <a16:creationId xmlns:a16="http://schemas.microsoft.com/office/drawing/2014/main" xmlns="" id="{2F22BA16-D3B7-4B43-AFCE-ACF8AAE6F2AB}"/>
+                <a16:creationId xmlns:a16="http://schemas.microsoft.com/office/drawing/2014/main" id="{2F22BA16-D3B7-4B43-AFCE-ACF8AAE6F2AB}"/>
               </a:ext>
             </a:extLst>
           </p:cNvPr>
@@ -8887,7 +9263,7 @@
           <p:cNvPr id="29" name="Picture 28" descr="Related image">
             <a:extLst>
               <a:ext uri="{FF2B5EF4-FFF2-40B4-BE49-F238E27FC236}">
-                <a16:creationId xmlns:a16="http://schemas.microsoft.com/office/drawing/2014/main" xmlns="" id="{401ACDE4-B7D9-4196-A8AD-4186CA769FD5}"/>
+                <a16:creationId xmlns:a16="http://schemas.microsoft.com/office/drawing/2014/main" id="{401ACDE4-B7D9-4196-A8AD-4186CA769FD5}"/>
               </a:ext>
             </a:extLst>
           </p:cNvPr>
@@ -8919,7 +9295,7 @@
           <p:cNvPr id="30" name="Picture 29" descr="Image result for slack icon">
             <a:extLst>
               <a:ext uri="{FF2B5EF4-FFF2-40B4-BE49-F238E27FC236}">
-                <a16:creationId xmlns:a16="http://schemas.microsoft.com/office/drawing/2014/main" xmlns="" id="{3B4F4157-5C39-468E-B4EB-4D9FFA4C75D1}"/>
+                <a16:creationId xmlns:a16="http://schemas.microsoft.com/office/drawing/2014/main" id="{3B4F4157-5C39-468E-B4EB-4D9FFA4C75D1}"/>
               </a:ext>
             </a:extLst>
           </p:cNvPr>
@@ -8951,7 +9327,7 @@
           <p:cNvPr id="31" name="Picture 30" descr="Image result for Zoom.us icon">
             <a:extLst>
               <a:ext uri="{FF2B5EF4-FFF2-40B4-BE49-F238E27FC236}">
-                <a16:creationId xmlns:a16="http://schemas.microsoft.com/office/drawing/2014/main" xmlns="" id="{2F2E3B5D-CE69-4ADA-A498-65222952DD56}"/>
+                <a16:creationId xmlns:a16="http://schemas.microsoft.com/office/drawing/2014/main" id="{2F2E3B5D-CE69-4ADA-A498-65222952DD56}"/>
               </a:ext>
             </a:extLst>
           </p:cNvPr>
@@ -8983,7 +9359,7 @@
           <p:cNvPr id="32" name="Picture 31">
             <a:extLst>
               <a:ext uri="{FF2B5EF4-FFF2-40B4-BE49-F238E27FC236}">
-                <a16:creationId xmlns:a16="http://schemas.microsoft.com/office/drawing/2014/main" xmlns="" id="{A272410F-9916-48B3-AAB7-2F12300A37B1}"/>
+                <a16:creationId xmlns:a16="http://schemas.microsoft.com/office/drawing/2014/main" id="{A272410F-9916-48B3-AAB7-2F12300A37B1}"/>
               </a:ext>
             </a:extLst>
           </p:cNvPr>
@@ -9022,7 +9398,7 @@
           <p:cNvPr id="33" name="TextBox 60">
             <a:extLst>
               <a:ext uri="{FF2B5EF4-FFF2-40B4-BE49-F238E27FC236}">
-                <a16:creationId xmlns:a16="http://schemas.microsoft.com/office/drawing/2014/main" xmlns="" id="{E61ACCCE-3C6E-46EB-B66E-50745C51DE4A}"/>
+                <a16:creationId xmlns:a16="http://schemas.microsoft.com/office/drawing/2014/main" id="{E61ACCCE-3C6E-46EB-B66E-50745C51DE4A}"/>
               </a:ext>
             </a:extLst>
           </p:cNvPr>
@@ -9176,7 +9552,7 @@
           <a:p>
             <a:pPr algn="ctr"/>
             <a:r>
-              <a:rPr lang="en-IE" sz="1400" dirty="0" err="1" smtClean="0">
+              <a:rPr lang="en-IE" sz="1400" dirty="0" err="1">
                 <a:solidFill>
                   <a:schemeClr val="bg1"/>
                 </a:solidFill>
@@ -9192,7 +9568,7 @@
               <a:t>Performce</a:t>
             </a:r>
             <a:r>
-              <a:rPr lang="en-IE" sz="1400" dirty="0" smtClean="0">
+              <a:rPr lang="en-IE" sz="1400" dirty="0">
                 <a:solidFill>
                   <a:schemeClr val="bg1"/>
                 </a:solidFill>
@@ -9205,23 +9581,7 @@
                 </a:effectLst>
                 <a:latin typeface="Britannic Bold" pitchFamily="34" charset="0"/>
               </a:rPr>
-              <a:t> </a:t>
-            </a:r>
-            <a:r>
-              <a:rPr lang="en-IE" sz="1400" dirty="0">
-                <a:solidFill>
-                  <a:schemeClr val="bg1"/>
-                </a:solidFill>
-                <a:effectLst>
-                  <a:outerShdw blurRad="38100" dist="38100" dir="2700000" algn="tl">
-                    <a:srgbClr val="000000">
-                      <a:alpha val="43137"/>
-                    </a:srgbClr>
-                  </a:outerShdw>
-                </a:effectLst>
-                <a:latin typeface="Britannic Bold" pitchFamily="34" charset="0"/>
-              </a:rPr>
-              <a:t>Tests</a:t>
+              <a:t> Tests</a:t>
             </a:r>
           </a:p>
         </p:txBody>
@@ -9231,7 +9591,7 @@
           <p:cNvPr id="34" name="Picture 33" descr="Related image">
             <a:extLst>
               <a:ext uri="{FF2B5EF4-FFF2-40B4-BE49-F238E27FC236}">
-                <a16:creationId xmlns:a16="http://schemas.microsoft.com/office/drawing/2014/main" xmlns="" id="{008D268E-D1DB-43FB-9F12-C5E2CCA12318}"/>
+                <a16:creationId xmlns:a16="http://schemas.microsoft.com/office/drawing/2014/main" id="{008D268E-D1DB-43FB-9F12-C5E2CCA12318}"/>
               </a:ext>
             </a:extLst>
           </p:cNvPr>
@@ -9263,7 +9623,7 @@
           <p:cNvPr id="35" name="Picture 34" descr="Related image">
             <a:extLst>
               <a:ext uri="{FF2B5EF4-FFF2-40B4-BE49-F238E27FC236}">
-                <a16:creationId xmlns:a16="http://schemas.microsoft.com/office/drawing/2014/main" xmlns="" id="{4861B1E8-4350-452C-B15F-DCAF10295865}"/>
+                <a16:creationId xmlns:a16="http://schemas.microsoft.com/office/drawing/2014/main" id="{4861B1E8-4350-452C-B15F-DCAF10295865}"/>
               </a:ext>
             </a:extLst>
           </p:cNvPr>
@@ -9295,7 +9655,7 @@
           <p:cNvPr id="36" name="Picture 35" descr="Related image">
             <a:extLst>
               <a:ext uri="{FF2B5EF4-FFF2-40B4-BE49-F238E27FC236}">
-                <a16:creationId xmlns:a16="http://schemas.microsoft.com/office/drawing/2014/main" xmlns="" id="{5019FCB9-A345-42F5-9602-81AE2CA39175}"/>
+                <a16:creationId xmlns:a16="http://schemas.microsoft.com/office/drawing/2014/main" id="{5019FCB9-A345-42F5-9602-81AE2CA39175}"/>
               </a:ext>
             </a:extLst>
           </p:cNvPr>
@@ -9327,7 +9687,7 @@
           <p:cNvPr id="38" name="Picture 37" descr="Image result for monit icon images">
             <a:extLst>
               <a:ext uri="{FF2B5EF4-FFF2-40B4-BE49-F238E27FC236}">
-                <a16:creationId xmlns:a16="http://schemas.microsoft.com/office/drawing/2014/main" xmlns="" id="{AAFFF1A1-64CD-49A6-8815-15B8508ADC74}"/>
+                <a16:creationId xmlns:a16="http://schemas.microsoft.com/office/drawing/2014/main" id="{AAFFF1A1-64CD-49A6-8815-15B8508ADC74}"/>
               </a:ext>
             </a:extLst>
           </p:cNvPr>
@@ -9428,13 +9788,6 @@
   <p:clrMapOvr>
     <a:masterClrMapping/>
   </p:clrMapOvr>
-  <p:timing>
-    <p:tnLst>
-      <p:par>
-        <p:cTn id="1" dur="indefinite" restart="never" nodeType="tmRoot"/>
-      </p:par>
-    </p:tnLst>
-  </p:timing>
 </p:sld>
 </file>
 
@@ -9505,7 +9858,7 @@
           <p:cNvPr id="2" name="Title 1">
             <a:extLst>
               <a:ext uri="{FF2B5EF4-FFF2-40B4-BE49-F238E27FC236}">
-                <a16:creationId xmlns:a16="http://schemas.microsoft.com/office/drawing/2014/main" xmlns="" id="{D2213D03-BB56-4285-96A8-A7901DD60035}"/>
+                <a16:creationId xmlns:a16="http://schemas.microsoft.com/office/drawing/2014/main" id="{D2213D03-BB56-4285-96A8-A7901DD60035}"/>
               </a:ext>
             </a:extLst>
           </p:cNvPr>
@@ -9527,16 +9880,12 @@
           <a:lstStyle/>
           <a:p>
             <a:r>
-              <a:rPr lang="en-US" b="1" dirty="0" err="1" smtClean="0"/>
+              <a:rPr lang="en-US" b="1" dirty="0" err="1"/>
               <a:t>CrowSoft</a:t>
             </a:r>
             <a:r>
-              <a:rPr lang="en-US" b="1" dirty="0" smtClean="0"/>
-              <a:t> Agile </a:t>
-            </a:r>
-            <a:r>
               <a:rPr lang="en-US" b="1" dirty="0"/>
-              <a:t>Process</a:t>
+              <a:t> Agile Process</a:t>
             </a:r>
           </a:p>
         </p:txBody>
@@ -9546,7 +9895,7 @@
           <p:cNvPr id="4" name="Content Placeholder 3">
             <a:extLst>
               <a:ext uri="{FF2B5EF4-FFF2-40B4-BE49-F238E27FC236}">
-                <a16:creationId xmlns:a16="http://schemas.microsoft.com/office/drawing/2014/main" xmlns="" id="{88EACB63-DCE3-4A41-A128-3B53822C87AD}"/>
+                <a16:creationId xmlns:a16="http://schemas.microsoft.com/office/drawing/2014/main" id="{88EACB63-DCE3-4A41-A128-3B53822C87AD}"/>
               </a:ext>
             </a:extLst>
           </p:cNvPr>
@@ -9650,7 +9999,7 @@
           <p:cNvPr id="7" name="Picture 6">
             <a:extLst>
               <a:ext uri="{FF2B5EF4-FFF2-40B4-BE49-F238E27FC236}">
-                <a16:creationId xmlns:a16="http://schemas.microsoft.com/office/drawing/2014/main" xmlns="" id="{B94385D5-98B6-4AC7-B7CD-65B49EF4CA03}"/>
+                <a16:creationId xmlns:a16="http://schemas.microsoft.com/office/drawing/2014/main" id="{B94385D5-98B6-4AC7-B7CD-65B49EF4CA03}"/>
               </a:ext>
             </a:extLst>
           </p:cNvPr>
@@ -9691,13 +10040,6 @@
   <p:clrMapOvr>
     <a:masterClrMapping/>
   </p:clrMapOvr>
-  <p:timing>
-    <p:tnLst>
-      <p:par>
-        <p:cTn id="1" dur="indefinite" restart="never" nodeType="tmRoot"/>
-      </p:par>
-    </p:tnLst>
-  </p:timing>
 </p:sld>
 </file>
 
@@ -9739,10 +10081,9 @@
           <a:lstStyle/>
           <a:p>
             <a:r>
-              <a:rPr lang="en-IE" dirty="0" smtClean="0"/>
+              <a:rPr lang="en-IE" dirty="0"/>
               <a:t>JIRA Sprint</a:t>
             </a:r>
-            <a:endParaRPr lang="en-IE" dirty="0"/>
           </a:p>
         </p:txBody>
       </p:sp>
@@ -9874,10 +10215,9 @@
           <a:lstStyle/>
           <a:p>
             <a:r>
-              <a:rPr lang="en-IE" b="1" dirty="0" smtClean="0"/>
+              <a:rPr lang="en-IE" b="1" dirty="0"/>
               <a:t>Retrospective</a:t>
             </a:r>
-            <a:endParaRPr lang="en-IE" b="1" dirty="0"/>
           </a:p>
         </p:txBody>
       </p:sp>
@@ -10000,7 +10340,7 @@
           <a:p>
             <a:pPr algn="ctr"/>
             <a:r>
-              <a:rPr lang="en-IE" sz="1200" dirty="0" smtClean="0">
+              <a:rPr lang="en-IE" sz="1200" dirty="0">
                 <a:latin typeface="Courier New" panose="02070309020205020404" pitchFamily="49" charset="0"/>
                 <a:cs typeface="Courier New" panose="02070309020205020404" pitchFamily="49" charset="0"/>
               </a:rPr>
@@ -10010,14 +10350,14 @@
           <a:p>
             <a:pPr algn="ctr"/>
             <a:r>
-              <a:rPr lang="en-IE" sz="1200" dirty="0" smtClean="0">
+              <a:rPr lang="en-IE" sz="1200" dirty="0">
                 <a:latin typeface="Courier New" panose="02070309020205020404" pitchFamily="49" charset="0"/>
                 <a:cs typeface="Courier New" panose="02070309020205020404" pitchFamily="49" charset="0"/>
               </a:rPr>
               <a:t>/</a:t>
             </a:r>
             <a:r>
-              <a:rPr lang="en-IE" sz="1200" dirty="0" err="1" smtClean="0">
+              <a:rPr lang="en-IE" sz="1200" dirty="0" err="1">
                 <a:latin typeface="Courier New" panose="02070309020205020404" pitchFamily="49" charset="0"/>
                 <a:cs typeface="Courier New" panose="02070309020205020404" pitchFamily="49" charset="0"/>
               </a:rPr>
@@ -10031,20 +10371,20 @@
           <a:p>
             <a:pPr algn="ctr"/>
             <a:r>
-              <a:rPr lang="en-IE" sz="1200" dirty="0" smtClean="0">
+              <a:rPr lang="en-IE" sz="1200" dirty="0">
                 <a:latin typeface="Courier New" panose="02070309020205020404" pitchFamily="49" charset="0"/>
                 <a:cs typeface="Courier New" panose="02070309020205020404" pitchFamily="49" charset="0"/>
               </a:rPr>
               <a:t>/</a:t>
             </a:r>
             <a:r>
-              <a:rPr lang="en-IE" sz="1200" dirty="0" err="1" smtClean="0">
+              <a:rPr lang="en-IE" sz="1200" dirty="0" err="1">
                 <a:latin typeface="Courier New" panose="02070309020205020404" pitchFamily="49" charset="0"/>
                 <a:cs typeface="Courier New" panose="02070309020205020404" pitchFamily="49" charset="0"/>
               </a:rPr>
               <a:t>CrowSoft</a:t>
             </a:r>
-            <a:endParaRPr lang="en-IE" sz="1200" dirty="0" smtClean="0">
+            <a:endParaRPr lang="en-IE" sz="1200" dirty="0">
               <a:latin typeface="Courier New" panose="02070309020205020404" pitchFamily="49" charset="0"/>
               <a:cs typeface="Courier New" panose="02070309020205020404" pitchFamily="49" charset="0"/>
             </a:endParaRPr>
@@ -10052,16 +10392,12 @@
           <a:p>
             <a:pPr algn="ctr"/>
             <a:r>
-              <a:rPr lang="en-IE" sz="1200" dirty="0" smtClean="0">
+              <a:rPr lang="en-IE" sz="1200" dirty="0">
                 <a:latin typeface="Courier New" panose="02070309020205020404" pitchFamily="49" charset="0"/>
                 <a:cs typeface="Courier New" panose="02070309020205020404" pitchFamily="49" charset="0"/>
               </a:rPr>
               <a:t> </a:t>
             </a:r>
-            <a:endParaRPr lang="en-IE" sz="1200" dirty="0">
-              <a:latin typeface="Courier New" panose="02070309020205020404" pitchFamily="49" charset="0"/>
-              <a:cs typeface="Courier New" panose="02070309020205020404" pitchFamily="49" charset="0"/>
-            </a:endParaRPr>
           </a:p>
         </p:txBody>
       </p:sp>
@@ -10207,7 +10543,7 @@
           <a:p>
             <a:pPr algn="ctr"/>
             <a:r>
-              <a:rPr lang="en-IE" sz="1400" dirty="0" smtClean="0">
+              <a:rPr lang="en-IE" sz="1400" dirty="0">
                 <a:latin typeface="Courier New" panose="02070309020205020404" pitchFamily="49" charset="0"/>
                 <a:cs typeface="Courier New" panose="02070309020205020404" pitchFamily="49" charset="0"/>
               </a:rPr>
@@ -10217,7 +10553,7 @@
           <a:p>
             <a:pPr algn="ctr"/>
             <a:r>
-              <a:rPr lang="en-IE" sz="1400" dirty="0" smtClean="0">
+              <a:rPr lang="en-IE" sz="1400" dirty="0">
                 <a:latin typeface="Courier New" panose="02070309020205020404" pitchFamily="49" charset="0"/>
                 <a:cs typeface="Courier New" panose="02070309020205020404" pitchFamily="49" charset="0"/>
               </a:rPr>
@@ -10227,7 +10563,7 @@
           <a:p>
             <a:pPr algn="ctr"/>
             <a:r>
-              <a:rPr lang="en-IE" sz="1400" dirty="0" smtClean="0">
+              <a:rPr lang="en-IE" sz="1400" dirty="0">
                 <a:latin typeface="Courier New" panose="02070309020205020404" pitchFamily="49" charset="0"/>
                 <a:cs typeface="Courier New" panose="02070309020205020404" pitchFamily="49" charset="0"/>
               </a:rPr>
@@ -10237,7 +10573,7 @@
           <a:p>
             <a:pPr algn="ctr"/>
             <a:r>
-              <a:rPr lang="en-IE" sz="1400" dirty="0" smtClean="0">
+              <a:rPr lang="en-IE" sz="1400" dirty="0">
                 <a:latin typeface="Courier New" panose="02070309020205020404" pitchFamily="49" charset="0"/>
                 <a:cs typeface="Courier New" panose="02070309020205020404" pitchFamily="49" charset="0"/>
               </a:rPr>
@@ -10247,7 +10583,7 @@
           <a:p>
             <a:pPr algn="ctr"/>
             <a:r>
-              <a:rPr lang="en-IE" sz="1400" dirty="0" smtClean="0">
+              <a:rPr lang="en-IE" sz="1400" dirty="0">
                 <a:latin typeface="Courier New" panose="02070309020205020404" pitchFamily="49" charset="0"/>
                 <a:cs typeface="Courier New" panose="02070309020205020404" pitchFamily="49" charset="0"/>
               </a:rPr>
@@ -10257,13 +10593,13 @@
           <a:p>
             <a:pPr algn="ctr"/>
             <a:r>
-              <a:rPr lang="en-IE" sz="1400" dirty="0" err="1" smtClean="0">
+              <a:rPr lang="en-IE" sz="1400" dirty="0" err="1">
                 <a:latin typeface="Courier New" panose="02070309020205020404" pitchFamily="49" charset="0"/>
                 <a:cs typeface="Courier New" panose="02070309020205020404" pitchFamily="49" charset="0"/>
               </a:rPr>
               <a:t>Ansible</a:t>
             </a:r>
-            <a:endParaRPr lang="en-IE" sz="1400" dirty="0" smtClean="0">
+            <a:endParaRPr lang="en-IE" sz="1400" dirty="0">
               <a:latin typeface="Courier New" panose="02070309020205020404" pitchFamily="49" charset="0"/>
               <a:cs typeface="Courier New" panose="02070309020205020404" pitchFamily="49" charset="0"/>
             </a:endParaRPr>
@@ -10271,27 +10607,27 @@
           <a:p>
             <a:pPr algn="ctr"/>
             <a:r>
-              <a:rPr lang="en-IE" sz="1400" dirty="0" err="1" smtClean="0">
+              <a:rPr lang="en-IE" sz="1400" dirty="0" err="1">
                 <a:latin typeface="Courier New" panose="02070309020205020404" pitchFamily="49" charset="0"/>
                 <a:cs typeface="Courier New" panose="02070309020205020404" pitchFamily="49" charset="0"/>
               </a:rPr>
               <a:t>Jfrog</a:t>
             </a:r>
             <a:r>
-              <a:rPr lang="en-IE" sz="1400" dirty="0" smtClean="0">
+              <a:rPr lang="en-IE" sz="1400" dirty="0">
                 <a:latin typeface="Courier New" panose="02070309020205020404" pitchFamily="49" charset="0"/>
                 <a:cs typeface="Courier New" panose="02070309020205020404" pitchFamily="49" charset="0"/>
               </a:rPr>
               <a:t> </a:t>
             </a:r>
             <a:r>
-              <a:rPr lang="en-IE" sz="1400" dirty="0" err="1" smtClean="0">
+              <a:rPr lang="en-IE" sz="1400" dirty="0" err="1">
                 <a:latin typeface="Courier New" panose="02070309020205020404" pitchFamily="49" charset="0"/>
                 <a:cs typeface="Courier New" panose="02070309020205020404" pitchFamily="49" charset="0"/>
               </a:rPr>
               <a:t>Artifactory</a:t>
             </a:r>
-            <a:endParaRPr lang="en-IE" sz="1400" dirty="0" smtClean="0">
+            <a:endParaRPr lang="en-IE" sz="1400" dirty="0">
               <a:latin typeface="Courier New" panose="02070309020205020404" pitchFamily="49" charset="0"/>
               <a:cs typeface="Courier New" panose="02070309020205020404" pitchFamily="49" charset="0"/>
             </a:endParaRPr>
@@ -10299,7 +10635,7 @@
           <a:p>
             <a:pPr algn="ctr"/>
             <a:r>
-              <a:rPr lang="en-IE" sz="1400" dirty="0" smtClean="0">
+              <a:rPr lang="en-IE" sz="1400" dirty="0">
                 <a:latin typeface="Courier New" panose="02070309020205020404" pitchFamily="49" charset="0"/>
                 <a:cs typeface="Courier New" panose="02070309020205020404" pitchFamily="49" charset="0"/>
               </a:rPr>
@@ -10347,7 +10683,7 @@
           <a:p>
             <a:pPr algn="ctr"/>
             <a:r>
-              <a:rPr lang="en-IE" sz="1400" dirty="0" smtClean="0">
+              <a:rPr lang="en-IE" sz="1400" dirty="0">
                 <a:latin typeface="Courier New" panose="02070309020205020404" pitchFamily="49" charset="0"/>
                 <a:cs typeface="Courier New" panose="02070309020205020404" pitchFamily="49" charset="0"/>
               </a:rPr>
@@ -10357,7 +10693,7 @@
           <a:p>
             <a:pPr algn="ctr"/>
             <a:r>
-              <a:rPr lang="en-IE" sz="1400" dirty="0" smtClean="0">
+              <a:rPr lang="en-IE" sz="1400" dirty="0">
                 <a:latin typeface="Courier New" panose="02070309020205020404" pitchFamily="49" charset="0"/>
                 <a:cs typeface="Courier New" panose="02070309020205020404" pitchFamily="49" charset="0"/>
               </a:rPr>
@@ -10367,7 +10703,7 @@
           <a:p>
             <a:pPr algn="ctr"/>
             <a:r>
-              <a:rPr lang="en-IE" sz="1400" dirty="0" smtClean="0">
+              <a:rPr lang="en-IE" sz="1400" dirty="0">
                 <a:latin typeface="Courier New" panose="02070309020205020404" pitchFamily="49" charset="0"/>
                 <a:cs typeface="Courier New" panose="02070309020205020404" pitchFamily="49" charset="0"/>
               </a:rPr>
@@ -10377,13 +10713,13 @@
           <a:p>
             <a:pPr algn="ctr"/>
             <a:r>
-              <a:rPr lang="en-IE" sz="1400" dirty="0" err="1" smtClean="0">
+              <a:rPr lang="en-IE" sz="1400" dirty="0" err="1">
                 <a:latin typeface="Courier New" panose="02070309020205020404" pitchFamily="49" charset="0"/>
                 <a:cs typeface="Courier New" panose="02070309020205020404" pitchFamily="49" charset="0"/>
               </a:rPr>
               <a:t>Nunit</a:t>
             </a:r>
-            <a:endParaRPr lang="en-IE" sz="1400" dirty="0" smtClean="0">
+            <a:endParaRPr lang="en-IE" sz="1400" dirty="0">
               <a:latin typeface="Courier New" panose="02070309020205020404" pitchFamily="49" charset="0"/>
               <a:cs typeface="Courier New" panose="02070309020205020404" pitchFamily="49" charset="0"/>
             </a:endParaRPr>
@@ -10391,13 +10727,13 @@
           <a:p>
             <a:pPr algn="ctr"/>
             <a:r>
-              <a:rPr lang="en-IE" sz="1400" dirty="0" err="1" smtClean="0">
+              <a:rPr lang="en-IE" sz="1400" dirty="0" err="1">
                 <a:latin typeface="Courier New" panose="02070309020205020404" pitchFamily="49" charset="0"/>
                 <a:cs typeface="Courier New" panose="02070309020205020404" pitchFamily="49" charset="0"/>
               </a:rPr>
               <a:t>Monit</a:t>
             </a:r>
-            <a:endParaRPr lang="en-IE" sz="1400" dirty="0" smtClean="0">
+            <a:endParaRPr lang="en-IE" sz="1400" dirty="0">
               <a:latin typeface="Courier New" panose="02070309020205020404" pitchFamily="49" charset="0"/>
               <a:cs typeface="Courier New" panose="02070309020205020404" pitchFamily="49" charset="0"/>
             </a:endParaRPr>
@@ -10405,7 +10741,7 @@
           <a:p>
             <a:pPr algn="ctr"/>
             <a:r>
-              <a:rPr lang="en-IE" sz="1400" dirty="0" smtClean="0">
+              <a:rPr lang="en-IE" sz="1400" dirty="0">
                 <a:latin typeface="Courier New" panose="02070309020205020404" pitchFamily="49" charset="0"/>
                 <a:cs typeface="Courier New" panose="02070309020205020404" pitchFamily="49" charset="0"/>
               </a:rPr>
@@ -10415,23 +10751,19 @@
           <a:p>
             <a:pPr algn="ctr"/>
             <a:r>
-              <a:rPr lang="en-IE" sz="1400" dirty="0" err="1" smtClean="0">
+              <a:rPr lang="en-IE" sz="1400" dirty="0" err="1">
                 <a:latin typeface="Courier New" panose="02070309020205020404" pitchFamily="49" charset="0"/>
                 <a:cs typeface="Courier New" panose="02070309020205020404" pitchFamily="49" charset="0"/>
               </a:rPr>
               <a:t>Wk</a:t>
             </a:r>
             <a:r>
-              <a:rPr lang="en-IE" sz="1400" dirty="0" smtClean="0">
+              <a:rPr lang="en-IE" sz="1400" dirty="0">
                 <a:latin typeface="Courier New" panose="02070309020205020404" pitchFamily="49" charset="0"/>
                 <a:cs typeface="Courier New" panose="02070309020205020404" pitchFamily="49" charset="0"/>
               </a:rPr>
               <a:t> Per. Tests</a:t>
             </a:r>
-            <a:endParaRPr lang="en-IE" sz="1400" dirty="0">
-              <a:latin typeface="Courier New" panose="02070309020205020404" pitchFamily="49" charset="0"/>
-              <a:cs typeface="Courier New" panose="02070309020205020404" pitchFamily="49" charset="0"/>
-            </a:endParaRPr>
           </a:p>
         </p:txBody>
       </p:sp>
@@ -10545,7 +10877,7 @@
           <p:cNvPr id="2" name="Title 1">
             <a:extLst>
               <a:ext uri="{FF2B5EF4-FFF2-40B4-BE49-F238E27FC236}">
-                <a16:creationId xmlns:a16="http://schemas.microsoft.com/office/drawing/2014/main" xmlns="" id="{F80389EE-9E58-48FF-89C5-3FBADBA31B30}"/>
+                <a16:creationId xmlns:a16="http://schemas.microsoft.com/office/drawing/2014/main" id="{F80389EE-9E58-48FF-89C5-3FBADBA31B30}"/>
               </a:ext>
             </a:extLst>
           </p:cNvPr>
@@ -10569,16 +10901,10 @@
           <a:lstStyle/>
           <a:p>
             <a:r>
-              <a:rPr lang="en-US" sz="2200" b="1" dirty="0" smtClean="0">
+              <a:rPr lang="en-US" sz="2200" b="1" dirty="0">
                 <a:effectLst/>
               </a:rPr>
               <a:t>Development Environment </a:t>
-            </a:r>
-            <a:r>
-              <a:rPr lang="en-US" b="1" dirty="0">
-                <a:effectLst/>
-              </a:rPr>
-              <a:t/>
             </a:r>
             <a:br>
               <a:rPr lang="en-US" b="1" dirty="0">
@@ -10613,16 +10939,12 @@
           <a:p>
             <a:pPr algn="ctr"/>
             <a:r>
-              <a:rPr lang="en-IE" b="1" dirty="0" smtClean="0">
+              <a:rPr lang="en-IE" b="1" dirty="0">
                 <a:latin typeface="Courier New" panose="02070309020205020404" pitchFamily="49" charset="0"/>
                 <a:cs typeface="Courier New" panose="02070309020205020404" pitchFamily="49" charset="0"/>
               </a:rPr>
               <a:t>Dev Server</a:t>
             </a:r>
-            <a:endParaRPr lang="en-IE" b="1" dirty="0">
-              <a:latin typeface="Courier New" panose="02070309020205020404" pitchFamily="49" charset="0"/>
-              <a:cs typeface="Courier New" panose="02070309020205020404" pitchFamily="49" charset="0"/>
-            </a:endParaRPr>
           </a:p>
         </p:txBody>
       </p:sp>
@@ -10650,16 +10972,12 @@
           <a:p>
             <a:pPr algn="ctr"/>
             <a:r>
-              <a:rPr lang="en-IE" b="1" dirty="0" smtClean="0">
+              <a:rPr lang="en-IE" b="1" dirty="0">
                 <a:latin typeface="Courier New" panose="02070309020205020404" pitchFamily="49" charset="0"/>
                 <a:cs typeface="Courier New" panose="02070309020205020404" pitchFamily="49" charset="0"/>
               </a:rPr>
               <a:t>Jenkins Server</a:t>
             </a:r>
-            <a:endParaRPr lang="en-IE" b="1" dirty="0">
-              <a:latin typeface="Courier New" panose="02070309020205020404" pitchFamily="49" charset="0"/>
-              <a:cs typeface="Courier New" panose="02070309020205020404" pitchFamily="49" charset="0"/>
-            </a:endParaRPr>
           </a:p>
         </p:txBody>
       </p:sp>
@@ -10814,7 +11132,7 @@
           <a:lstStyle/>
           <a:p>
             <a:r>
-              <a:rPr lang="en-IE" sz="2000" b="1" dirty="0" smtClean="0">
+              <a:rPr lang="en-IE" sz="2000" b="1" dirty="0">
                 <a:solidFill>
                   <a:schemeClr val="bg1"/>
                 </a:solidFill>
@@ -10823,13 +11141,6 @@
               </a:rPr>
               <a:t>Testing</a:t>
             </a:r>
-            <a:endParaRPr lang="en-IE" sz="2000" b="1" dirty="0">
-              <a:solidFill>
-                <a:schemeClr val="bg1"/>
-              </a:solidFill>
-              <a:latin typeface="Courier New" panose="02070309020205020404" pitchFamily="49" charset="0"/>
-              <a:cs typeface="Courier New" panose="02070309020205020404" pitchFamily="49" charset="0"/>
-            </a:endParaRPr>
           </a:p>
         </p:txBody>
       </p:sp>
@@ -10856,7 +11167,7 @@
           <a:lstStyle/>
           <a:p>
             <a:r>
-              <a:rPr lang="en-IE" sz="2400" b="1" dirty="0" smtClean="0">
+              <a:rPr lang="en-IE" sz="2400" b="1" dirty="0">
                 <a:solidFill>
                   <a:schemeClr val="bg1"/>
                 </a:solidFill>
@@ -10865,13 +11176,6 @@
               </a:rPr>
               <a:t>Live</a:t>
             </a:r>
-            <a:endParaRPr lang="en-IE" sz="2400" b="1" dirty="0">
-              <a:solidFill>
-                <a:schemeClr val="bg1"/>
-              </a:solidFill>
-              <a:latin typeface="Courier New" panose="02070309020205020404" pitchFamily="49" charset="0"/>
-              <a:cs typeface="Courier New" panose="02070309020205020404" pitchFamily="49" charset="0"/>
-            </a:endParaRPr>
           </a:p>
         </p:txBody>
       </p:sp>
@@ -11155,13 +11459,6 @@
   <p:clrMapOvr>
     <a:masterClrMapping/>
   </p:clrMapOvr>
-  <p:timing>
-    <p:tnLst>
-      <p:par>
-        <p:cTn id="1" dur="indefinite" restart="never" nodeType="tmRoot"/>
-      </p:par>
-    </p:tnLst>
-  </p:timing>
 </p:sld>
 </file>
 
@@ -11203,10 +11500,9 @@
           <a:lstStyle/>
           <a:p>
             <a:r>
-              <a:rPr lang="en-IE" dirty="0" smtClean="0"/>
+              <a:rPr lang="en-IE" dirty="0"/>
               <a:t>DevOps Pipeline</a:t>
             </a:r>
-            <a:endParaRPr lang="en-IE" dirty="0"/>
           </a:p>
         </p:txBody>
       </p:sp>
@@ -11299,7 +11595,7 @@
           <p:cNvPr id="2" name="Title 1">
             <a:extLst>
               <a:ext uri="{FF2B5EF4-FFF2-40B4-BE49-F238E27FC236}">
-                <a16:creationId xmlns:a16="http://schemas.microsoft.com/office/drawing/2014/main" xmlns="" id="{7D9F7F4A-86AD-47F3-BFAB-E016FC5547ED}"/>
+                <a16:creationId xmlns:a16="http://schemas.microsoft.com/office/drawing/2014/main" id="{7D9F7F4A-86AD-47F3-BFAB-E016FC5547ED}"/>
               </a:ext>
             </a:extLst>
           </p:cNvPr>
@@ -11321,7 +11617,7 @@
           <a:lstStyle/>
           <a:p>
             <a:r>
-              <a:rPr lang="en-US" b="1" dirty="0" smtClean="0">
+              <a:rPr lang="en-US" b="1" dirty="0">
                 <a:effectLst/>
               </a:rPr>
               <a:t>Software Stack </a:t>
@@ -11335,7 +11631,7 @@
           <p:cNvPr id="3" name="Content Placeholder 2">
             <a:extLst>
               <a:ext uri="{FF2B5EF4-FFF2-40B4-BE49-F238E27FC236}">
-                <a16:creationId xmlns:a16="http://schemas.microsoft.com/office/drawing/2014/main" xmlns="" id="{4B67892F-7F4B-4080-AB9E-8D9B3675FD68}"/>
+                <a16:creationId xmlns:a16="http://schemas.microsoft.com/office/drawing/2014/main" id="{4B67892F-7F4B-4080-AB9E-8D9B3675FD68}"/>
               </a:ext>
             </a:extLst>
           </p:cNvPr>
@@ -11462,7 +11758,7 @@
           <p:cNvPr id="7" name="Title 1">
             <a:extLst>
               <a:ext uri="{FF2B5EF4-FFF2-40B4-BE49-F238E27FC236}">
-                <a16:creationId xmlns:a16="http://schemas.microsoft.com/office/drawing/2014/main" xmlns="" id="{7D9F7F4A-86AD-47F3-BFAB-E016FC5547ED}"/>
+                <a16:creationId xmlns:a16="http://schemas.microsoft.com/office/drawing/2014/main" id="{7D9F7F4A-86AD-47F3-BFAB-E016FC5547ED}"/>
               </a:ext>
             </a:extLst>
           </p:cNvPr>
@@ -11586,7 +11882,7 @@
           </a:lstStyle>
           <a:p>
             <a:r>
-              <a:rPr lang="en-US" b="1" dirty="0" smtClean="0">
+              <a:rPr lang="en-US" b="1" dirty="0">
                 <a:effectLst/>
               </a:rPr>
               <a:t>Infrastructure</a:t>
@@ -11605,13 +11901,6 @@
   <p:clrMapOvr>
     <a:masterClrMapping/>
   </p:clrMapOvr>
-  <p:timing>
-    <p:tnLst>
-      <p:par>
-        <p:cTn id="1" dur="indefinite" restart="never" nodeType="tmRoot"/>
-      </p:par>
-    </p:tnLst>
-  </p:timing>
 </p:sld>
 </file>
 
@@ -11865,7 +12154,7 @@
   <a:extraClrSchemeLst/>
   <a:extLst>
     <a:ext uri="{05A4C25C-085E-4340-85A3-A5531E510DB2}">
-      <thm15:themeFamily xmlns:thm15="http://schemas.microsoft.com/office/thememl/2012/main" xmlns="" name="Mesh" id="{789EC3FE-34FD-429C-9918-760025E6C145}" vid="{B8BE45C0-8141-4D58-8C71-A009BC26FBBB}"/>
+      <thm15:themeFamily xmlns:thm15="http://schemas.microsoft.com/office/thememl/2012/main" name="Mesh" id="{789EC3FE-34FD-429C-9918-760025E6C145}" vid="{B8BE45C0-8141-4D58-8C71-A009BC26FBBB}"/>
     </a:ext>
   </a:extLst>
 </a:theme>

</xml_diff>

<commit_message>
Update to Security plan
</commit_message>
<xml_diff>
--- a/Documentation/CrowSoft Audit.pptx
+++ b/Documentation/CrowSoft Audit.pptx
@@ -4,6 +4,9 @@
   <p:sldMasterIdLst>
     <p:sldMasterId id="2147483732" r:id="rId1"/>
   </p:sldMasterIdLst>
+  <p:notesMasterIdLst>
+    <p:notesMasterId r:id="rId18"/>
+  </p:notesMasterIdLst>
   <p:sldIdLst>
     <p:sldId id="256" r:id="rId2"/>
     <p:sldId id="257" r:id="rId3"/>
@@ -23,7 +26,7 @@
     <p:sldId id="265" r:id="rId17"/>
   </p:sldIdLst>
   <p:sldSz cx="12192000" cy="6858000"/>
-  <p:notesSz cx="6858000" cy="9144000"/>
+  <p:notesSz cx="6797675" cy="9928225"/>
   <p:defaultTextStyle>
     <a:defPPr>
       <a:defRPr lang="en-US"/>
@@ -136,6 +139,1699 @@
     </p:ext>
   </p:extLst>
 </p:presentation>
+</file>
+
+<file path=ppt/notesMasters/notesMaster1.xml><?xml version="1.0" encoding="utf-8"?>
+<p:notesMaster xmlns:a="http://schemas.openxmlformats.org/drawingml/2006/main" xmlns:r="http://schemas.openxmlformats.org/officeDocument/2006/relationships" xmlns:p="http://schemas.openxmlformats.org/presentationml/2006/main">
+  <p:cSld>
+    <p:bg>
+      <p:bgRef idx="1001">
+        <a:schemeClr val="bg1"/>
+      </p:bgRef>
+    </p:bg>
+    <p:spTree>
+      <p:nvGrpSpPr>
+        <p:cNvPr id="1" name=""/>
+        <p:cNvGrpSpPr/>
+        <p:nvPr/>
+      </p:nvGrpSpPr>
+      <p:grpSpPr>
+        <a:xfrm>
+          <a:off x="0" y="0"/>
+          <a:ext cx="0" cy="0"/>
+          <a:chOff x="0" y="0"/>
+          <a:chExt cx="0" cy="0"/>
+        </a:xfrm>
+      </p:grpSpPr>
+      <p:sp>
+        <p:nvSpPr>
+          <p:cNvPr id="2" name="Header Placeholder 1"/>
+          <p:cNvSpPr>
+            <a:spLocks noGrp="1"/>
+          </p:cNvSpPr>
+          <p:nvPr>
+            <p:ph type="hdr" sz="quarter"/>
+          </p:nvPr>
+        </p:nvSpPr>
+        <p:spPr>
+          <a:xfrm>
+            <a:off x="0" y="0"/>
+            <a:ext cx="2945659" cy="498135"/>
+          </a:xfrm>
+          <a:prstGeom prst="rect">
+            <a:avLst/>
+          </a:prstGeom>
+        </p:spPr>
+        <p:txBody>
+          <a:bodyPr vert="horz" lIns="91440" tIns="45720" rIns="91440" bIns="45720" rtlCol="0"/>
+          <a:lstStyle>
+            <a:lvl1pPr algn="l">
+              <a:defRPr sz="1200"/>
+            </a:lvl1pPr>
+          </a:lstStyle>
+          <a:p>
+            <a:endParaRPr lang="en-US"/>
+          </a:p>
+        </p:txBody>
+      </p:sp>
+      <p:sp>
+        <p:nvSpPr>
+          <p:cNvPr id="3" name="Date Placeholder 2"/>
+          <p:cNvSpPr>
+            <a:spLocks noGrp="1"/>
+          </p:cNvSpPr>
+          <p:nvPr>
+            <p:ph type="dt" idx="1"/>
+          </p:nvPr>
+        </p:nvSpPr>
+        <p:spPr>
+          <a:xfrm>
+            <a:off x="3850443" y="0"/>
+            <a:ext cx="2945659" cy="498135"/>
+          </a:xfrm>
+          <a:prstGeom prst="rect">
+            <a:avLst/>
+          </a:prstGeom>
+        </p:spPr>
+        <p:txBody>
+          <a:bodyPr vert="horz" lIns="91440" tIns="45720" rIns="91440" bIns="45720" rtlCol="0"/>
+          <a:lstStyle>
+            <a:lvl1pPr algn="r">
+              <a:defRPr sz="1200"/>
+            </a:lvl1pPr>
+          </a:lstStyle>
+          <a:p>
+            <a:fld id="{ED5421BB-CBD0-438F-9647-89560A10D122}" type="datetimeFigureOut">
+              <a:rPr lang="en-US" smtClean="0"/>
+              <a:t>4/8/2019</a:t>
+            </a:fld>
+            <a:endParaRPr lang="en-US"/>
+          </a:p>
+        </p:txBody>
+      </p:sp>
+      <p:sp>
+        <p:nvSpPr>
+          <p:cNvPr id="4" name="Slide Image Placeholder 3"/>
+          <p:cNvSpPr>
+            <a:spLocks noGrp="1" noRot="1" noChangeAspect="1"/>
+          </p:cNvSpPr>
+          <p:nvPr>
+            <p:ph type="sldImg" idx="2"/>
+          </p:nvPr>
+        </p:nvSpPr>
+        <p:spPr>
+          <a:xfrm>
+            <a:off x="422275" y="1241425"/>
+            <a:ext cx="5953125" cy="3349625"/>
+          </a:xfrm>
+          <a:prstGeom prst="rect">
+            <a:avLst/>
+          </a:prstGeom>
+          <a:noFill/>
+          <a:ln w="12700">
+            <a:solidFill>
+              <a:prstClr val="black"/>
+            </a:solidFill>
+          </a:ln>
+        </p:spPr>
+        <p:txBody>
+          <a:bodyPr vert="horz" lIns="91440" tIns="45720" rIns="91440" bIns="45720" rtlCol="0" anchor="ctr"/>
+          <a:lstStyle/>
+          <a:p>
+            <a:endParaRPr lang="en-US"/>
+          </a:p>
+        </p:txBody>
+      </p:sp>
+      <p:sp>
+        <p:nvSpPr>
+          <p:cNvPr id="5" name="Notes Placeholder 4"/>
+          <p:cNvSpPr>
+            <a:spLocks noGrp="1"/>
+          </p:cNvSpPr>
+          <p:nvPr>
+            <p:ph type="body" sz="quarter" idx="3"/>
+          </p:nvPr>
+        </p:nvSpPr>
+        <p:spPr>
+          <a:xfrm>
+            <a:off x="679768" y="4777958"/>
+            <a:ext cx="5438140" cy="3909239"/>
+          </a:xfrm>
+          <a:prstGeom prst="rect">
+            <a:avLst/>
+          </a:prstGeom>
+        </p:spPr>
+        <p:txBody>
+          <a:bodyPr vert="horz" lIns="91440" tIns="45720" rIns="91440" bIns="45720" rtlCol="0"/>
+          <a:lstStyle/>
+          <a:p>
+            <a:pPr lvl="0"/>
+            <a:r>
+              <a:rPr lang="en-US"/>
+              <a:t>Edit Master text styles</a:t>
+            </a:r>
+          </a:p>
+          <a:p>
+            <a:pPr lvl="1"/>
+            <a:r>
+              <a:rPr lang="en-US"/>
+              <a:t>Second level</a:t>
+            </a:r>
+          </a:p>
+          <a:p>
+            <a:pPr lvl="2"/>
+            <a:r>
+              <a:rPr lang="en-US"/>
+              <a:t>Third level</a:t>
+            </a:r>
+          </a:p>
+          <a:p>
+            <a:pPr lvl="3"/>
+            <a:r>
+              <a:rPr lang="en-US"/>
+              <a:t>Fourth level</a:t>
+            </a:r>
+          </a:p>
+          <a:p>
+            <a:pPr lvl="4"/>
+            <a:r>
+              <a:rPr lang="en-US"/>
+              <a:t>Fifth level</a:t>
+            </a:r>
+          </a:p>
+        </p:txBody>
+      </p:sp>
+      <p:sp>
+        <p:nvSpPr>
+          <p:cNvPr id="6" name="Footer Placeholder 5"/>
+          <p:cNvSpPr>
+            <a:spLocks noGrp="1"/>
+          </p:cNvSpPr>
+          <p:nvPr>
+            <p:ph type="ftr" sz="quarter" idx="4"/>
+          </p:nvPr>
+        </p:nvSpPr>
+        <p:spPr>
+          <a:xfrm>
+            <a:off x="0" y="9430091"/>
+            <a:ext cx="2945659" cy="498134"/>
+          </a:xfrm>
+          <a:prstGeom prst="rect">
+            <a:avLst/>
+          </a:prstGeom>
+        </p:spPr>
+        <p:txBody>
+          <a:bodyPr vert="horz" lIns="91440" tIns="45720" rIns="91440" bIns="45720" rtlCol="0" anchor="b"/>
+          <a:lstStyle>
+            <a:lvl1pPr algn="l">
+              <a:defRPr sz="1200"/>
+            </a:lvl1pPr>
+          </a:lstStyle>
+          <a:p>
+            <a:endParaRPr lang="en-US"/>
+          </a:p>
+        </p:txBody>
+      </p:sp>
+      <p:sp>
+        <p:nvSpPr>
+          <p:cNvPr id="7" name="Slide Number Placeholder 6"/>
+          <p:cNvSpPr>
+            <a:spLocks noGrp="1"/>
+          </p:cNvSpPr>
+          <p:nvPr>
+            <p:ph type="sldNum" sz="quarter" idx="5"/>
+          </p:nvPr>
+        </p:nvSpPr>
+        <p:spPr>
+          <a:xfrm>
+            <a:off x="3850443" y="9430091"/>
+            <a:ext cx="2945659" cy="498134"/>
+          </a:xfrm>
+          <a:prstGeom prst="rect">
+            <a:avLst/>
+          </a:prstGeom>
+        </p:spPr>
+        <p:txBody>
+          <a:bodyPr vert="horz" lIns="91440" tIns="45720" rIns="91440" bIns="45720" rtlCol="0" anchor="b"/>
+          <a:lstStyle>
+            <a:lvl1pPr algn="r">
+              <a:defRPr sz="1200"/>
+            </a:lvl1pPr>
+          </a:lstStyle>
+          <a:p>
+            <a:fld id="{469B7B05-986F-4936-8F05-5BA1BAD30E66}" type="slidenum">
+              <a:rPr lang="en-US" smtClean="0"/>
+              <a:t>‹#›</a:t>
+            </a:fld>
+            <a:endParaRPr lang="en-US"/>
+          </a:p>
+        </p:txBody>
+      </p:sp>
+    </p:spTree>
+    <p:extLst>
+      <p:ext uri="{BB962C8B-B14F-4D97-AF65-F5344CB8AC3E}">
+        <p14:creationId xmlns:p14="http://schemas.microsoft.com/office/powerpoint/2010/main" val="3544010195"/>
+      </p:ext>
+    </p:extLst>
+  </p:cSld>
+  <p:clrMap bg1="lt1" tx1="dk1" bg2="lt2" tx2="dk2" accent1="accent1" accent2="accent2" accent3="accent3" accent4="accent4" accent5="accent5" accent6="accent6" hlink="hlink" folHlink="folHlink"/>
+  <p:notesStyle>
+    <a:lvl1pPr marL="0" algn="l" defTabSz="914400" rtl="0" eaLnBrk="1" latinLnBrk="0" hangingPunct="1">
+      <a:defRPr sz="1200" kern="1200">
+        <a:solidFill>
+          <a:schemeClr val="tx1"/>
+        </a:solidFill>
+        <a:latin typeface="+mn-lt"/>
+        <a:ea typeface="+mn-ea"/>
+        <a:cs typeface="+mn-cs"/>
+      </a:defRPr>
+    </a:lvl1pPr>
+    <a:lvl2pPr marL="457200" algn="l" defTabSz="914400" rtl="0" eaLnBrk="1" latinLnBrk="0" hangingPunct="1">
+      <a:defRPr sz="1200" kern="1200">
+        <a:solidFill>
+          <a:schemeClr val="tx1"/>
+        </a:solidFill>
+        <a:latin typeface="+mn-lt"/>
+        <a:ea typeface="+mn-ea"/>
+        <a:cs typeface="+mn-cs"/>
+      </a:defRPr>
+    </a:lvl2pPr>
+    <a:lvl3pPr marL="914400" algn="l" defTabSz="914400" rtl="0" eaLnBrk="1" latinLnBrk="0" hangingPunct="1">
+      <a:defRPr sz="1200" kern="1200">
+        <a:solidFill>
+          <a:schemeClr val="tx1"/>
+        </a:solidFill>
+        <a:latin typeface="+mn-lt"/>
+        <a:ea typeface="+mn-ea"/>
+        <a:cs typeface="+mn-cs"/>
+      </a:defRPr>
+    </a:lvl3pPr>
+    <a:lvl4pPr marL="1371600" algn="l" defTabSz="914400" rtl="0" eaLnBrk="1" latinLnBrk="0" hangingPunct="1">
+      <a:defRPr sz="1200" kern="1200">
+        <a:solidFill>
+          <a:schemeClr val="tx1"/>
+        </a:solidFill>
+        <a:latin typeface="+mn-lt"/>
+        <a:ea typeface="+mn-ea"/>
+        <a:cs typeface="+mn-cs"/>
+      </a:defRPr>
+    </a:lvl4pPr>
+    <a:lvl5pPr marL="1828800" algn="l" defTabSz="914400" rtl="0" eaLnBrk="1" latinLnBrk="0" hangingPunct="1">
+      <a:defRPr sz="1200" kern="1200">
+        <a:solidFill>
+          <a:schemeClr val="tx1"/>
+        </a:solidFill>
+        <a:latin typeface="+mn-lt"/>
+        <a:ea typeface="+mn-ea"/>
+        <a:cs typeface="+mn-cs"/>
+      </a:defRPr>
+    </a:lvl5pPr>
+    <a:lvl6pPr marL="2286000" algn="l" defTabSz="914400" rtl="0" eaLnBrk="1" latinLnBrk="0" hangingPunct="1">
+      <a:defRPr sz="1200" kern="1200">
+        <a:solidFill>
+          <a:schemeClr val="tx1"/>
+        </a:solidFill>
+        <a:latin typeface="+mn-lt"/>
+        <a:ea typeface="+mn-ea"/>
+        <a:cs typeface="+mn-cs"/>
+      </a:defRPr>
+    </a:lvl6pPr>
+    <a:lvl7pPr marL="2743200" algn="l" defTabSz="914400" rtl="0" eaLnBrk="1" latinLnBrk="0" hangingPunct="1">
+      <a:defRPr sz="1200" kern="1200">
+        <a:solidFill>
+          <a:schemeClr val="tx1"/>
+        </a:solidFill>
+        <a:latin typeface="+mn-lt"/>
+        <a:ea typeface="+mn-ea"/>
+        <a:cs typeface="+mn-cs"/>
+      </a:defRPr>
+    </a:lvl7pPr>
+    <a:lvl8pPr marL="3200400" algn="l" defTabSz="914400" rtl="0" eaLnBrk="1" latinLnBrk="0" hangingPunct="1">
+      <a:defRPr sz="1200" kern="1200">
+        <a:solidFill>
+          <a:schemeClr val="tx1"/>
+        </a:solidFill>
+        <a:latin typeface="+mn-lt"/>
+        <a:ea typeface="+mn-ea"/>
+        <a:cs typeface="+mn-cs"/>
+      </a:defRPr>
+    </a:lvl8pPr>
+    <a:lvl9pPr marL="3657600" algn="l" defTabSz="914400" rtl="0" eaLnBrk="1" latinLnBrk="0" hangingPunct="1">
+      <a:defRPr sz="1200" kern="1200">
+        <a:solidFill>
+          <a:schemeClr val="tx1"/>
+        </a:solidFill>
+        <a:latin typeface="+mn-lt"/>
+        <a:ea typeface="+mn-ea"/>
+        <a:cs typeface="+mn-cs"/>
+      </a:defRPr>
+    </a:lvl9pPr>
+  </p:notesStyle>
+</p:notesMaster>
+</file>
+
+<file path=ppt/notesSlides/notesSlide1.xml><?xml version="1.0" encoding="utf-8"?>
+<p:notes xmlns:a="http://schemas.openxmlformats.org/drawingml/2006/main" xmlns:r="http://schemas.openxmlformats.org/officeDocument/2006/relationships" xmlns:p="http://schemas.openxmlformats.org/presentationml/2006/main">
+  <p:cSld>
+    <p:spTree>
+      <p:nvGrpSpPr>
+        <p:cNvPr id="1" name=""/>
+        <p:cNvGrpSpPr/>
+        <p:nvPr/>
+      </p:nvGrpSpPr>
+      <p:grpSpPr>
+        <a:xfrm>
+          <a:off x="0" y="0"/>
+          <a:ext cx="0" cy="0"/>
+          <a:chOff x="0" y="0"/>
+          <a:chExt cx="0" cy="0"/>
+        </a:xfrm>
+      </p:grpSpPr>
+      <p:sp>
+        <p:nvSpPr>
+          <p:cNvPr id="2" name="Slide Image Placeholder 1"/>
+          <p:cNvSpPr>
+            <a:spLocks noGrp="1" noRot="1" noChangeAspect="1"/>
+          </p:cNvSpPr>
+          <p:nvPr>
+            <p:ph type="sldImg"/>
+          </p:nvPr>
+        </p:nvSpPr>
+        <p:spPr/>
+      </p:sp>
+      <p:sp>
+        <p:nvSpPr>
+          <p:cNvPr id="3" name="Notes Placeholder 2"/>
+          <p:cNvSpPr>
+            <a:spLocks noGrp="1"/>
+          </p:cNvSpPr>
+          <p:nvPr>
+            <p:ph type="body" idx="1"/>
+          </p:nvPr>
+        </p:nvSpPr>
+        <p:spPr/>
+        <p:txBody>
+          <a:bodyPr/>
+          <a:lstStyle/>
+          <a:p>
+            <a:endParaRPr lang="en-US"/>
+          </a:p>
+        </p:txBody>
+      </p:sp>
+      <p:sp>
+        <p:nvSpPr>
+          <p:cNvPr id="4" name="Slide Number Placeholder 3"/>
+          <p:cNvSpPr>
+            <a:spLocks noGrp="1"/>
+          </p:cNvSpPr>
+          <p:nvPr>
+            <p:ph type="sldNum" sz="quarter" idx="5"/>
+          </p:nvPr>
+        </p:nvSpPr>
+        <p:spPr/>
+        <p:txBody>
+          <a:bodyPr/>
+          <a:lstStyle/>
+          <a:p>
+            <a:fld id="{469B7B05-986F-4936-8F05-5BA1BAD30E66}" type="slidenum">
+              <a:rPr lang="en-US" smtClean="0"/>
+              <a:t>1</a:t>
+            </a:fld>
+            <a:endParaRPr lang="en-US"/>
+          </a:p>
+        </p:txBody>
+      </p:sp>
+    </p:spTree>
+    <p:extLst>
+      <p:ext uri="{BB962C8B-B14F-4D97-AF65-F5344CB8AC3E}">
+        <p14:creationId xmlns:p14="http://schemas.microsoft.com/office/powerpoint/2010/main" val="2776537979"/>
+      </p:ext>
+    </p:extLst>
+  </p:cSld>
+  <p:clrMapOvr>
+    <a:masterClrMapping/>
+  </p:clrMapOvr>
+</p:notes>
+</file>
+
+<file path=ppt/notesSlides/notesSlide10.xml><?xml version="1.0" encoding="utf-8"?>
+<p:notes xmlns:a="http://schemas.openxmlformats.org/drawingml/2006/main" xmlns:r="http://schemas.openxmlformats.org/officeDocument/2006/relationships" xmlns:p="http://schemas.openxmlformats.org/presentationml/2006/main">
+  <p:cSld>
+    <p:spTree>
+      <p:nvGrpSpPr>
+        <p:cNvPr id="1" name=""/>
+        <p:cNvGrpSpPr/>
+        <p:nvPr/>
+      </p:nvGrpSpPr>
+      <p:grpSpPr>
+        <a:xfrm>
+          <a:off x="0" y="0"/>
+          <a:ext cx="0" cy="0"/>
+          <a:chOff x="0" y="0"/>
+          <a:chExt cx="0" cy="0"/>
+        </a:xfrm>
+      </p:grpSpPr>
+      <p:sp>
+        <p:nvSpPr>
+          <p:cNvPr id="2" name="Slide Image Placeholder 1"/>
+          <p:cNvSpPr>
+            <a:spLocks noGrp="1" noRot="1" noChangeAspect="1"/>
+          </p:cNvSpPr>
+          <p:nvPr>
+            <p:ph type="sldImg"/>
+          </p:nvPr>
+        </p:nvSpPr>
+        <p:spPr/>
+      </p:sp>
+      <p:sp>
+        <p:nvSpPr>
+          <p:cNvPr id="3" name="Notes Placeholder 2"/>
+          <p:cNvSpPr>
+            <a:spLocks noGrp="1"/>
+          </p:cNvSpPr>
+          <p:nvPr>
+            <p:ph type="body" idx="1"/>
+          </p:nvPr>
+        </p:nvSpPr>
+        <p:spPr/>
+        <p:txBody>
+          <a:bodyPr/>
+          <a:lstStyle/>
+          <a:p>
+            <a:endParaRPr lang="en-US"/>
+          </a:p>
+        </p:txBody>
+      </p:sp>
+      <p:sp>
+        <p:nvSpPr>
+          <p:cNvPr id="4" name="Slide Number Placeholder 3"/>
+          <p:cNvSpPr>
+            <a:spLocks noGrp="1"/>
+          </p:cNvSpPr>
+          <p:nvPr>
+            <p:ph type="sldNum" sz="quarter" idx="5"/>
+          </p:nvPr>
+        </p:nvSpPr>
+        <p:spPr/>
+        <p:txBody>
+          <a:bodyPr/>
+          <a:lstStyle/>
+          <a:p>
+            <a:fld id="{469B7B05-986F-4936-8F05-5BA1BAD30E66}" type="slidenum">
+              <a:rPr lang="en-US" smtClean="0"/>
+              <a:t>10</a:t>
+            </a:fld>
+            <a:endParaRPr lang="en-US"/>
+          </a:p>
+        </p:txBody>
+      </p:sp>
+    </p:spTree>
+    <p:extLst>
+      <p:ext uri="{BB962C8B-B14F-4D97-AF65-F5344CB8AC3E}">
+        <p14:creationId xmlns:p14="http://schemas.microsoft.com/office/powerpoint/2010/main" val="1571380953"/>
+      </p:ext>
+    </p:extLst>
+  </p:cSld>
+  <p:clrMapOvr>
+    <a:masterClrMapping/>
+  </p:clrMapOvr>
+</p:notes>
+</file>
+
+<file path=ppt/notesSlides/notesSlide11.xml><?xml version="1.0" encoding="utf-8"?>
+<p:notes xmlns:a="http://schemas.openxmlformats.org/drawingml/2006/main" xmlns:r="http://schemas.openxmlformats.org/officeDocument/2006/relationships" xmlns:p="http://schemas.openxmlformats.org/presentationml/2006/main">
+  <p:cSld>
+    <p:spTree>
+      <p:nvGrpSpPr>
+        <p:cNvPr id="1" name=""/>
+        <p:cNvGrpSpPr/>
+        <p:nvPr/>
+      </p:nvGrpSpPr>
+      <p:grpSpPr>
+        <a:xfrm>
+          <a:off x="0" y="0"/>
+          <a:ext cx="0" cy="0"/>
+          <a:chOff x="0" y="0"/>
+          <a:chExt cx="0" cy="0"/>
+        </a:xfrm>
+      </p:grpSpPr>
+      <p:sp>
+        <p:nvSpPr>
+          <p:cNvPr id="2" name="Slide Image Placeholder 1"/>
+          <p:cNvSpPr>
+            <a:spLocks noGrp="1" noRot="1" noChangeAspect="1"/>
+          </p:cNvSpPr>
+          <p:nvPr>
+            <p:ph type="sldImg"/>
+          </p:nvPr>
+        </p:nvSpPr>
+        <p:spPr/>
+      </p:sp>
+      <p:sp>
+        <p:nvSpPr>
+          <p:cNvPr id="3" name="Notes Placeholder 2"/>
+          <p:cNvSpPr>
+            <a:spLocks noGrp="1"/>
+          </p:cNvSpPr>
+          <p:nvPr>
+            <p:ph type="body" idx="1"/>
+          </p:nvPr>
+        </p:nvSpPr>
+        <p:spPr/>
+        <p:txBody>
+          <a:bodyPr/>
+          <a:lstStyle/>
+          <a:p>
+            <a:endParaRPr lang="en-US"/>
+          </a:p>
+        </p:txBody>
+      </p:sp>
+      <p:sp>
+        <p:nvSpPr>
+          <p:cNvPr id="4" name="Slide Number Placeholder 3"/>
+          <p:cNvSpPr>
+            <a:spLocks noGrp="1"/>
+          </p:cNvSpPr>
+          <p:nvPr>
+            <p:ph type="sldNum" sz="quarter" idx="5"/>
+          </p:nvPr>
+        </p:nvSpPr>
+        <p:spPr/>
+        <p:txBody>
+          <a:bodyPr/>
+          <a:lstStyle/>
+          <a:p>
+            <a:fld id="{469B7B05-986F-4936-8F05-5BA1BAD30E66}" type="slidenum">
+              <a:rPr lang="en-US" smtClean="0"/>
+              <a:t>11</a:t>
+            </a:fld>
+            <a:endParaRPr lang="en-US"/>
+          </a:p>
+        </p:txBody>
+      </p:sp>
+    </p:spTree>
+    <p:extLst>
+      <p:ext uri="{BB962C8B-B14F-4D97-AF65-F5344CB8AC3E}">
+        <p14:creationId xmlns:p14="http://schemas.microsoft.com/office/powerpoint/2010/main" val="513643173"/>
+      </p:ext>
+    </p:extLst>
+  </p:cSld>
+  <p:clrMapOvr>
+    <a:masterClrMapping/>
+  </p:clrMapOvr>
+</p:notes>
+</file>
+
+<file path=ppt/notesSlides/notesSlide12.xml><?xml version="1.0" encoding="utf-8"?>
+<p:notes xmlns:a="http://schemas.openxmlformats.org/drawingml/2006/main" xmlns:r="http://schemas.openxmlformats.org/officeDocument/2006/relationships" xmlns:p="http://schemas.openxmlformats.org/presentationml/2006/main">
+  <p:cSld>
+    <p:spTree>
+      <p:nvGrpSpPr>
+        <p:cNvPr id="1" name=""/>
+        <p:cNvGrpSpPr/>
+        <p:nvPr/>
+      </p:nvGrpSpPr>
+      <p:grpSpPr>
+        <a:xfrm>
+          <a:off x="0" y="0"/>
+          <a:ext cx="0" cy="0"/>
+          <a:chOff x="0" y="0"/>
+          <a:chExt cx="0" cy="0"/>
+        </a:xfrm>
+      </p:grpSpPr>
+      <p:sp>
+        <p:nvSpPr>
+          <p:cNvPr id="2" name="Slide Image Placeholder 1"/>
+          <p:cNvSpPr>
+            <a:spLocks noGrp="1" noRot="1" noChangeAspect="1"/>
+          </p:cNvSpPr>
+          <p:nvPr>
+            <p:ph type="sldImg"/>
+          </p:nvPr>
+        </p:nvSpPr>
+        <p:spPr/>
+      </p:sp>
+      <p:sp>
+        <p:nvSpPr>
+          <p:cNvPr id="3" name="Notes Placeholder 2"/>
+          <p:cNvSpPr>
+            <a:spLocks noGrp="1"/>
+          </p:cNvSpPr>
+          <p:nvPr>
+            <p:ph type="body" idx="1"/>
+          </p:nvPr>
+        </p:nvSpPr>
+        <p:spPr/>
+        <p:txBody>
+          <a:bodyPr/>
+          <a:lstStyle/>
+          <a:p>
+            <a:endParaRPr lang="en-US"/>
+          </a:p>
+        </p:txBody>
+      </p:sp>
+      <p:sp>
+        <p:nvSpPr>
+          <p:cNvPr id="4" name="Slide Number Placeholder 3"/>
+          <p:cNvSpPr>
+            <a:spLocks noGrp="1"/>
+          </p:cNvSpPr>
+          <p:nvPr>
+            <p:ph type="sldNum" sz="quarter" idx="5"/>
+          </p:nvPr>
+        </p:nvSpPr>
+        <p:spPr/>
+        <p:txBody>
+          <a:bodyPr/>
+          <a:lstStyle/>
+          <a:p>
+            <a:fld id="{469B7B05-986F-4936-8F05-5BA1BAD30E66}" type="slidenum">
+              <a:rPr lang="en-US" smtClean="0"/>
+              <a:t>12</a:t>
+            </a:fld>
+            <a:endParaRPr lang="en-US"/>
+          </a:p>
+        </p:txBody>
+      </p:sp>
+    </p:spTree>
+    <p:extLst>
+      <p:ext uri="{BB962C8B-B14F-4D97-AF65-F5344CB8AC3E}">
+        <p14:creationId xmlns:p14="http://schemas.microsoft.com/office/powerpoint/2010/main" val="1675001742"/>
+      </p:ext>
+    </p:extLst>
+  </p:cSld>
+  <p:clrMapOvr>
+    <a:masterClrMapping/>
+  </p:clrMapOvr>
+</p:notes>
+</file>
+
+<file path=ppt/notesSlides/notesSlide13.xml><?xml version="1.0" encoding="utf-8"?>
+<p:notes xmlns:a="http://schemas.openxmlformats.org/drawingml/2006/main" xmlns:r="http://schemas.openxmlformats.org/officeDocument/2006/relationships" xmlns:p="http://schemas.openxmlformats.org/presentationml/2006/main">
+  <p:cSld>
+    <p:spTree>
+      <p:nvGrpSpPr>
+        <p:cNvPr id="1" name=""/>
+        <p:cNvGrpSpPr/>
+        <p:nvPr/>
+      </p:nvGrpSpPr>
+      <p:grpSpPr>
+        <a:xfrm>
+          <a:off x="0" y="0"/>
+          <a:ext cx="0" cy="0"/>
+          <a:chOff x="0" y="0"/>
+          <a:chExt cx="0" cy="0"/>
+        </a:xfrm>
+      </p:grpSpPr>
+      <p:sp>
+        <p:nvSpPr>
+          <p:cNvPr id="2" name="Slide Image Placeholder 1"/>
+          <p:cNvSpPr>
+            <a:spLocks noGrp="1" noRot="1" noChangeAspect="1"/>
+          </p:cNvSpPr>
+          <p:nvPr>
+            <p:ph type="sldImg"/>
+          </p:nvPr>
+        </p:nvSpPr>
+        <p:spPr/>
+      </p:sp>
+      <p:sp>
+        <p:nvSpPr>
+          <p:cNvPr id="3" name="Notes Placeholder 2"/>
+          <p:cNvSpPr>
+            <a:spLocks noGrp="1"/>
+          </p:cNvSpPr>
+          <p:nvPr>
+            <p:ph type="body" idx="1"/>
+          </p:nvPr>
+        </p:nvSpPr>
+        <p:spPr/>
+        <p:txBody>
+          <a:bodyPr/>
+          <a:lstStyle/>
+          <a:p>
+            <a:endParaRPr lang="en-US"/>
+          </a:p>
+        </p:txBody>
+      </p:sp>
+      <p:sp>
+        <p:nvSpPr>
+          <p:cNvPr id="4" name="Slide Number Placeholder 3"/>
+          <p:cNvSpPr>
+            <a:spLocks noGrp="1"/>
+          </p:cNvSpPr>
+          <p:nvPr>
+            <p:ph type="sldNum" sz="quarter" idx="5"/>
+          </p:nvPr>
+        </p:nvSpPr>
+        <p:spPr/>
+        <p:txBody>
+          <a:bodyPr/>
+          <a:lstStyle/>
+          <a:p>
+            <a:fld id="{469B7B05-986F-4936-8F05-5BA1BAD30E66}" type="slidenum">
+              <a:rPr lang="en-US" smtClean="0"/>
+              <a:t>13</a:t>
+            </a:fld>
+            <a:endParaRPr lang="en-US"/>
+          </a:p>
+        </p:txBody>
+      </p:sp>
+    </p:spTree>
+    <p:extLst>
+      <p:ext uri="{BB962C8B-B14F-4D97-AF65-F5344CB8AC3E}">
+        <p14:creationId xmlns:p14="http://schemas.microsoft.com/office/powerpoint/2010/main" val="1829975564"/>
+      </p:ext>
+    </p:extLst>
+  </p:cSld>
+  <p:clrMapOvr>
+    <a:masterClrMapping/>
+  </p:clrMapOvr>
+</p:notes>
+</file>
+
+<file path=ppt/notesSlides/notesSlide14.xml><?xml version="1.0" encoding="utf-8"?>
+<p:notes xmlns:a="http://schemas.openxmlformats.org/drawingml/2006/main" xmlns:r="http://schemas.openxmlformats.org/officeDocument/2006/relationships" xmlns:p="http://schemas.openxmlformats.org/presentationml/2006/main">
+  <p:cSld>
+    <p:spTree>
+      <p:nvGrpSpPr>
+        <p:cNvPr id="1" name=""/>
+        <p:cNvGrpSpPr/>
+        <p:nvPr/>
+      </p:nvGrpSpPr>
+      <p:grpSpPr>
+        <a:xfrm>
+          <a:off x="0" y="0"/>
+          <a:ext cx="0" cy="0"/>
+          <a:chOff x="0" y="0"/>
+          <a:chExt cx="0" cy="0"/>
+        </a:xfrm>
+      </p:grpSpPr>
+      <p:sp>
+        <p:nvSpPr>
+          <p:cNvPr id="2" name="Slide Image Placeholder 1"/>
+          <p:cNvSpPr>
+            <a:spLocks noGrp="1" noRot="1" noChangeAspect="1"/>
+          </p:cNvSpPr>
+          <p:nvPr>
+            <p:ph type="sldImg"/>
+          </p:nvPr>
+        </p:nvSpPr>
+        <p:spPr/>
+      </p:sp>
+      <p:sp>
+        <p:nvSpPr>
+          <p:cNvPr id="3" name="Notes Placeholder 2"/>
+          <p:cNvSpPr>
+            <a:spLocks noGrp="1"/>
+          </p:cNvSpPr>
+          <p:nvPr>
+            <p:ph type="body" idx="1"/>
+          </p:nvPr>
+        </p:nvSpPr>
+        <p:spPr/>
+        <p:txBody>
+          <a:bodyPr/>
+          <a:lstStyle/>
+          <a:p>
+            <a:endParaRPr lang="en-US"/>
+          </a:p>
+        </p:txBody>
+      </p:sp>
+      <p:sp>
+        <p:nvSpPr>
+          <p:cNvPr id="4" name="Slide Number Placeholder 3"/>
+          <p:cNvSpPr>
+            <a:spLocks noGrp="1"/>
+          </p:cNvSpPr>
+          <p:nvPr>
+            <p:ph type="sldNum" sz="quarter" idx="5"/>
+          </p:nvPr>
+        </p:nvSpPr>
+        <p:spPr/>
+        <p:txBody>
+          <a:bodyPr/>
+          <a:lstStyle/>
+          <a:p>
+            <a:fld id="{469B7B05-986F-4936-8F05-5BA1BAD30E66}" type="slidenum">
+              <a:rPr lang="en-US" smtClean="0"/>
+              <a:t>14</a:t>
+            </a:fld>
+            <a:endParaRPr lang="en-US"/>
+          </a:p>
+        </p:txBody>
+      </p:sp>
+    </p:spTree>
+    <p:extLst>
+      <p:ext uri="{BB962C8B-B14F-4D97-AF65-F5344CB8AC3E}">
+        <p14:creationId xmlns:p14="http://schemas.microsoft.com/office/powerpoint/2010/main" val="3351046875"/>
+      </p:ext>
+    </p:extLst>
+  </p:cSld>
+  <p:clrMapOvr>
+    <a:masterClrMapping/>
+  </p:clrMapOvr>
+</p:notes>
+</file>
+
+<file path=ppt/notesSlides/notesSlide15.xml><?xml version="1.0" encoding="utf-8"?>
+<p:notes xmlns:a="http://schemas.openxmlformats.org/drawingml/2006/main" xmlns:r="http://schemas.openxmlformats.org/officeDocument/2006/relationships" xmlns:p="http://schemas.openxmlformats.org/presentationml/2006/main">
+  <p:cSld>
+    <p:spTree>
+      <p:nvGrpSpPr>
+        <p:cNvPr id="1" name=""/>
+        <p:cNvGrpSpPr/>
+        <p:nvPr/>
+      </p:nvGrpSpPr>
+      <p:grpSpPr>
+        <a:xfrm>
+          <a:off x="0" y="0"/>
+          <a:ext cx="0" cy="0"/>
+          <a:chOff x="0" y="0"/>
+          <a:chExt cx="0" cy="0"/>
+        </a:xfrm>
+      </p:grpSpPr>
+      <p:sp>
+        <p:nvSpPr>
+          <p:cNvPr id="2" name="Slide Image Placeholder 1"/>
+          <p:cNvSpPr>
+            <a:spLocks noGrp="1" noRot="1" noChangeAspect="1"/>
+          </p:cNvSpPr>
+          <p:nvPr>
+            <p:ph type="sldImg"/>
+          </p:nvPr>
+        </p:nvSpPr>
+        <p:spPr/>
+      </p:sp>
+      <p:sp>
+        <p:nvSpPr>
+          <p:cNvPr id="3" name="Notes Placeholder 2"/>
+          <p:cNvSpPr>
+            <a:spLocks noGrp="1"/>
+          </p:cNvSpPr>
+          <p:nvPr>
+            <p:ph type="body" idx="1"/>
+          </p:nvPr>
+        </p:nvSpPr>
+        <p:spPr/>
+        <p:txBody>
+          <a:bodyPr/>
+          <a:lstStyle/>
+          <a:p>
+            <a:endParaRPr lang="en-US" dirty="0"/>
+          </a:p>
+        </p:txBody>
+      </p:sp>
+      <p:sp>
+        <p:nvSpPr>
+          <p:cNvPr id="4" name="Slide Number Placeholder 3"/>
+          <p:cNvSpPr>
+            <a:spLocks noGrp="1"/>
+          </p:cNvSpPr>
+          <p:nvPr>
+            <p:ph type="sldNum" sz="quarter" idx="5"/>
+          </p:nvPr>
+        </p:nvSpPr>
+        <p:spPr/>
+        <p:txBody>
+          <a:bodyPr/>
+          <a:lstStyle/>
+          <a:p>
+            <a:fld id="{469B7B05-986F-4936-8F05-5BA1BAD30E66}" type="slidenum">
+              <a:rPr lang="en-US" smtClean="0"/>
+              <a:t>15</a:t>
+            </a:fld>
+            <a:endParaRPr lang="en-US"/>
+          </a:p>
+        </p:txBody>
+      </p:sp>
+    </p:spTree>
+    <p:extLst>
+      <p:ext uri="{BB962C8B-B14F-4D97-AF65-F5344CB8AC3E}">
+        <p14:creationId xmlns:p14="http://schemas.microsoft.com/office/powerpoint/2010/main" val="924793401"/>
+      </p:ext>
+    </p:extLst>
+  </p:cSld>
+  <p:clrMapOvr>
+    <a:masterClrMapping/>
+  </p:clrMapOvr>
+</p:notes>
+</file>
+
+<file path=ppt/notesSlides/notesSlide16.xml><?xml version="1.0" encoding="utf-8"?>
+<p:notes xmlns:a="http://schemas.openxmlformats.org/drawingml/2006/main" xmlns:r="http://schemas.openxmlformats.org/officeDocument/2006/relationships" xmlns:p="http://schemas.openxmlformats.org/presentationml/2006/main">
+  <p:cSld>
+    <p:spTree>
+      <p:nvGrpSpPr>
+        <p:cNvPr id="1" name=""/>
+        <p:cNvGrpSpPr/>
+        <p:nvPr/>
+      </p:nvGrpSpPr>
+      <p:grpSpPr>
+        <a:xfrm>
+          <a:off x="0" y="0"/>
+          <a:ext cx="0" cy="0"/>
+          <a:chOff x="0" y="0"/>
+          <a:chExt cx="0" cy="0"/>
+        </a:xfrm>
+      </p:grpSpPr>
+      <p:sp>
+        <p:nvSpPr>
+          <p:cNvPr id="2" name="Slide Image Placeholder 1"/>
+          <p:cNvSpPr>
+            <a:spLocks noGrp="1" noRot="1" noChangeAspect="1"/>
+          </p:cNvSpPr>
+          <p:nvPr>
+            <p:ph type="sldImg"/>
+          </p:nvPr>
+        </p:nvSpPr>
+        <p:spPr/>
+      </p:sp>
+      <p:sp>
+        <p:nvSpPr>
+          <p:cNvPr id="3" name="Notes Placeholder 2"/>
+          <p:cNvSpPr>
+            <a:spLocks noGrp="1"/>
+          </p:cNvSpPr>
+          <p:nvPr>
+            <p:ph type="body" idx="1"/>
+          </p:nvPr>
+        </p:nvSpPr>
+        <p:spPr/>
+        <p:txBody>
+          <a:bodyPr/>
+          <a:lstStyle/>
+          <a:p>
+            <a:endParaRPr lang="en-US"/>
+          </a:p>
+        </p:txBody>
+      </p:sp>
+      <p:sp>
+        <p:nvSpPr>
+          <p:cNvPr id="4" name="Slide Number Placeholder 3"/>
+          <p:cNvSpPr>
+            <a:spLocks noGrp="1"/>
+          </p:cNvSpPr>
+          <p:nvPr>
+            <p:ph type="sldNum" sz="quarter" idx="5"/>
+          </p:nvPr>
+        </p:nvSpPr>
+        <p:spPr/>
+        <p:txBody>
+          <a:bodyPr/>
+          <a:lstStyle/>
+          <a:p>
+            <a:fld id="{469B7B05-986F-4936-8F05-5BA1BAD30E66}" type="slidenum">
+              <a:rPr lang="en-US" smtClean="0"/>
+              <a:t>16</a:t>
+            </a:fld>
+            <a:endParaRPr lang="en-US"/>
+          </a:p>
+        </p:txBody>
+      </p:sp>
+    </p:spTree>
+    <p:extLst>
+      <p:ext uri="{BB962C8B-B14F-4D97-AF65-F5344CB8AC3E}">
+        <p14:creationId xmlns:p14="http://schemas.microsoft.com/office/powerpoint/2010/main" val="4025939098"/>
+      </p:ext>
+    </p:extLst>
+  </p:cSld>
+  <p:clrMapOvr>
+    <a:masterClrMapping/>
+  </p:clrMapOvr>
+</p:notes>
+</file>
+
+<file path=ppt/notesSlides/notesSlide2.xml><?xml version="1.0" encoding="utf-8"?>
+<p:notes xmlns:a="http://schemas.openxmlformats.org/drawingml/2006/main" xmlns:r="http://schemas.openxmlformats.org/officeDocument/2006/relationships" xmlns:p="http://schemas.openxmlformats.org/presentationml/2006/main">
+  <p:cSld>
+    <p:spTree>
+      <p:nvGrpSpPr>
+        <p:cNvPr id="1" name=""/>
+        <p:cNvGrpSpPr/>
+        <p:nvPr/>
+      </p:nvGrpSpPr>
+      <p:grpSpPr>
+        <a:xfrm>
+          <a:off x="0" y="0"/>
+          <a:ext cx="0" cy="0"/>
+          <a:chOff x="0" y="0"/>
+          <a:chExt cx="0" cy="0"/>
+        </a:xfrm>
+      </p:grpSpPr>
+      <p:sp>
+        <p:nvSpPr>
+          <p:cNvPr id="2" name="Slide Image Placeholder 1"/>
+          <p:cNvSpPr>
+            <a:spLocks noGrp="1" noRot="1" noChangeAspect="1"/>
+          </p:cNvSpPr>
+          <p:nvPr>
+            <p:ph type="sldImg"/>
+          </p:nvPr>
+        </p:nvSpPr>
+        <p:spPr/>
+      </p:sp>
+      <p:sp>
+        <p:nvSpPr>
+          <p:cNvPr id="3" name="Notes Placeholder 2"/>
+          <p:cNvSpPr>
+            <a:spLocks noGrp="1"/>
+          </p:cNvSpPr>
+          <p:nvPr>
+            <p:ph type="body" idx="1"/>
+          </p:nvPr>
+        </p:nvSpPr>
+        <p:spPr/>
+        <p:txBody>
+          <a:bodyPr/>
+          <a:lstStyle/>
+          <a:p>
+            <a:endParaRPr lang="en-US"/>
+          </a:p>
+        </p:txBody>
+      </p:sp>
+      <p:sp>
+        <p:nvSpPr>
+          <p:cNvPr id="4" name="Slide Number Placeholder 3"/>
+          <p:cNvSpPr>
+            <a:spLocks noGrp="1"/>
+          </p:cNvSpPr>
+          <p:nvPr>
+            <p:ph type="sldNum" sz="quarter" idx="5"/>
+          </p:nvPr>
+        </p:nvSpPr>
+        <p:spPr/>
+        <p:txBody>
+          <a:bodyPr/>
+          <a:lstStyle/>
+          <a:p>
+            <a:fld id="{469B7B05-986F-4936-8F05-5BA1BAD30E66}" type="slidenum">
+              <a:rPr lang="en-US" smtClean="0"/>
+              <a:t>2</a:t>
+            </a:fld>
+            <a:endParaRPr lang="en-US"/>
+          </a:p>
+        </p:txBody>
+      </p:sp>
+    </p:spTree>
+    <p:extLst>
+      <p:ext uri="{BB962C8B-B14F-4D97-AF65-F5344CB8AC3E}">
+        <p14:creationId xmlns:p14="http://schemas.microsoft.com/office/powerpoint/2010/main" val="4067415160"/>
+      </p:ext>
+    </p:extLst>
+  </p:cSld>
+  <p:clrMapOvr>
+    <a:masterClrMapping/>
+  </p:clrMapOvr>
+</p:notes>
+</file>
+
+<file path=ppt/notesSlides/notesSlide3.xml><?xml version="1.0" encoding="utf-8"?>
+<p:notes xmlns:a="http://schemas.openxmlformats.org/drawingml/2006/main" xmlns:r="http://schemas.openxmlformats.org/officeDocument/2006/relationships" xmlns:p="http://schemas.openxmlformats.org/presentationml/2006/main">
+  <p:cSld>
+    <p:spTree>
+      <p:nvGrpSpPr>
+        <p:cNvPr id="1" name=""/>
+        <p:cNvGrpSpPr/>
+        <p:nvPr/>
+      </p:nvGrpSpPr>
+      <p:grpSpPr>
+        <a:xfrm>
+          <a:off x="0" y="0"/>
+          <a:ext cx="0" cy="0"/>
+          <a:chOff x="0" y="0"/>
+          <a:chExt cx="0" cy="0"/>
+        </a:xfrm>
+      </p:grpSpPr>
+      <p:sp>
+        <p:nvSpPr>
+          <p:cNvPr id="2" name="Slide Image Placeholder 1"/>
+          <p:cNvSpPr>
+            <a:spLocks noGrp="1" noRot="1" noChangeAspect="1"/>
+          </p:cNvSpPr>
+          <p:nvPr>
+            <p:ph type="sldImg"/>
+          </p:nvPr>
+        </p:nvSpPr>
+        <p:spPr/>
+      </p:sp>
+      <p:sp>
+        <p:nvSpPr>
+          <p:cNvPr id="3" name="Notes Placeholder 2"/>
+          <p:cNvSpPr>
+            <a:spLocks noGrp="1"/>
+          </p:cNvSpPr>
+          <p:nvPr>
+            <p:ph type="body" idx="1"/>
+          </p:nvPr>
+        </p:nvSpPr>
+        <p:spPr/>
+        <p:txBody>
+          <a:bodyPr/>
+          <a:lstStyle/>
+          <a:p>
+            <a:endParaRPr lang="en-US"/>
+          </a:p>
+        </p:txBody>
+      </p:sp>
+      <p:sp>
+        <p:nvSpPr>
+          <p:cNvPr id="4" name="Slide Number Placeholder 3"/>
+          <p:cNvSpPr>
+            <a:spLocks noGrp="1"/>
+          </p:cNvSpPr>
+          <p:nvPr>
+            <p:ph type="sldNum" sz="quarter" idx="5"/>
+          </p:nvPr>
+        </p:nvSpPr>
+        <p:spPr/>
+        <p:txBody>
+          <a:bodyPr/>
+          <a:lstStyle/>
+          <a:p>
+            <a:fld id="{469B7B05-986F-4936-8F05-5BA1BAD30E66}" type="slidenum">
+              <a:rPr lang="en-US" smtClean="0"/>
+              <a:t>3</a:t>
+            </a:fld>
+            <a:endParaRPr lang="en-US"/>
+          </a:p>
+        </p:txBody>
+      </p:sp>
+    </p:spTree>
+    <p:extLst>
+      <p:ext uri="{BB962C8B-B14F-4D97-AF65-F5344CB8AC3E}">
+        <p14:creationId xmlns:p14="http://schemas.microsoft.com/office/powerpoint/2010/main" val="1637436534"/>
+      </p:ext>
+    </p:extLst>
+  </p:cSld>
+  <p:clrMapOvr>
+    <a:masterClrMapping/>
+  </p:clrMapOvr>
+</p:notes>
+</file>
+
+<file path=ppt/notesSlides/notesSlide4.xml><?xml version="1.0" encoding="utf-8"?>
+<p:notes xmlns:a="http://schemas.openxmlformats.org/drawingml/2006/main" xmlns:r="http://schemas.openxmlformats.org/officeDocument/2006/relationships" xmlns:p="http://schemas.openxmlformats.org/presentationml/2006/main">
+  <p:cSld>
+    <p:spTree>
+      <p:nvGrpSpPr>
+        <p:cNvPr id="1" name=""/>
+        <p:cNvGrpSpPr/>
+        <p:nvPr/>
+      </p:nvGrpSpPr>
+      <p:grpSpPr>
+        <a:xfrm>
+          <a:off x="0" y="0"/>
+          <a:ext cx="0" cy="0"/>
+          <a:chOff x="0" y="0"/>
+          <a:chExt cx="0" cy="0"/>
+        </a:xfrm>
+      </p:grpSpPr>
+      <p:sp>
+        <p:nvSpPr>
+          <p:cNvPr id="2" name="Slide Image Placeholder 1"/>
+          <p:cNvSpPr>
+            <a:spLocks noGrp="1" noRot="1" noChangeAspect="1"/>
+          </p:cNvSpPr>
+          <p:nvPr>
+            <p:ph type="sldImg"/>
+          </p:nvPr>
+        </p:nvSpPr>
+        <p:spPr/>
+      </p:sp>
+      <p:sp>
+        <p:nvSpPr>
+          <p:cNvPr id="3" name="Notes Placeholder 2"/>
+          <p:cNvSpPr>
+            <a:spLocks noGrp="1"/>
+          </p:cNvSpPr>
+          <p:nvPr>
+            <p:ph type="body" idx="1"/>
+          </p:nvPr>
+        </p:nvSpPr>
+        <p:spPr/>
+        <p:txBody>
+          <a:bodyPr/>
+          <a:lstStyle/>
+          <a:p>
+            <a:endParaRPr lang="en-US"/>
+          </a:p>
+        </p:txBody>
+      </p:sp>
+      <p:sp>
+        <p:nvSpPr>
+          <p:cNvPr id="4" name="Slide Number Placeholder 3"/>
+          <p:cNvSpPr>
+            <a:spLocks noGrp="1"/>
+          </p:cNvSpPr>
+          <p:nvPr>
+            <p:ph type="sldNum" sz="quarter" idx="5"/>
+          </p:nvPr>
+        </p:nvSpPr>
+        <p:spPr/>
+        <p:txBody>
+          <a:bodyPr/>
+          <a:lstStyle/>
+          <a:p>
+            <a:fld id="{469B7B05-986F-4936-8F05-5BA1BAD30E66}" type="slidenum">
+              <a:rPr lang="en-US" smtClean="0"/>
+              <a:t>4</a:t>
+            </a:fld>
+            <a:endParaRPr lang="en-US"/>
+          </a:p>
+        </p:txBody>
+      </p:sp>
+    </p:spTree>
+    <p:extLst>
+      <p:ext uri="{BB962C8B-B14F-4D97-AF65-F5344CB8AC3E}">
+        <p14:creationId xmlns:p14="http://schemas.microsoft.com/office/powerpoint/2010/main" val="2086679014"/>
+      </p:ext>
+    </p:extLst>
+  </p:cSld>
+  <p:clrMapOvr>
+    <a:masterClrMapping/>
+  </p:clrMapOvr>
+</p:notes>
+</file>
+
+<file path=ppt/notesSlides/notesSlide5.xml><?xml version="1.0" encoding="utf-8"?>
+<p:notes xmlns:a="http://schemas.openxmlformats.org/drawingml/2006/main" xmlns:r="http://schemas.openxmlformats.org/officeDocument/2006/relationships" xmlns:p="http://schemas.openxmlformats.org/presentationml/2006/main">
+  <p:cSld>
+    <p:spTree>
+      <p:nvGrpSpPr>
+        <p:cNvPr id="1" name=""/>
+        <p:cNvGrpSpPr/>
+        <p:nvPr/>
+      </p:nvGrpSpPr>
+      <p:grpSpPr>
+        <a:xfrm>
+          <a:off x="0" y="0"/>
+          <a:ext cx="0" cy="0"/>
+          <a:chOff x="0" y="0"/>
+          <a:chExt cx="0" cy="0"/>
+        </a:xfrm>
+      </p:grpSpPr>
+      <p:sp>
+        <p:nvSpPr>
+          <p:cNvPr id="2" name="Slide Image Placeholder 1"/>
+          <p:cNvSpPr>
+            <a:spLocks noGrp="1" noRot="1" noChangeAspect="1"/>
+          </p:cNvSpPr>
+          <p:nvPr>
+            <p:ph type="sldImg"/>
+          </p:nvPr>
+        </p:nvSpPr>
+        <p:spPr/>
+      </p:sp>
+      <p:sp>
+        <p:nvSpPr>
+          <p:cNvPr id="3" name="Notes Placeholder 2"/>
+          <p:cNvSpPr>
+            <a:spLocks noGrp="1"/>
+          </p:cNvSpPr>
+          <p:nvPr>
+            <p:ph type="body" idx="1"/>
+          </p:nvPr>
+        </p:nvSpPr>
+        <p:spPr/>
+        <p:txBody>
+          <a:bodyPr/>
+          <a:lstStyle/>
+          <a:p>
+            <a:endParaRPr lang="en-US"/>
+          </a:p>
+        </p:txBody>
+      </p:sp>
+      <p:sp>
+        <p:nvSpPr>
+          <p:cNvPr id="4" name="Slide Number Placeholder 3"/>
+          <p:cNvSpPr>
+            <a:spLocks noGrp="1"/>
+          </p:cNvSpPr>
+          <p:nvPr>
+            <p:ph type="sldNum" sz="quarter" idx="5"/>
+          </p:nvPr>
+        </p:nvSpPr>
+        <p:spPr/>
+        <p:txBody>
+          <a:bodyPr/>
+          <a:lstStyle/>
+          <a:p>
+            <a:fld id="{469B7B05-986F-4936-8F05-5BA1BAD30E66}" type="slidenum">
+              <a:rPr lang="en-US" smtClean="0"/>
+              <a:t>5</a:t>
+            </a:fld>
+            <a:endParaRPr lang="en-US"/>
+          </a:p>
+        </p:txBody>
+      </p:sp>
+    </p:spTree>
+    <p:extLst>
+      <p:ext uri="{BB962C8B-B14F-4D97-AF65-F5344CB8AC3E}">
+        <p14:creationId xmlns:p14="http://schemas.microsoft.com/office/powerpoint/2010/main" val="1119419244"/>
+      </p:ext>
+    </p:extLst>
+  </p:cSld>
+  <p:clrMapOvr>
+    <a:masterClrMapping/>
+  </p:clrMapOvr>
+</p:notes>
+</file>
+
+<file path=ppt/notesSlides/notesSlide6.xml><?xml version="1.0" encoding="utf-8"?>
+<p:notes xmlns:a="http://schemas.openxmlformats.org/drawingml/2006/main" xmlns:r="http://schemas.openxmlformats.org/officeDocument/2006/relationships" xmlns:p="http://schemas.openxmlformats.org/presentationml/2006/main">
+  <p:cSld>
+    <p:spTree>
+      <p:nvGrpSpPr>
+        <p:cNvPr id="1" name=""/>
+        <p:cNvGrpSpPr/>
+        <p:nvPr/>
+      </p:nvGrpSpPr>
+      <p:grpSpPr>
+        <a:xfrm>
+          <a:off x="0" y="0"/>
+          <a:ext cx="0" cy="0"/>
+          <a:chOff x="0" y="0"/>
+          <a:chExt cx="0" cy="0"/>
+        </a:xfrm>
+      </p:grpSpPr>
+      <p:sp>
+        <p:nvSpPr>
+          <p:cNvPr id="2" name="Slide Image Placeholder 1"/>
+          <p:cNvSpPr>
+            <a:spLocks noGrp="1" noRot="1" noChangeAspect="1"/>
+          </p:cNvSpPr>
+          <p:nvPr>
+            <p:ph type="sldImg"/>
+          </p:nvPr>
+        </p:nvSpPr>
+        <p:spPr/>
+      </p:sp>
+      <p:sp>
+        <p:nvSpPr>
+          <p:cNvPr id="3" name="Notes Placeholder 2"/>
+          <p:cNvSpPr>
+            <a:spLocks noGrp="1"/>
+          </p:cNvSpPr>
+          <p:nvPr>
+            <p:ph type="body" idx="1"/>
+          </p:nvPr>
+        </p:nvSpPr>
+        <p:spPr/>
+        <p:txBody>
+          <a:bodyPr/>
+          <a:lstStyle/>
+          <a:p>
+            <a:endParaRPr lang="en-US"/>
+          </a:p>
+        </p:txBody>
+      </p:sp>
+      <p:sp>
+        <p:nvSpPr>
+          <p:cNvPr id="4" name="Slide Number Placeholder 3"/>
+          <p:cNvSpPr>
+            <a:spLocks noGrp="1"/>
+          </p:cNvSpPr>
+          <p:nvPr>
+            <p:ph type="sldNum" sz="quarter" idx="5"/>
+          </p:nvPr>
+        </p:nvSpPr>
+        <p:spPr/>
+        <p:txBody>
+          <a:bodyPr/>
+          <a:lstStyle/>
+          <a:p>
+            <a:fld id="{469B7B05-986F-4936-8F05-5BA1BAD30E66}" type="slidenum">
+              <a:rPr lang="en-US" smtClean="0"/>
+              <a:t>6</a:t>
+            </a:fld>
+            <a:endParaRPr lang="en-US"/>
+          </a:p>
+        </p:txBody>
+      </p:sp>
+    </p:spTree>
+    <p:extLst>
+      <p:ext uri="{BB962C8B-B14F-4D97-AF65-F5344CB8AC3E}">
+        <p14:creationId xmlns:p14="http://schemas.microsoft.com/office/powerpoint/2010/main" val="3510924976"/>
+      </p:ext>
+    </p:extLst>
+  </p:cSld>
+  <p:clrMapOvr>
+    <a:masterClrMapping/>
+  </p:clrMapOvr>
+</p:notes>
+</file>
+
+<file path=ppt/notesSlides/notesSlide7.xml><?xml version="1.0" encoding="utf-8"?>
+<p:notes xmlns:a="http://schemas.openxmlformats.org/drawingml/2006/main" xmlns:r="http://schemas.openxmlformats.org/officeDocument/2006/relationships" xmlns:p="http://schemas.openxmlformats.org/presentationml/2006/main">
+  <p:cSld>
+    <p:spTree>
+      <p:nvGrpSpPr>
+        <p:cNvPr id="1" name=""/>
+        <p:cNvGrpSpPr/>
+        <p:nvPr/>
+      </p:nvGrpSpPr>
+      <p:grpSpPr>
+        <a:xfrm>
+          <a:off x="0" y="0"/>
+          <a:ext cx="0" cy="0"/>
+          <a:chOff x="0" y="0"/>
+          <a:chExt cx="0" cy="0"/>
+        </a:xfrm>
+      </p:grpSpPr>
+      <p:sp>
+        <p:nvSpPr>
+          <p:cNvPr id="2" name="Slide Image Placeholder 1"/>
+          <p:cNvSpPr>
+            <a:spLocks noGrp="1" noRot="1" noChangeAspect="1"/>
+          </p:cNvSpPr>
+          <p:nvPr>
+            <p:ph type="sldImg"/>
+          </p:nvPr>
+        </p:nvSpPr>
+        <p:spPr/>
+      </p:sp>
+      <p:sp>
+        <p:nvSpPr>
+          <p:cNvPr id="3" name="Notes Placeholder 2"/>
+          <p:cNvSpPr>
+            <a:spLocks noGrp="1"/>
+          </p:cNvSpPr>
+          <p:nvPr>
+            <p:ph type="body" idx="1"/>
+          </p:nvPr>
+        </p:nvSpPr>
+        <p:spPr/>
+        <p:txBody>
+          <a:bodyPr/>
+          <a:lstStyle/>
+          <a:p>
+            <a:endParaRPr lang="en-US"/>
+          </a:p>
+        </p:txBody>
+      </p:sp>
+      <p:sp>
+        <p:nvSpPr>
+          <p:cNvPr id="4" name="Slide Number Placeholder 3"/>
+          <p:cNvSpPr>
+            <a:spLocks noGrp="1"/>
+          </p:cNvSpPr>
+          <p:nvPr>
+            <p:ph type="sldNum" sz="quarter" idx="5"/>
+          </p:nvPr>
+        </p:nvSpPr>
+        <p:spPr/>
+        <p:txBody>
+          <a:bodyPr/>
+          <a:lstStyle/>
+          <a:p>
+            <a:fld id="{469B7B05-986F-4936-8F05-5BA1BAD30E66}" type="slidenum">
+              <a:rPr lang="en-US" smtClean="0"/>
+              <a:t>7</a:t>
+            </a:fld>
+            <a:endParaRPr lang="en-US"/>
+          </a:p>
+        </p:txBody>
+      </p:sp>
+    </p:spTree>
+    <p:extLst>
+      <p:ext uri="{BB962C8B-B14F-4D97-AF65-F5344CB8AC3E}">
+        <p14:creationId xmlns:p14="http://schemas.microsoft.com/office/powerpoint/2010/main" val="2289991307"/>
+      </p:ext>
+    </p:extLst>
+  </p:cSld>
+  <p:clrMapOvr>
+    <a:masterClrMapping/>
+  </p:clrMapOvr>
+</p:notes>
+</file>
+
+<file path=ppt/notesSlides/notesSlide8.xml><?xml version="1.0" encoding="utf-8"?>
+<p:notes xmlns:a="http://schemas.openxmlformats.org/drawingml/2006/main" xmlns:r="http://schemas.openxmlformats.org/officeDocument/2006/relationships" xmlns:p="http://schemas.openxmlformats.org/presentationml/2006/main">
+  <p:cSld>
+    <p:spTree>
+      <p:nvGrpSpPr>
+        <p:cNvPr id="1" name=""/>
+        <p:cNvGrpSpPr/>
+        <p:nvPr/>
+      </p:nvGrpSpPr>
+      <p:grpSpPr>
+        <a:xfrm>
+          <a:off x="0" y="0"/>
+          <a:ext cx="0" cy="0"/>
+          <a:chOff x="0" y="0"/>
+          <a:chExt cx="0" cy="0"/>
+        </a:xfrm>
+      </p:grpSpPr>
+      <p:sp>
+        <p:nvSpPr>
+          <p:cNvPr id="2" name="Slide Image Placeholder 1"/>
+          <p:cNvSpPr>
+            <a:spLocks noGrp="1" noRot="1" noChangeAspect="1"/>
+          </p:cNvSpPr>
+          <p:nvPr>
+            <p:ph type="sldImg"/>
+          </p:nvPr>
+        </p:nvSpPr>
+        <p:spPr/>
+      </p:sp>
+      <p:sp>
+        <p:nvSpPr>
+          <p:cNvPr id="3" name="Notes Placeholder 2"/>
+          <p:cNvSpPr>
+            <a:spLocks noGrp="1"/>
+          </p:cNvSpPr>
+          <p:nvPr>
+            <p:ph type="body" idx="1"/>
+          </p:nvPr>
+        </p:nvSpPr>
+        <p:spPr/>
+        <p:txBody>
+          <a:bodyPr/>
+          <a:lstStyle/>
+          <a:p>
+            <a:endParaRPr lang="en-US"/>
+          </a:p>
+        </p:txBody>
+      </p:sp>
+      <p:sp>
+        <p:nvSpPr>
+          <p:cNvPr id="4" name="Slide Number Placeholder 3"/>
+          <p:cNvSpPr>
+            <a:spLocks noGrp="1"/>
+          </p:cNvSpPr>
+          <p:nvPr>
+            <p:ph type="sldNum" sz="quarter" idx="5"/>
+          </p:nvPr>
+        </p:nvSpPr>
+        <p:spPr/>
+        <p:txBody>
+          <a:bodyPr/>
+          <a:lstStyle/>
+          <a:p>
+            <a:fld id="{469B7B05-986F-4936-8F05-5BA1BAD30E66}" type="slidenum">
+              <a:rPr lang="en-US" smtClean="0"/>
+              <a:t>8</a:t>
+            </a:fld>
+            <a:endParaRPr lang="en-US"/>
+          </a:p>
+        </p:txBody>
+      </p:sp>
+    </p:spTree>
+    <p:extLst>
+      <p:ext uri="{BB962C8B-B14F-4D97-AF65-F5344CB8AC3E}">
+        <p14:creationId xmlns:p14="http://schemas.microsoft.com/office/powerpoint/2010/main" val="2915256960"/>
+      </p:ext>
+    </p:extLst>
+  </p:cSld>
+  <p:clrMapOvr>
+    <a:masterClrMapping/>
+  </p:clrMapOvr>
+</p:notes>
+</file>
+
+<file path=ppt/notesSlides/notesSlide9.xml><?xml version="1.0" encoding="utf-8"?>
+<p:notes xmlns:a="http://schemas.openxmlformats.org/drawingml/2006/main" xmlns:r="http://schemas.openxmlformats.org/officeDocument/2006/relationships" xmlns:p="http://schemas.openxmlformats.org/presentationml/2006/main">
+  <p:cSld>
+    <p:spTree>
+      <p:nvGrpSpPr>
+        <p:cNvPr id="1" name=""/>
+        <p:cNvGrpSpPr/>
+        <p:nvPr/>
+      </p:nvGrpSpPr>
+      <p:grpSpPr>
+        <a:xfrm>
+          <a:off x="0" y="0"/>
+          <a:ext cx="0" cy="0"/>
+          <a:chOff x="0" y="0"/>
+          <a:chExt cx="0" cy="0"/>
+        </a:xfrm>
+      </p:grpSpPr>
+      <p:sp>
+        <p:nvSpPr>
+          <p:cNvPr id="2" name="Slide Image Placeholder 1"/>
+          <p:cNvSpPr>
+            <a:spLocks noGrp="1" noRot="1" noChangeAspect="1"/>
+          </p:cNvSpPr>
+          <p:nvPr>
+            <p:ph type="sldImg"/>
+          </p:nvPr>
+        </p:nvSpPr>
+        <p:spPr/>
+      </p:sp>
+      <p:sp>
+        <p:nvSpPr>
+          <p:cNvPr id="3" name="Notes Placeholder 2"/>
+          <p:cNvSpPr>
+            <a:spLocks noGrp="1"/>
+          </p:cNvSpPr>
+          <p:nvPr>
+            <p:ph type="body" idx="1"/>
+          </p:nvPr>
+        </p:nvSpPr>
+        <p:spPr/>
+        <p:txBody>
+          <a:bodyPr/>
+          <a:lstStyle/>
+          <a:p>
+            <a:endParaRPr lang="en-US"/>
+          </a:p>
+        </p:txBody>
+      </p:sp>
+      <p:sp>
+        <p:nvSpPr>
+          <p:cNvPr id="4" name="Slide Number Placeholder 3"/>
+          <p:cNvSpPr>
+            <a:spLocks noGrp="1"/>
+          </p:cNvSpPr>
+          <p:nvPr>
+            <p:ph type="sldNum" sz="quarter" idx="5"/>
+          </p:nvPr>
+        </p:nvSpPr>
+        <p:spPr/>
+        <p:txBody>
+          <a:bodyPr/>
+          <a:lstStyle/>
+          <a:p>
+            <a:fld id="{469B7B05-986F-4936-8F05-5BA1BAD30E66}" type="slidenum">
+              <a:rPr lang="en-US" smtClean="0"/>
+              <a:t>9</a:t>
+            </a:fld>
+            <a:endParaRPr lang="en-US"/>
+          </a:p>
+        </p:txBody>
+      </p:sp>
+    </p:spTree>
+    <p:extLst>
+      <p:ext uri="{BB962C8B-B14F-4D97-AF65-F5344CB8AC3E}">
+        <p14:creationId xmlns:p14="http://schemas.microsoft.com/office/powerpoint/2010/main" val="3202132991"/>
+      </p:ext>
+    </p:extLst>
+  </p:cSld>
+  <p:clrMapOvr>
+    <a:masterClrMapping/>
+  </p:clrMapOvr>
+</p:notes>
 </file>
 
 <file path=ppt/slideLayouts/slideLayout1.xml><?xml version="1.0" encoding="utf-8"?>
@@ -6003,7 +7699,7 @@
           </p:nvPr>
         </p:nvPicPr>
         <p:blipFill>
-          <a:blip r:embed="rId2">
+          <a:blip r:embed="rId3">
             <a:extLst>
               <a:ext uri="{28A0092B-C50C-407E-A947-70E740481C1C}">
                 <a14:useLocalDpi xmlns:a14="http://schemas.microsoft.com/office/drawing/2010/main" val="0"/>
@@ -6134,7 +7830,7 @@
           <p:nvPr/>
         </p:nvPicPr>
         <p:blipFill>
-          <a:blip r:embed="rId2"/>
+          <a:blip r:embed="rId3"/>
           <a:stretch>
             <a:fillRect/>
           </a:stretch>
@@ -6182,7 +7878,7 @@
           <a:p>
             <a:r>
               <a:rPr lang="en-IE" sz="2000" dirty="0">
-                <a:hlinkClick r:id="rId3"/>
+                <a:hlinkClick r:id="rId4"/>
               </a:rPr>
               <a:t>https://github.com/rlennon/CrowSoft</a:t>
             </a:r>
@@ -6302,7 +7998,7 @@
           </p:nvPr>
         </p:nvPicPr>
         <p:blipFill>
-          <a:blip r:embed="rId2"/>
+          <a:blip r:embed="rId3"/>
           <a:stretch>
             <a:fillRect/>
           </a:stretch>
@@ -6344,7 +8040,7 @@
           <p:nvPr/>
         </p:nvPicPr>
         <p:blipFill>
-          <a:blip r:embed="rId3"/>
+          <a:blip r:embed="rId4"/>
           <a:stretch>
             <a:fillRect/>
           </a:stretch>
@@ -6623,7 +8319,7 @@
           </p:nvPr>
         </p:nvPicPr>
         <p:blipFill>
-          <a:blip r:embed="rId2">
+          <a:blip r:embed="rId3">
             <a:extLst>
               <a:ext uri="{28A0092B-C50C-407E-A947-70E740481C1C}">
                 <a14:useLocalDpi xmlns:a14="http://schemas.microsoft.com/office/drawing/2010/main" val="0"/>
@@ -7091,8 +8787,8 @@
         </p:nvSpPr>
         <p:spPr>
           <a:xfrm>
-            <a:off x="437322" y="882595"/>
-            <a:ext cx="11306755" cy="4908605"/>
+            <a:off x="437322" y="1987826"/>
+            <a:ext cx="11306755" cy="4230095"/>
           </a:xfrm>
         </p:spPr>
         <p:txBody>
@@ -7121,15 +8817,12 @@
             </a:r>
           </a:p>
           <a:p>
-            <a:pPr marL="0" indent="0">
-              <a:buNone/>
-            </a:pPr>
             <a:r>
               <a:rPr lang="en-IE" dirty="0">
                 <a:latin typeface="Courier New" panose="02070309020205020404" pitchFamily="49" charset="0"/>
                 <a:cs typeface="Courier New" panose="02070309020205020404" pitchFamily="49" charset="0"/>
               </a:rPr>
-              <a:t>	planning to go live in the second quarter</a:t>
+              <a:t>10 week goal to have Development Running with its own Pipeline</a:t>
             </a:r>
           </a:p>
           <a:p>
@@ -7147,7 +8840,7 @@
                 <a:latin typeface="Courier New" panose="02070309020205020404" pitchFamily="49" charset="0"/>
                 <a:cs typeface="Courier New" panose="02070309020205020404" pitchFamily="49" charset="0"/>
               </a:rPr>
-              <a:t>No patents sought to date or intellectual property issues</a:t>
+              <a:t>No patents sought to date or known intellectual property issues </a:t>
             </a:r>
           </a:p>
           <a:p>
@@ -7156,7 +8849,16 @@
                 <a:latin typeface="Courier New" panose="02070309020205020404" pitchFamily="49" charset="0"/>
                 <a:cs typeface="Courier New" panose="02070309020205020404" pitchFamily="49" charset="0"/>
               </a:rPr>
-              <a:t>Due to project limitations Open Source software has been used </a:t>
+              <a:t>Due to project limitations Open Source software has been used as much as possible</a:t>
+            </a:r>
+          </a:p>
+          <a:p>
+            <a:r>
+              <a:rPr lang="en-IE" dirty="0">
+                <a:latin typeface="Courier New" panose="02070309020205020404" pitchFamily="49" charset="0"/>
+                <a:cs typeface="Courier New" panose="02070309020205020404" pitchFamily="49" charset="0"/>
+              </a:rPr>
+              <a:t>User requirements have been drawn up and approved by the product owner</a:t>
             </a:r>
           </a:p>
           <a:p>
@@ -7166,6 +8868,15 @@
                 <a:cs typeface="Courier New" panose="02070309020205020404" pitchFamily="49" charset="0"/>
               </a:rPr>
               <a:t>SLA draft is in place to be signed off by Project Owner</a:t>
+            </a:r>
+          </a:p>
+          <a:p>
+            <a:r>
+              <a:rPr lang="en-IE" dirty="0">
+                <a:latin typeface="Courier New" panose="02070309020205020404" pitchFamily="49" charset="0"/>
+                <a:cs typeface="Courier New" panose="02070309020205020404" pitchFamily="49" charset="0"/>
+              </a:rPr>
+              <a:t>Adopted Agile methodology with 1 week sprints 10 hours per person</a:t>
             </a:r>
           </a:p>
           <a:p>
@@ -7614,7 +9325,7 @@
           <p:nvPr/>
         </p:nvPicPr>
         <p:blipFill>
-          <a:blip r:embed="rId2" cstate="print">
+          <a:blip r:embed="rId3" cstate="print">
             <a:extLst>
               <a:ext uri="{28A0092B-C50C-407E-A947-70E740481C1C}">
                 <a14:useLocalDpi xmlns:a14="http://schemas.microsoft.com/office/drawing/2010/main" val="0"/>
@@ -7826,7 +9537,7 @@
           <p:nvPr/>
         </p:nvPicPr>
         <p:blipFill>
-          <a:blip r:embed="rId3" cstate="print">
+          <a:blip r:embed="rId4" cstate="print">
             <a:extLst>
               <a:ext uri="{28A0092B-C50C-407E-A947-70E740481C1C}">
                 <a14:useLocalDpi xmlns:a14="http://schemas.microsoft.com/office/drawing/2010/main" val="0"/>
@@ -8192,7 +9903,7 @@
           <p:nvPr/>
         </p:nvPicPr>
         <p:blipFill>
-          <a:blip r:embed="rId4" cstate="print">
+          <a:blip r:embed="rId5" cstate="print">
             <a:extLst>
               <a:ext uri="{28A0092B-C50C-407E-A947-70E740481C1C}">
                 <a14:useLocalDpi xmlns:a14="http://schemas.microsoft.com/office/drawing/2010/main" val="0"/>
@@ -8228,7 +9939,7 @@
           <p:nvPr/>
         </p:nvPicPr>
         <p:blipFill>
-          <a:blip r:embed="rId5" cstate="print">
+          <a:blip r:embed="rId6" cstate="print">
             <a:extLst>
               <a:ext uri="{28A0092B-C50C-407E-A947-70E740481C1C}">
                 <a14:useLocalDpi xmlns:a14="http://schemas.microsoft.com/office/drawing/2010/main" val="0"/>
@@ -8264,7 +9975,7 @@
           <p:nvPr/>
         </p:nvPicPr>
         <p:blipFill>
-          <a:blip r:embed="rId6" cstate="print">
+          <a:blip r:embed="rId7" cstate="print">
             <a:extLst>
               <a:ext uri="{28A0092B-C50C-407E-A947-70E740481C1C}">
                 <a14:useLocalDpi xmlns:a14="http://schemas.microsoft.com/office/drawing/2010/main" val="0"/>
@@ -8311,7 +10022,7 @@
           <p:nvPr/>
         </p:nvPicPr>
         <p:blipFill>
-          <a:blip r:embed="rId7" cstate="print">
+          <a:blip r:embed="rId8" cstate="print">
             <a:extLst>
               <a:ext uri="{28A0092B-C50C-407E-A947-70E740481C1C}">
                 <a14:useLocalDpi xmlns:a14="http://schemas.microsoft.com/office/drawing/2010/main" val="0"/>
@@ -8425,7 +10136,7 @@
           <p:nvPr/>
         </p:nvPicPr>
         <p:blipFill>
-          <a:blip r:embed="rId8" cstate="print">
+          <a:blip r:embed="rId9" cstate="print">
             <a:extLst>
               <a:ext uri="{28A0092B-C50C-407E-A947-70E740481C1C}">
                 <a14:useLocalDpi xmlns:a14="http://schemas.microsoft.com/office/drawing/2010/main" val="0"/>
@@ -8666,7 +10377,7 @@
           <p:nvPr/>
         </p:nvPicPr>
         <p:blipFill>
-          <a:blip r:embed="rId9" cstate="print">
+          <a:blip r:embed="rId10" cstate="print">
             <a:extLst>
               <a:ext uri="{28A0092B-C50C-407E-A947-70E740481C1C}">
                 <a14:useLocalDpi xmlns:a14="http://schemas.microsoft.com/office/drawing/2010/main" val="0"/>
@@ -9273,7 +10984,7 @@
           <p:nvPr/>
         </p:nvPicPr>
         <p:blipFill>
-          <a:blip r:embed="rId10" cstate="print"/>
+          <a:blip r:embed="rId11" cstate="print"/>
           <a:srcRect/>
           <a:stretch>
             <a:fillRect/>
@@ -9296,38 +11007,6 @@
             <a:extLst>
               <a:ext uri="{FF2B5EF4-FFF2-40B4-BE49-F238E27FC236}">
                 <a16:creationId xmlns:a16="http://schemas.microsoft.com/office/drawing/2014/main" id="{3B4F4157-5C39-468E-B4EB-4D9FFA4C75D1}"/>
-              </a:ext>
-            </a:extLst>
-          </p:cNvPr>
-          <p:cNvPicPr>
-            <a:picLocks noChangeAspect="1" noChangeArrowheads="1"/>
-          </p:cNvPicPr>
-          <p:nvPr/>
-        </p:nvPicPr>
-        <p:blipFill>
-          <a:blip r:embed="rId11" cstate="print"/>
-          <a:srcRect/>
-          <a:stretch>
-            <a:fillRect/>
-          </a:stretch>
-        </p:blipFill>
-        <p:spPr bwMode="auto">
-          <a:xfrm>
-            <a:off x="1566226" y="3626163"/>
-            <a:ext cx="1228519" cy="998281"/>
-          </a:xfrm>
-          <a:prstGeom prst="rect">
-            <a:avLst/>
-          </a:prstGeom>
-          <a:noFill/>
-        </p:spPr>
-      </p:pic>
-      <p:pic>
-        <p:nvPicPr>
-          <p:cNvPr id="31" name="Picture 30" descr="Image result for Zoom.us icon">
-            <a:extLst>
-              <a:ext uri="{FF2B5EF4-FFF2-40B4-BE49-F238E27FC236}">
-                <a16:creationId xmlns:a16="http://schemas.microsoft.com/office/drawing/2014/main" id="{2F2E3B5D-CE69-4ADA-A498-65222952DD56}"/>
               </a:ext>
             </a:extLst>
           </p:cNvPr>
@@ -9345,8 +11024,8 @@
         </p:blipFill>
         <p:spPr bwMode="auto">
           <a:xfrm>
-            <a:off x="1660714" y="4464363"/>
-            <a:ext cx="1081097" cy="213917"/>
+            <a:off x="1566226" y="3626163"/>
+            <a:ext cx="1228519" cy="998281"/>
           </a:xfrm>
           <a:prstGeom prst="rect">
             <a:avLst/>
@@ -9356,10 +11035,10 @@
       </p:pic>
       <p:pic>
         <p:nvPicPr>
-          <p:cNvPr id="32" name="Picture 31">
+          <p:cNvPr id="31" name="Picture 30" descr="Image result for Zoom.us icon">
             <a:extLst>
               <a:ext uri="{FF2B5EF4-FFF2-40B4-BE49-F238E27FC236}">
-                <a16:creationId xmlns:a16="http://schemas.microsoft.com/office/drawing/2014/main" id="{A272410F-9916-48B3-AAB7-2F12300A37B1}"/>
+                <a16:creationId xmlns:a16="http://schemas.microsoft.com/office/drawing/2014/main" id="{2F2E3B5D-CE69-4ADA-A498-65222952DD56}"/>
               </a:ext>
             </a:extLst>
           </p:cNvPr>
@@ -9377,221 +11056,21 @@
         </p:blipFill>
         <p:spPr bwMode="auto">
           <a:xfrm>
-            <a:off x="1556066" y="3626163"/>
-            <a:ext cx="1310420" cy="213917"/>
+            <a:off x="1660714" y="4464363"/>
+            <a:ext cx="1081097" cy="213917"/>
           </a:xfrm>
           <a:prstGeom prst="rect">
             <a:avLst/>
           </a:prstGeom>
           <a:noFill/>
-          <a:ln w="9525">
-            <a:noFill/>
-            <a:miter lim="800000"/>
-            <a:headEnd/>
-            <a:tailEnd/>
-          </a:ln>
-          <a:effectLst/>
         </p:spPr>
       </p:pic>
-      <p:sp>
-        <p:nvSpPr>
-          <p:cNvPr id="33" name="TextBox 60">
+      <p:pic>
+        <p:nvPicPr>
+          <p:cNvPr id="32" name="Picture 31">
             <a:extLst>
               <a:ext uri="{FF2B5EF4-FFF2-40B4-BE49-F238E27FC236}">
-                <a16:creationId xmlns:a16="http://schemas.microsoft.com/office/drawing/2014/main" id="{E61ACCCE-3C6E-46EB-B66E-50745C51DE4A}"/>
-              </a:ext>
-            </a:extLst>
-          </p:cNvPr>
-          <p:cNvSpPr txBox="1"/>
-          <p:nvPr/>
-        </p:nvSpPr>
-        <p:spPr>
-          <a:xfrm>
-            <a:off x="6087036" y="6140763"/>
-            <a:ext cx="1879050" cy="523220"/>
-          </a:xfrm>
-          <a:prstGeom prst="rect">
-            <a:avLst/>
-          </a:prstGeom>
-          <a:noFill/>
-        </p:spPr>
-        <p:txBody>
-          <a:bodyPr wrap="square" rtlCol="0">
-            <a:spAutoFit/>
-          </a:bodyPr>
-          <a:lstStyle>
-            <a:defPPr>
-              <a:defRPr lang="en-US"/>
-            </a:defPPr>
-            <a:lvl1pPr marL="0" algn="l" defTabSz="914400" rtl="0" eaLnBrk="1" latinLnBrk="0" hangingPunct="1">
-              <a:defRPr sz="1800" kern="1200">
-                <a:solidFill>
-                  <a:schemeClr val="tx1"/>
-                </a:solidFill>
-                <a:latin typeface="+mn-lt"/>
-                <a:ea typeface="+mn-ea"/>
-                <a:cs typeface="+mn-cs"/>
-              </a:defRPr>
-            </a:lvl1pPr>
-            <a:lvl2pPr marL="457200" algn="l" defTabSz="914400" rtl="0" eaLnBrk="1" latinLnBrk="0" hangingPunct="1">
-              <a:defRPr sz="1800" kern="1200">
-                <a:solidFill>
-                  <a:schemeClr val="tx1"/>
-                </a:solidFill>
-                <a:latin typeface="+mn-lt"/>
-                <a:ea typeface="+mn-ea"/>
-                <a:cs typeface="+mn-cs"/>
-              </a:defRPr>
-            </a:lvl2pPr>
-            <a:lvl3pPr marL="914400" algn="l" defTabSz="914400" rtl="0" eaLnBrk="1" latinLnBrk="0" hangingPunct="1">
-              <a:defRPr sz="1800" kern="1200">
-                <a:solidFill>
-                  <a:schemeClr val="tx1"/>
-                </a:solidFill>
-                <a:latin typeface="+mn-lt"/>
-                <a:ea typeface="+mn-ea"/>
-                <a:cs typeface="+mn-cs"/>
-              </a:defRPr>
-            </a:lvl3pPr>
-            <a:lvl4pPr marL="1371600" algn="l" defTabSz="914400" rtl="0" eaLnBrk="1" latinLnBrk="0" hangingPunct="1">
-              <a:defRPr sz="1800" kern="1200">
-                <a:solidFill>
-                  <a:schemeClr val="tx1"/>
-                </a:solidFill>
-                <a:latin typeface="+mn-lt"/>
-                <a:ea typeface="+mn-ea"/>
-                <a:cs typeface="+mn-cs"/>
-              </a:defRPr>
-            </a:lvl4pPr>
-            <a:lvl5pPr marL="1828800" algn="l" defTabSz="914400" rtl="0" eaLnBrk="1" latinLnBrk="0" hangingPunct="1">
-              <a:defRPr sz="1800" kern="1200">
-                <a:solidFill>
-                  <a:schemeClr val="tx1"/>
-                </a:solidFill>
-                <a:latin typeface="+mn-lt"/>
-                <a:ea typeface="+mn-ea"/>
-                <a:cs typeface="+mn-cs"/>
-              </a:defRPr>
-            </a:lvl5pPr>
-            <a:lvl6pPr marL="2286000" algn="l" defTabSz="914400" rtl="0" eaLnBrk="1" latinLnBrk="0" hangingPunct="1">
-              <a:defRPr sz="1800" kern="1200">
-                <a:solidFill>
-                  <a:schemeClr val="tx1"/>
-                </a:solidFill>
-                <a:latin typeface="+mn-lt"/>
-                <a:ea typeface="+mn-ea"/>
-                <a:cs typeface="+mn-cs"/>
-              </a:defRPr>
-            </a:lvl6pPr>
-            <a:lvl7pPr marL="2743200" algn="l" defTabSz="914400" rtl="0" eaLnBrk="1" latinLnBrk="0" hangingPunct="1">
-              <a:defRPr sz="1800" kern="1200">
-                <a:solidFill>
-                  <a:schemeClr val="tx1"/>
-                </a:solidFill>
-                <a:latin typeface="+mn-lt"/>
-                <a:ea typeface="+mn-ea"/>
-                <a:cs typeface="+mn-cs"/>
-              </a:defRPr>
-            </a:lvl7pPr>
-            <a:lvl8pPr marL="3200400" algn="l" defTabSz="914400" rtl="0" eaLnBrk="1" latinLnBrk="0" hangingPunct="1">
-              <a:defRPr sz="1800" kern="1200">
-                <a:solidFill>
-                  <a:schemeClr val="tx1"/>
-                </a:solidFill>
-                <a:latin typeface="+mn-lt"/>
-                <a:ea typeface="+mn-ea"/>
-                <a:cs typeface="+mn-cs"/>
-              </a:defRPr>
-            </a:lvl8pPr>
-            <a:lvl9pPr marL="3657600" algn="l" defTabSz="914400" rtl="0" eaLnBrk="1" latinLnBrk="0" hangingPunct="1">
-              <a:defRPr sz="1800" kern="1200">
-                <a:solidFill>
-                  <a:schemeClr val="tx1"/>
-                </a:solidFill>
-                <a:latin typeface="+mn-lt"/>
-                <a:ea typeface="+mn-ea"/>
-                <a:cs typeface="+mn-cs"/>
-              </a:defRPr>
-            </a:lvl9pPr>
-          </a:lstStyle>
-          <a:p>
-            <a:pPr algn="ctr"/>
-            <a:r>
-              <a:rPr lang="en-IE" sz="1400" dirty="0" err="1">
-                <a:solidFill>
-                  <a:schemeClr val="bg1"/>
-                </a:solidFill>
-                <a:effectLst>
-                  <a:outerShdw blurRad="38100" dist="38100" dir="2700000" algn="tl">
-                    <a:srgbClr val="000000">
-                      <a:alpha val="43137"/>
-                    </a:srgbClr>
-                  </a:outerShdw>
-                </a:effectLst>
-                <a:latin typeface="Britannic Bold" pitchFamily="34" charset="0"/>
-              </a:rPr>
-              <a:t>Wrk</a:t>
-            </a:r>
-            <a:r>
-              <a:rPr lang="en-IE" sz="1400" dirty="0">
-                <a:solidFill>
-                  <a:schemeClr val="bg1"/>
-                </a:solidFill>
-                <a:effectLst>
-                  <a:outerShdw blurRad="38100" dist="38100" dir="2700000" algn="tl">
-                    <a:srgbClr val="000000">
-                      <a:alpha val="43137"/>
-                    </a:srgbClr>
-                  </a:outerShdw>
-                </a:effectLst>
-                <a:latin typeface="Britannic Bold" pitchFamily="34" charset="0"/>
-              </a:rPr>
-              <a:t> </a:t>
-            </a:r>
-          </a:p>
-          <a:p>
-            <a:pPr algn="ctr"/>
-            <a:r>
-              <a:rPr lang="en-IE" sz="1400" dirty="0" err="1">
-                <a:solidFill>
-                  <a:schemeClr val="bg1"/>
-                </a:solidFill>
-                <a:effectLst>
-                  <a:outerShdw blurRad="38100" dist="38100" dir="2700000" algn="tl">
-                    <a:srgbClr val="000000">
-                      <a:alpha val="43137"/>
-                    </a:srgbClr>
-                  </a:outerShdw>
-                </a:effectLst>
-                <a:latin typeface="Britannic Bold" pitchFamily="34" charset="0"/>
-              </a:rPr>
-              <a:t>Performce</a:t>
-            </a:r>
-            <a:r>
-              <a:rPr lang="en-IE" sz="1400" dirty="0">
-                <a:solidFill>
-                  <a:schemeClr val="bg1"/>
-                </a:solidFill>
-                <a:effectLst>
-                  <a:outerShdw blurRad="38100" dist="38100" dir="2700000" algn="tl">
-                    <a:srgbClr val="000000">
-                      <a:alpha val="43137"/>
-                    </a:srgbClr>
-                  </a:outerShdw>
-                </a:effectLst>
-                <a:latin typeface="Britannic Bold" pitchFamily="34" charset="0"/>
-              </a:rPr>
-              <a:t> Tests</a:t>
-            </a:r>
-          </a:p>
-        </p:txBody>
-      </p:sp>
-      <p:pic>
-        <p:nvPicPr>
-          <p:cNvPr id="34" name="Picture 33" descr="Related image">
-            <a:extLst>
-              <a:ext uri="{FF2B5EF4-FFF2-40B4-BE49-F238E27FC236}">
-                <a16:creationId xmlns:a16="http://schemas.microsoft.com/office/drawing/2014/main" id="{008D268E-D1DB-43FB-9F12-C5E2CCA12318}"/>
+                <a16:creationId xmlns:a16="http://schemas.microsoft.com/office/drawing/2014/main" id="{A272410F-9916-48B3-AAB7-2F12300A37B1}"/>
               </a:ext>
             </a:extLst>
           </p:cNvPr>
@@ -9609,21 +11088,221 @@
         </p:blipFill>
         <p:spPr bwMode="auto">
           <a:xfrm>
-            <a:off x="5300026" y="5988363"/>
-            <a:ext cx="1099037" cy="427835"/>
+            <a:off x="1556066" y="3626163"/>
+            <a:ext cx="1310420" cy="213917"/>
           </a:xfrm>
           <a:prstGeom prst="rect">
             <a:avLst/>
           </a:prstGeom>
           <a:noFill/>
+          <a:ln w="9525">
+            <a:noFill/>
+            <a:miter lim="800000"/>
+            <a:headEnd/>
+            <a:tailEnd/>
+          </a:ln>
+          <a:effectLst/>
         </p:spPr>
       </p:pic>
+      <p:sp>
+        <p:nvSpPr>
+          <p:cNvPr id="33" name="TextBox 60">
+            <a:extLst>
+              <a:ext uri="{FF2B5EF4-FFF2-40B4-BE49-F238E27FC236}">
+                <a16:creationId xmlns:a16="http://schemas.microsoft.com/office/drawing/2014/main" id="{E61ACCCE-3C6E-46EB-B66E-50745C51DE4A}"/>
+              </a:ext>
+            </a:extLst>
+          </p:cNvPr>
+          <p:cNvSpPr txBox="1"/>
+          <p:nvPr/>
+        </p:nvSpPr>
+        <p:spPr>
+          <a:xfrm>
+            <a:off x="6087036" y="6140763"/>
+            <a:ext cx="1879050" cy="523220"/>
+          </a:xfrm>
+          <a:prstGeom prst="rect">
+            <a:avLst/>
+          </a:prstGeom>
+          <a:noFill/>
+        </p:spPr>
+        <p:txBody>
+          <a:bodyPr wrap="square" rtlCol="0">
+            <a:spAutoFit/>
+          </a:bodyPr>
+          <a:lstStyle>
+            <a:defPPr>
+              <a:defRPr lang="en-US"/>
+            </a:defPPr>
+            <a:lvl1pPr marL="0" algn="l" defTabSz="914400" rtl="0" eaLnBrk="1" latinLnBrk="0" hangingPunct="1">
+              <a:defRPr sz="1800" kern="1200">
+                <a:solidFill>
+                  <a:schemeClr val="tx1"/>
+                </a:solidFill>
+                <a:latin typeface="+mn-lt"/>
+                <a:ea typeface="+mn-ea"/>
+                <a:cs typeface="+mn-cs"/>
+              </a:defRPr>
+            </a:lvl1pPr>
+            <a:lvl2pPr marL="457200" algn="l" defTabSz="914400" rtl="0" eaLnBrk="1" latinLnBrk="0" hangingPunct="1">
+              <a:defRPr sz="1800" kern="1200">
+                <a:solidFill>
+                  <a:schemeClr val="tx1"/>
+                </a:solidFill>
+                <a:latin typeface="+mn-lt"/>
+                <a:ea typeface="+mn-ea"/>
+                <a:cs typeface="+mn-cs"/>
+              </a:defRPr>
+            </a:lvl2pPr>
+            <a:lvl3pPr marL="914400" algn="l" defTabSz="914400" rtl="0" eaLnBrk="1" latinLnBrk="0" hangingPunct="1">
+              <a:defRPr sz="1800" kern="1200">
+                <a:solidFill>
+                  <a:schemeClr val="tx1"/>
+                </a:solidFill>
+                <a:latin typeface="+mn-lt"/>
+                <a:ea typeface="+mn-ea"/>
+                <a:cs typeface="+mn-cs"/>
+              </a:defRPr>
+            </a:lvl3pPr>
+            <a:lvl4pPr marL="1371600" algn="l" defTabSz="914400" rtl="0" eaLnBrk="1" latinLnBrk="0" hangingPunct="1">
+              <a:defRPr sz="1800" kern="1200">
+                <a:solidFill>
+                  <a:schemeClr val="tx1"/>
+                </a:solidFill>
+                <a:latin typeface="+mn-lt"/>
+                <a:ea typeface="+mn-ea"/>
+                <a:cs typeface="+mn-cs"/>
+              </a:defRPr>
+            </a:lvl4pPr>
+            <a:lvl5pPr marL="1828800" algn="l" defTabSz="914400" rtl="0" eaLnBrk="1" latinLnBrk="0" hangingPunct="1">
+              <a:defRPr sz="1800" kern="1200">
+                <a:solidFill>
+                  <a:schemeClr val="tx1"/>
+                </a:solidFill>
+                <a:latin typeface="+mn-lt"/>
+                <a:ea typeface="+mn-ea"/>
+                <a:cs typeface="+mn-cs"/>
+              </a:defRPr>
+            </a:lvl5pPr>
+            <a:lvl6pPr marL="2286000" algn="l" defTabSz="914400" rtl="0" eaLnBrk="1" latinLnBrk="0" hangingPunct="1">
+              <a:defRPr sz="1800" kern="1200">
+                <a:solidFill>
+                  <a:schemeClr val="tx1"/>
+                </a:solidFill>
+                <a:latin typeface="+mn-lt"/>
+                <a:ea typeface="+mn-ea"/>
+                <a:cs typeface="+mn-cs"/>
+              </a:defRPr>
+            </a:lvl6pPr>
+            <a:lvl7pPr marL="2743200" algn="l" defTabSz="914400" rtl="0" eaLnBrk="1" latinLnBrk="0" hangingPunct="1">
+              <a:defRPr sz="1800" kern="1200">
+                <a:solidFill>
+                  <a:schemeClr val="tx1"/>
+                </a:solidFill>
+                <a:latin typeface="+mn-lt"/>
+                <a:ea typeface="+mn-ea"/>
+                <a:cs typeface="+mn-cs"/>
+              </a:defRPr>
+            </a:lvl7pPr>
+            <a:lvl8pPr marL="3200400" algn="l" defTabSz="914400" rtl="0" eaLnBrk="1" latinLnBrk="0" hangingPunct="1">
+              <a:defRPr sz="1800" kern="1200">
+                <a:solidFill>
+                  <a:schemeClr val="tx1"/>
+                </a:solidFill>
+                <a:latin typeface="+mn-lt"/>
+                <a:ea typeface="+mn-ea"/>
+                <a:cs typeface="+mn-cs"/>
+              </a:defRPr>
+            </a:lvl8pPr>
+            <a:lvl9pPr marL="3657600" algn="l" defTabSz="914400" rtl="0" eaLnBrk="1" latinLnBrk="0" hangingPunct="1">
+              <a:defRPr sz="1800" kern="1200">
+                <a:solidFill>
+                  <a:schemeClr val="tx1"/>
+                </a:solidFill>
+                <a:latin typeface="+mn-lt"/>
+                <a:ea typeface="+mn-ea"/>
+                <a:cs typeface="+mn-cs"/>
+              </a:defRPr>
+            </a:lvl9pPr>
+          </a:lstStyle>
+          <a:p>
+            <a:pPr algn="ctr"/>
+            <a:r>
+              <a:rPr lang="en-IE" sz="1400" dirty="0" err="1">
+                <a:solidFill>
+                  <a:schemeClr val="bg1"/>
+                </a:solidFill>
+                <a:effectLst>
+                  <a:outerShdw blurRad="38100" dist="38100" dir="2700000" algn="tl">
+                    <a:srgbClr val="000000">
+                      <a:alpha val="43137"/>
+                    </a:srgbClr>
+                  </a:outerShdw>
+                </a:effectLst>
+                <a:latin typeface="Britannic Bold" pitchFamily="34" charset="0"/>
+              </a:rPr>
+              <a:t>Wrk</a:t>
+            </a:r>
+            <a:r>
+              <a:rPr lang="en-IE" sz="1400" dirty="0">
+                <a:solidFill>
+                  <a:schemeClr val="bg1"/>
+                </a:solidFill>
+                <a:effectLst>
+                  <a:outerShdw blurRad="38100" dist="38100" dir="2700000" algn="tl">
+                    <a:srgbClr val="000000">
+                      <a:alpha val="43137"/>
+                    </a:srgbClr>
+                  </a:outerShdw>
+                </a:effectLst>
+                <a:latin typeface="Britannic Bold" pitchFamily="34" charset="0"/>
+              </a:rPr>
+              <a:t> </a:t>
+            </a:r>
+          </a:p>
+          <a:p>
+            <a:pPr algn="ctr"/>
+            <a:r>
+              <a:rPr lang="en-IE" sz="1400" dirty="0" err="1">
+                <a:solidFill>
+                  <a:schemeClr val="bg1"/>
+                </a:solidFill>
+                <a:effectLst>
+                  <a:outerShdw blurRad="38100" dist="38100" dir="2700000" algn="tl">
+                    <a:srgbClr val="000000">
+                      <a:alpha val="43137"/>
+                    </a:srgbClr>
+                  </a:outerShdw>
+                </a:effectLst>
+                <a:latin typeface="Britannic Bold" pitchFamily="34" charset="0"/>
+              </a:rPr>
+              <a:t>Performce</a:t>
+            </a:r>
+            <a:r>
+              <a:rPr lang="en-IE" sz="1400" dirty="0">
+                <a:solidFill>
+                  <a:schemeClr val="bg1"/>
+                </a:solidFill>
+                <a:effectLst>
+                  <a:outerShdw blurRad="38100" dist="38100" dir="2700000" algn="tl">
+                    <a:srgbClr val="000000">
+                      <a:alpha val="43137"/>
+                    </a:srgbClr>
+                  </a:outerShdw>
+                </a:effectLst>
+                <a:latin typeface="Britannic Bold" pitchFamily="34" charset="0"/>
+              </a:rPr>
+              <a:t> Tests</a:t>
+            </a:r>
+          </a:p>
+        </p:txBody>
+      </p:sp>
       <p:pic>
         <p:nvPicPr>
-          <p:cNvPr id="35" name="Picture 34" descr="Related image">
+          <p:cNvPr id="34" name="Picture 33" descr="Related image">
             <a:extLst>
               <a:ext uri="{FF2B5EF4-FFF2-40B4-BE49-F238E27FC236}">
-                <a16:creationId xmlns:a16="http://schemas.microsoft.com/office/drawing/2014/main" id="{4861B1E8-4350-452C-B15F-DCAF10295865}"/>
+                <a16:creationId xmlns:a16="http://schemas.microsoft.com/office/drawing/2014/main" id="{008D268E-D1DB-43FB-9F12-C5E2CCA12318}"/>
               </a:ext>
             </a:extLst>
           </p:cNvPr>
@@ -9641,8 +11320,8 @@
         </p:blipFill>
         <p:spPr bwMode="auto">
           <a:xfrm>
-            <a:off x="8652826" y="3549963"/>
-            <a:ext cx="1507601" cy="371503"/>
+            <a:off x="5300026" y="5988363"/>
+            <a:ext cx="1099037" cy="427835"/>
           </a:xfrm>
           <a:prstGeom prst="rect">
             <a:avLst/>
@@ -9652,10 +11331,10 @@
       </p:pic>
       <p:pic>
         <p:nvPicPr>
-          <p:cNvPr id="36" name="Picture 35" descr="Related image">
+          <p:cNvPr id="35" name="Picture 34" descr="Related image">
             <a:extLst>
               <a:ext uri="{FF2B5EF4-FFF2-40B4-BE49-F238E27FC236}">
-                <a16:creationId xmlns:a16="http://schemas.microsoft.com/office/drawing/2014/main" id="{5019FCB9-A345-42F5-9602-81AE2CA39175}"/>
+                <a16:creationId xmlns:a16="http://schemas.microsoft.com/office/drawing/2014/main" id="{4861B1E8-4350-452C-B15F-DCAF10295865}"/>
               </a:ext>
             </a:extLst>
           </p:cNvPr>
@@ -9673,8 +11352,8 @@
         </p:blipFill>
         <p:spPr bwMode="auto">
           <a:xfrm>
-            <a:off x="9033826" y="3854763"/>
-            <a:ext cx="765175" cy="716029"/>
+            <a:off x="8652826" y="3549963"/>
+            <a:ext cx="1507601" cy="371503"/>
           </a:xfrm>
           <a:prstGeom prst="rect">
             <a:avLst/>
@@ -9684,10 +11363,10 @@
       </p:pic>
       <p:pic>
         <p:nvPicPr>
-          <p:cNvPr id="38" name="Picture 37" descr="Image result for monit icon images">
+          <p:cNvPr id="36" name="Picture 35" descr="Related image">
             <a:extLst>
               <a:ext uri="{FF2B5EF4-FFF2-40B4-BE49-F238E27FC236}">
-                <a16:creationId xmlns:a16="http://schemas.microsoft.com/office/drawing/2014/main" id="{AAFFF1A1-64CD-49A6-8815-15B8508ADC74}"/>
+                <a16:creationId xmlns:a16="http://schemas.microsoft.com/office/drawing/2014/main" id="{5019FCB9-A345-42F5-9602-81AE2CA39175}"/>
               </a:ext>
             </a:extLst>
           </p:cNvPr>
@@ -9705,6 +11384,38 @@
         </p:blipFill>
         <p:spPr bwMode="auto">
           <a:xfrm>
+            <a:off x="9033826" y="3854763"/>
+            <a:ext cx="765175" cy="716029"/>
+          </a:xfrm>
+          <a:prstGeom prst="rect">
+            <a:avLst/>
+          </a:prstGeom>
+          <a:noFill/>
+        </p:spPr>
+      </p:pic>
+      <p:pic>
+        <p:nvPicPr>
+          <p:cNvPr id="38" name="Picture 37" descr="Image result for monit icon images">
+            <a:extLst>
+              <a:ext uri="{FF2B5EF4-FFF2-40B4-BE49-F238E27FC236}">
+                <a16:creationId xmlns:a16="http://schemas.microsoft.com/office/drawing/2014/main" id="{AAFFF1A1-64CD-49A6-8815-15B8508ADC74}"/>
+              </a:ext>
+            </a:extLst>
+          </p:cNvPr>
+          <p:cNvPicPr>
+            <a:picLocks noChangeAspect="1" noChangeArrowheads="1"/>
+          </p:cNvPicPr>
+          <p:nvPr/>
+        </p:nvPicPr>
+        <p:blipFill>
+          <a:blip r:embed="rId18" cstate="print"/>
+          <a:srcRect/>
+          <a:stretch>
+            <a:fillRect/>
+          </a:stretch>
+        </p:blipFill>
+        <p:spPr bwMode="auto">
+          <a:xfrm>
             <a:off x="8500426" y="5531163"/>
             <a:ext cx="2057400" cy="979818"/>
           </a:xfrm>
@@ -9723,7 +11434,7 @@
           <p:nvPr/>
         </p:nvPicPr>
         <p:blipFill>
-          <a:blip r:embed="rId18">
+          <a:blip r:embed="rId19">
             <a:extLst>
               <a:ext uri="{28A0092B-C50C-407E-A947-70E740481C1C}">
                 <a14:useLocalDpi xmlns:a14="http://schemas.microsoft.com/office/drawing/2010/main" val="0"/>
@@ -9907,7 +11618,7 @@
           </p:nvPr>
         </p:nvPicPr>
         <p:blipFill>
-          <a:blip r:embed="rId2" cstate="print"/>
+          <a:blip r:embed="rId3" cstate="print"/>
           <a:stretch>
             <a:fillRect/>
           </a:stretch>
@@ -9939,7 +11650,7 @@
           <p:nvPr/>
         </p:nvPicPr>
         <p:blipFill>
-          <a:blip r:embed="rId3">
+          <a:blip r:embed="rId4">
             <a:extLst>
               <a:ext uri="{28A0092B-C50C-407E-A947-70E740481C1C}">
                 <a14:useLocalDpi xmlns:a14="http://schemas.microsoft.com/office/drawing/2010/main" val="0"/>
@@ -10009,7 +11720,7 @@
           <p:nvPr/>
         </p:nvPicPr>
         <p:blipFill>
-          <a:blip r:embed="rId4" cstate="print">
+          <a:blip r:embed="rId5" cstate="print">
             <a:extLst>
               <a:ext uri="{28A0092B-C50C-407E-A947-70E740481C1C}">
                 <a14:useLocalDpi xmlns:a14="http://schemas.microsoft.com/office/drawing/2010/main" val="0"/>
@@ -10147,7 +11858,7 @@
           <p:nvPr/>
         </p:nvPicPr>
         <p:blipFill>
-          <a:blip r:embed="rId2">
+          <a:blip r:embed="rId3">
             <a:extLst>
               <a:ext uri="{28A0092B-C50C-407E-A947-70E740481C1C}">
                 <a14:useLocalDpi xmlns:a14="http://schemas.microsoft.com/office/drawing/2010/main" val="0"/>
@@ -10230,7 +11941,7 @@
           <p:nvPr/>
         </p:nvPicPr>
         <p:blipFill>
-          <a:blip r:embed="rId3">
+          <a:blip r:embed="rId4">
             <a:extLst>
               <a:ext uri="{28A0092B-C50C-407E-A947-70E740481C1C}">
                 <a14:useLocalDpi xmlns:a14="http://schemas.microsoft.com/office/drawing/2010/main" val="0"/>
@@ -10410,7 +12121,7 @@
           <p:nvPr/>
         </p:nvPicPr>
         <p:blipFill>
-          <a:blip r:embed="rId2" cstate="print">
+          <a:blip r:embed="rId3" cstate="print">
             <a:extLst>
               <a:ext uri="{28A0092B-C50C-407E-A947-70E740481C1C}">
                 <a14:useLocalDpi xmlns:a14="http://schemas.microsoft.com/office/drawing/2010/main" val="0"/>
@@ -10445,331 +12156,6 @@
       <p:pic>
         <p:nvPicPr>
           <p:cNvPr id="1026" name="Picture 2"/>
-          <p:cNvPicPr>
-            <a:picLocks noChangeAspect="1" noChangeArrowheads="1"/>
-          </p:cNvPicPr>
-          <p:nvPr/>
-        </p:nvPicPr>
-        <p:blipFill>
-          <a:blip r:embed="rId3">
-            <a:extLst>
-              <a:ext uri="{28A0092B-C50C-407E-A947-70E740481C1C}">
-                <a14:useLocalDpi xmlns:a14="http://schemas.microsoft.com/office/drawing/2010/main" val="0"/>
-              </a:ext>
-            </a:extLst>
-          </a:blip>
-          <a:srcRect/>
-          <a:stretch>
-            <a:fillRect/>
-          </a:stretch>
-        </p:blipFill>
-        <p:spPr bwMode="auto">
-          <a:xfrm>
-            <a:off x="322729" y="4242919"/>
-            <a:ext cx="1640542" cy="1398602"/>
-          </a:xfrm>
-          <a:prstGeom prst="rect">
-            <a:avLst/>
-          </a:prstGeom>
-          <a:noFill/>
-          <a:ln>
-            <a:noFill/>
-          </a:ln>
-          <a:effectLst/>
-          <a:extLst>
-            <a:ext uri="{909E8E84-426E-40DD-AFC4-6F175D3DCCD1}">
-              <a14:hiddenFill xmlns:a14="http://schemas.microsoft.com/office/drawing/2010/main">
-                <a:solidFill>
-                  <a:schemeClr val="accent1"/>
-                </a:solidFill>
-              </a14:hiddenFill>
-            </a:ext>
-            <a:ext uri="{91240B29-F687-4F45-9708-019B960494DF}">
-              <a14:hiddenLine xmlns:a14="http://schemas.microsoft.com/office/drawing/2010/main" w="9525">
-                <a:solidFill>
-                  <a:schemeClr val="tx1"/>
-                </a:solidFill>
-                <a:miter lim="800000"/>
-                <a:headEnd/>
-                <a:tailEnd/>
-              </a14:hiddenLine>
-            </a:ext>
-            <a:ext uri="{AF507438-7753-43E0-B8FC-AC1667EBCBE1}">
-              <a14:hiddenEffects xmlns:a14="http://schemas.microsoft.com/office/drawing/2010/main">
-                <a:effectLst>
-                  <a:outerShdw dist="35921" dir="2700000" algn="ctr" rotWithShape="0">
-                    <a:schemeClr val="bg2"/>
-                  </a:outerShdw>
-                </a:effectLst>
-              </a14:hiddenEffects>
-            </a:ext>
-          </a:extLst>
-        </p:spPr>
-      </p:pic>
-      <p:sp>
-        <p:nvSpPr>
-          <p:cNvPr id="41" name="Rounded Rectangle 40"/>
-          <p:cNvSpPr/>
-          <p:nvPr/>
-        </p:nvSpPr>
-        <p:spPr>
-          <a:xfrm>
-            <a:off x="2743200" y="4442974"/>
-            <a:ext cx="2205317" cy="2397095"/>
-          </a:xfrm>
-          <a:prstGeom prst="roundRect">
-            <a:avLst/>
-          </a:prstGeom>
-        </p:spPr>
-        <p:style>
-          <a:lnRef idx="2">
-            <a:schemeClr val="accent1">
-              <a:shade val="50000"/>
-            </a:schemeClr>
-          </a:lnRef>
-          <a:fillRef idx="1">
-            <a:schemeClr val="accent1"/>
-          </a:fillRef>
-          <a:effectRef idx="0">
-            <a:schemeClr val="accent1"/>
-          </a:effectRef>
-          <a:fontRef idx="minor">
-            <a:schemeClr val="lt1"/>
-          </a:fontRef>
-        </p:style>
-        <p:txBody>
-          <a:bodyPr rtlCol="0" anchor="ctr"/>
-          <a:lstStyle/>
-          <a:p>
-            <a:pPr algn="ctr"/>
-            <a:r>
-              <a:rPr lang="en-IE" sz="1400" dirty="0">
-                <a:latin typeface="Courier New" panose="02070309020205020404" pitchFamily="49" charset="0"/>
-                <a:cs typeface="Courier New" panose="02070309020205020404" pitchFamily="49" charset="0"/>
-              </a:rPr>
-              <a:t>Jenkins	</a:t>
-            </a:r>
-          </a:p>
-          <a:p>
-            <a:pPr algn="ctr"/>
-            <a:r>
-              <a:rPr lang="en-IE" sz="1400" dirty="0">
-                <a:latin typeface="Courier New" panose="02070309020205020404" pitchFamily="49" charset="0"/>
-                <a:cs typeface="Courier New" panose="02070309020205020404" pitchFamily="49" charset="0"/>
-              </a:rPr>
-              <a:t>Java </a:t>
-            </a:r>
-          </a:p>
-          <a:p>
-            <a:pPr algn="ctr"/>
-            <a:r>
-              <a:rPr lang="en-IE" sz="1400" dirty="0">
-                <a:latin typeface="Courier New" panose="02070309020205020404" pitchFamily="49" charset="0"/>
-                <a:cs typeface="Courier New" panose="02070309020205020404" pitchFamily="49" charset="0"/>
-              </a:rPr>
-              <a:t>Open SSH</a:t>
-            </a:r>
-          </a:p>
-          <a:p>
-            <a:pPr algn="ctr"/>
-            <a:r>
-              <a:rPr lang="en-IE" sz="1400" dirty="0">
-                <a:latin typeface="Courier New" panose="02070309020205020404" pitchFamily="49" charset="0"/>
-                <a:cs typeface="Courier New" panose="02070309020205020404" pitchFamily="49" charset="0"/>
-              </a:rPr>
-              <a:t>Putty </a:t>
-            </a:r>
-          </a:p>
-          <a:p>
-            <a:pPr algn="ctr"/>
-            <a:r>
-              <a:rPr lang="en-IE" sz="1400" dirty="0">
-                <a:latin typeface="Courier New" panose="02070309020205020404" pitchFamily="49" charset="0"/>
-                <a:cs typeface="Courier New" panose="02070309020205020404" pitchFamily="49" charset="0"/>
-              </a:rPr>
-              <a:t>Git</a:t>
-            </a:r>
-          </a:p>
-          <a:p>
-            <a:pPr algn="ctr"/>
-            <a:r>
-              <a:rPr lang="en-IE" sz="1400" dirty="0" err="1">
-                <a:latin typeface="Courier New" panose="02070309020205020404" pitchFamily="49" charset="0"/>
-                <a:cs typeface="Courier New" panose="02070309020205020404" pitchFamily="49" charset="0"/>
-              </a:rPr>
-              <a:t>Ansible</a:t>
-            </a:r>
-            <a:endParaRPr lang="en-IE" sz="1400" dirty="0">
-              <a:latin typeface="Courier New" panose="02070309020205020404" pitchFamily="49" charset="0"/>
-              <a:cs typeface="Courier New" panose="02070309020205020404" pitchFamily="49" charset="0"/>
-            </a:endParaRPr>
-          </a:p>
-          <a:p>
-            <a:pPr algn="ctr"/>
-            <a:r>
-              <a:rPr lang="en-IE" sz="1400" dirty="0" err="1">
-                <a:latin typeface="Courier New" panose="02070309020205020404" pitchFamily="49" charset="0"/>
-                <a:cs typeface="Courier New" panose="02070309020205020404" pitchFamily="49" charset="0"/>
-              </a:rPr>
-              <a:t>Jfrog</a:t>
-            </a:r>
-            <a:r>
-              <a:rPr lang="en-IE" sz="1400" dirty="0">
-                <a:latin typeface="Courier New" panose="02070309020205020404" pitchFamily="49" charset="0"/>
-                <a:cs typeface="Courier New" panose="02070309020205020404" pitchFamily="49" charset="0"/>
-              </a:rPr>
-              <a:t> </a:t>
-            </a:r>
-            <a:r>
-              <a:rPr lang="en-IE" sz="1400" dirty="0" err="1">
-                <a:latin typeface="Courier New" panose="02070309020205020404" pitchFamily="49" charset="0"/>
-                <a:cs typeface="Courier New" panose="02070309020205020404" pitchFamily="49" charset="0"/>
-              </a:rPr>
-              <a:t>Artifactory</a:t>
-            </a:r>
-            <a:endParaRPr lang="en-IE" sz="1400" dirty="0">
-              <a:latin typeface="Courier New" panose="02070309020205020404" pitchFamily="49" charset="0"/>
-              <a:cs typeface="Courier New" panose="02070309020205020404" pitchFamily="49" charset="0"/>
-            </a:endParaRPr>
-          </a:p>
-          <a:p>
-            <a:pPr algn="ctr"/>
-            <a:r>
-              <a:rPr lang="en-IE" sz="1400" dirty="0">
-                <a:latin typeface="Courier New" panose="02070309020205020404" pitchFamily="49" charset="0"/>
-                <a:cs typeface="Courier New" panose="02070309020205020404" pitchFamily="49" charset="0"/>
-              </a:rPr>
-              <a:t>Selenium</a:t>
-            </a:r>
-          </a:p>
-        </p:txBody>
-      </p:sp>
-      <p:sp>
-        <p:nvSpPr>
-          <p:cNvPr id="49" name="Rounded Rectangle 48"/>
-          <p:cNvSpPr/>
-          <p:nvPr/>
-        </p:nvSpPr>
-        <p:spPr>
-          <a:xfrm flipH="1">
-            <a:off x="6304718" y="4374776"/>
-            <a:ext cx="2166929" cy="2303929"/>
-          </a:xfrm>
-          <a:prstGeom prst="roundRect">
-            <a:avLst>
-              <a:gd name="adj" fmla="val 17356"/>
-            </a:avLst>
-          </a:prstGeom>
-        </p:spPr>
-        <p:style>
-          <a:lnRef idx="2">
-            <a:schemeClr val="accent1">
-              <a:shade val="50000"/>
-            </a:schemeClr>
-          </a:lnRef>
-          <a:fillRef idx="1">
-            <a:schemeClr val="accent1"/>
-          </a:fillRef>
-          <a:effectRef idx="0">
-            <a:schemeClr val="accent1"/>
-          </a:effectRef>
-          <a:fontRef idx="minor">
-            <a:schemeClr val="lt1"/>
-          </a:fontRef>
-        </p:style>
-        <p:txBody>
-          <a:bodyPr rtlCol="0" anchor="ctr"/>
-          <a:lstStyle/>
-          <a:p>
-            <a:pPr algn="ctr"/>
-            <a:r>
-              <a:rPr lang="en-IE" sz="1400" dirty="0">
-                <a:latin typeface="Courier New" panose="02070309020205020404" pitchFamily="49" charset="0"/>
-                <a:cs typeface="Courier New" panose="02070309020205020404" pitchFamily="49" charset="0"/>
-              </a:rPr>
-              <a:t>Ubuntu 16.04</a:t>
-            </a:r>
-          </a:p>
-          <a:p>
-            <a:pPr algn="ctr"/>
-            <a:r>
-              <a:rPr lang="en-IE" sz="1400" dirty="0">
-                <a:latin typeface="Courier New" panose="02070309020205020404" pitchFamily="49" charset="0"/>
-                <a:cs typeface="Courier New" panose="02070309020205020404" pitchFamily="49" charset="0"/>
-              </a:rPr>
-              <a:t>.NET Core</a:t>
-            </a:r>
-          </a:p>
-          <a:p>
-            <a:pPr algn="ctr"/>
-            <a:r>
-              <a:rPr lang="en-IE" sz="1400" dirty="0">
-                <a:latin typeface="Courier New" panose="02070309020205020404" pitchFamily="49" charset="0"/>
-                <a:cs typeface="Courier New" panose="02070309020205020404" pitchFamily="49" charset="0"/>
-              </a:rPr>
-              <a:t>MySQL</a:t>
-            </a:r>
-          </a:p>
-          <a:p>
-            <a:pPr algn="ctr"/>
-            <a:r>
-              <a:rPr lang="en-IE" sz="1400" dirty="0" err="1">
-                <a:latin typeface="Courier New" panose="02070309020205020404" pitchFamily="49" charset="0"/>
-                <a:cs typeface="Courier New" panose="02070309020205020404" pitchFamily="49" charset="0"/>
-              </a:rPr>
-              <a:t>Nunit</a:t>
-            </a:r>
-            <a:endParaRPr lang="en-IE" sz="1400" dirty="0">
-              <a:latin typeface="Courier New" panose="02070309020205020404" pitchFamily="49" charset="0"/>
-              <a:cs typeface="Courier New" panose="02070309020205020404" pitchFamily="49" charset="0"/>
-            </a:endParaRPr>
-          </a:p>
-          <a:p>
-            <a:pPr algn="ctr"/>
-            <a:r>
-              <a:rPr lang="en-IE" sz="1400" dirty="0" err="1">
-                <a:latin typeface="Courier New" panose="02070309020205020404" pitchFamily="49" charset="0"/>
-                <a:cs typeface="Courier New" panose="02070309020205020404" pitchFamily="49" charset="0"/>
-              </a:rPr>
-              <a:t>Monit</a:t>
-            </a:r>
-            <a:endParaRPr lang="en-IE" sz="1400" dirty="0">
-              <a:latin typeface="Courier New" panose="02070309020205020404" pitchFamily="49" charset="0"/>
-              <a:cs typeface="Courier New" panose="02070309020205020404" pitchFamily="49" charset="0"/>
-            </a:endParaRPr>
-          </a:p>
-          <a:p>
-            <a:pPr algn="ctr"/>
-            <a:r>
-              <a:rPr lang="en-IE" sz="1400" dirty="0">
-                <a:latin typeface="Courier New" panose="02070309020205020404" pitchFamily="49" charset="0"/>
-                <a:cs typeface="Courier New" panose="02070309020205020404" pitchFamily="49" charset="0"/>
-              </a:rPr>
-              <a:t>Open SSH</a:t>
-            </a:r>
-          </a:p>
-          <a:p>
-            <a:pPr algn="ctr"/>
-            <a:r>
-              <a:rPr lang="en-IE" sz="1400" dirty="0" err="1">
-                <a:latin typeface="Courier New" panose="02070309020205020404" pitchFamily="49" charset="0"/>
-                <a:cs typeface="Courier New" panose="02070309020205020404" pitchFamily="49" charset="0"/>
-              </a:rPr>
-              <a:t>Wk</a:t>
-            </a:r>
-            <a:r>
-              <a:rPr lang="en-IE" sz="1400" dirty="0">
-                <a:latin typeface="Courier New" panose="02070309020205020404" pitchFamily="49" charset="0"/>
-                <a:cs typeface="Courier New" panose="02070309020205020404" pitchFamily="49" charset="0"/>
-              </a:rPr>
-              <a:t> Per. Tests</a:t>
-            </a:r>
-          </a:p>
-        </p:txBody>
-      </p:sp>
-      <p:pic>
-        <p:nvPicPr>
-          <p:cNvPr id="1031" name="Picture 7"/>
           <p:cNvPicPr>
             <a:picLocks noChangeAspect="1" noChangeArrowheads="1"/>
           </p:cNvPicPr>
@@ -10790,8 +12176,8 @@
         </p:blipFill>
         <p:spPr bwMode="auto">
           <a:xfrm>
-            <a:off x="2474259" y="1235066"/>
-            <a:ext cx="2844574" cy="3516228"/>
+            <a:off x="322729" y="4242919"/>
+            <a:ext cx="1640542" cy="1398602"/>
           </a:xfrm>
           <a:prstGeom prst="rect">
             <a:avLst/>
@@ -10831,16 +12217,277 @@
           </a:extLst>
         </p:spPr>
       </p:pic>
+      <p:sp>
+        <p:nvSpPr>
+          <p:cNvPr id="41" name="Rounded Rectangle 40"/>
+          <p:cNvSpPr/>
+          <p:nvPr/>
+        </p:nvSpPr>
+        <p:spPr>
+          <a:xfrm>
+            <a:off x="2743200" y="4442974"/>
+            <a:ext cx="2205317" cy="2397095"/>
+          </a:xfrm>
+          <a:prstGeom prst="roundRect">
+            <a:avLst/>
+          </a:prstGeom>
+        </p:spPr>
+        <p:style>
+          <a:lnRef idx="2">
+            <a:schemeClr val="accent1">
+              <a:shade val="50000"/>
+            </a:schemeClr>
+          </a:lnRef>
+          <a:fillRef idx="1">
+            <a:schemeClr val="accent1"/>
+          </a:fillRef>
+          <a:effectRef idx="0">
+            <a:schemeClr val="accent1"/>
+          </a:effectRef>
+          <a:fontRef idx="minor">
+            <a:schemeClr val="lt1"/>
+          </a:fontRef>
+        </p:style>
+        <p:txBody>
+          <a:bodyPr rtlCol="0" anchor="ctr"/>
+          <a:lstStyle/>
+          <a:p>
+            <a:pPr algn="ctr"/>
+            <a:r>
+              <a:rPr lang="en-IE" sz="1400" dirty="0">
+                <a:latin typeface="Courier New" panose="02070309020205020404" pitchFamily="49" charset="0"/>
+                <a:cs typeface="Courier New" panose="02070309020205020404" pitchFamily="49" charset="0"/>
+              </a:rPr>
+              <a:t>Jenkins	</a:t>
+            </a:r>
+          </a:p>
+          <a:p>
+            <a:pPr algn="ctr"/>
+            <a:r>
+              <a:rPr lang="en-IE" sz="1400" dirty="0">
+                <a:latin typeface="Courier New" panose="02070309020205020404" pitchFamily="49" charset="0"/>
+                <a:cs typeface="Courier New" panose="02070309020205020404" pitchFamily="49" charset="0"/>
+              </a:rPr>
+              <a:t>Java </a:t>
+            </a:r>
+          </a:p>
+          <a:p>
+            <a:pPr algn="ctr"/>
+            <a:r>
+              <a:rPr lang="en-IE" sz="1400" dirty="0">
+                <a:latin typeface="Courier New" panose="02070309020205020404" pitchFamily="49" charset="0"/>
+                <a:cs typeface="Courier New" panose="02070309020205020404" pitchFamily="49" charset="0"/>
+              </a:rPr>
+              <a:t>Open SSH</a:t>
+            </a:r>
+          </a:p>
+          <a:p>
+            <a:pPr algn="ctr"/>
+            <a:r>
+              <a:rPr lang="en-IE" sz="1400" dirty="0">
+                <a:latin typeface="Courier New" panose="02070309020205020404" pitchFamily="49" charset="0"/>
+                <a:cs typeface="Courier New" panose="02070309020205020404" pitchFamily="49" charset="0"/>
+              </a:rPr>
+              <a:t>Putty </a:t>
+            </a:r>
+          </a:p>
+          <a:p>
+            <a:pPr algn="ctr"/>
+            <a:r>
+              <a:rPr lang="en-IE" sz="1400" dirty="0">
+                <a:latin typeface="Courier New" panose="02070309020205020404" pitchFamily="49" charset="0"/>
+                <a:cs typeface="Courier New" panose="02070309020205020404" pitchFamily="49" charset="0"/>
+              </a:rPr>
+              <a:t>Git</a:t>
+            </a:r>
+          </a:p>
+          <a:p>
+            <a:pPr algn="ctr"/>
+            <a:r>
+              <a:rPr lang="en-IE" sz="1400" dirty="0" err="1">
+                <a:latin typeface="Courier New" panose="02070309020205020404" pitchFamily="49" charset="0"/>
+                <a:cs typeface="Courier New" panose="02070309020205020404" pitchFamily="49" charset="0"/>
+              </a:rPr>
+              <a:t>Ansible</a:t>
+            </a:r>
+            <a:endParaRPr lang="en-IE" sz="1400" dirty="0">
+              <a:latin typeface="Courier New" panose="02070309020205020404" pitchFamily="49" charset="0"/>
+              <a:cs typeface="Courier New" panose="02070309020205020404" pitchFamily="49" charset="0"/>
+            </a:endParaRPr>
+          </a:p>
+          <a:p>
+            <a:pPr algn="ctr"/>
+            <a:r>
+              <a:rPr lang="en-IE" sz="1400" dirty="0" err="1">
+                <a:latin typeface="Courier New" panose="02070309020205020404" pitchFamily="49" charset="0"/>
+                <a:cs typeface="Courier New" panose="02070309020205020404" pitchFamily="49" charset="0"/>
+              </a:rPr>
+              <a:t>Jfrog</a:t>
+            </a:r>
+            <a:r>
+              <a:rPr lang="en-IE" sz="1400" dirty="0">
+                <a:latin typeface="Courier New" panose="02070309020205020404" pitchFamily="49" charset="0"/>
+                <a:cs typeface="Courier New" panose="02070309020205020404" pitchFamily="49" charset="0"/>
+              </a:rPr>
+              <a:t> </a:t>
+            </a:r>
+            <a:r>
+              <a:rPr lang="en-IE" sz="1400" dirty="0" err="1">
+                <a:latin typeface="Courier New" panose="02070309020205020404" pitchFamily="49" charset="0"/>
+                <a:cs typeface="Courier New" panose="02070309020205020404" pitchFamily="49" charset="0"/>
+              </a:rPr>
+              <a:t>Artifactory</a:t>
+            </a:r>
+            <a:endParaRPr lang="en-IE" sz="1400" dirty="0">
+              <a:latin typeface="Courier New" panose="02070309020205020404" pitchFamily="49" charset="0"/>
+              <a:cs typeface="Courier New" panose="02070309020205020404" pitchFamily="49" charset="0"/>
+            </a:endParaRPr>
+          </a:p>
+          <a:p>
+            <a:pPr algn="ctr"/>
+            <a:r>
+              <a:rPr lang="en-IE" sz="1400" dirty="0">
+                <a:latin typeface="Courier New" panose="02070309020205020404" pitchFamily="49" charset="0"/>
+                <a:cs typeface="Courier New" panose="02070309020205020404" pitchFamily="49" charset="0"/>
+              </a:rPr>
+              <a:t>Selenium</a:t>
+            </a:r>
+          </a:p>
+        </p:txBody>
+      </p:sp>
+      <p:sp>
+        <p:nvSpPr>
+          <p:cNvPr id="49" name="Rounded Rectangle 48"/>
+          <p:cNvSpPr/>
+          <p:nvPr/>
+        </p:nvSpPr>
+        <p:spPr>
+          <a:xfrm flipH="1">
+            <a:off x="6304718" y="4374776"/>
+            <a:ext cx="2166929" cy="2303929"/>
+          </a:xfrm>
+          <a:prstGeom prst="roundRect">
+            <a:avLst>
+              <a:gd name="adj" fmla="val 17356"/>
+            </a:avLst>
+          </a:prstGeom>
+        </p:spPr>
+        <p:style>
+          <a:lnRef idx="2">
+            <a:schemeClr val="accent1">
+              <a:shade val="50000"/>
+            </a:schemeClr>
+          </a:lnRef>
+          <a:fillRef idx="1">
+            <a:schemeClr val="accent1"/>
+          </a:fillRef>
+          <a:effectRef idx="0">
+            <a:schemeClr val="accent1"/>
+          </a:effectRef>
+          <a:fontRef idx="minor">
+            <a:schemeClr val="lt1"/>
+          </a:fontRef>
+        </p:style>
+        <p:txBody>
+          <a:bodyPr rtlCol="0" anchor="ctr"/>
+          <a:lstStyle/>
+          <a:p>
+            <a:pPr algn="ctr"/>
+            <a:r>
+              <a:rPr lang="en-IE" sz="1400" dirty="0">
+                <a:latin typeface="Courier New" panose="02070309020205020404" pitchFamily="49" charset="0"/>
+                <a:cs typeface="Courier New" panose="02070309020205020404" pitchFamily="49" charset="0"/>
+              </a:rPr>
+              <a:t>Ubuntu 16.04</a:t>
+            </a:r>
+          </a:p>
+          <a:p>
+            <a:pPr algn="ctr"/>
+            <a:r>
+              <a:rPr lang="en-IE" sz="1400" dirty="0">
+                <a:latin typeface="Courier New" panose="02070309020205020404" pitchFamily="49" charset="0"/>
+                <a:cs typeface="Courier New" panose="02070309020205020404" pitchFamily="49" charset="0"/>
+              </a:rPr>
+              <a:t>.NET Core</a:t>
+            </a:r>
+          </a:p>
+          <a:p>
+            <a:pPr algn="ctr"/>
+            <a:r>
+              <a:rPr lang="en-IE" sz="1400" dirty="0">
+                <a:latin typeface="Courier New" panose="02070309020205020404" pitchFamily="49" charset="0"/>
+                <a:cs typeface="Courier New" panose="02070309020205020404" pitchFamily="49" charset="0"/>
+              </a:rPr>
+              <a:t>MySQL</a:t>
+            </a:r>
+          </a:p>
+          <a:p>
+            <a:pPr algn="ctr"/>
+            <a:r>
+              <a:rPr lang="en-IE" sz="1400" dirty="0" err="1">
+                <a:latin typeface="Courier New" panose="02070309020205020404" pitchFamily="49" charset="0"/>
+                <a:cs typeface="Courier New" panose="02070309020205020404" pitchFamily="49" charset="0"/>
+              </a:rPr>
+              <a:t>Nunit</a:t>
+            </a:r>
+            <a:endParaRPr lang="en-IE" sz="1400" dirty="0">
+              <a:latin typeface="Courier New" panose="02070309020205020404" pitchFamily="49" charset="0"/>
+              <a:cs typeface="Courier New" panose="02070309020205020404" pitchFamily="49" charset="0"/>
+            </a:endParaRPr>
+          </a:p>
+          <a:p>
+            <a:pPr algn="ctr"/>
+            <a:r>
+              <a:rPr lang="en-IE" sz="1400" dirty="0" err="1">
+                <a:latin typeface="Courier New" panose="02070309020205020404" pitchFamily="49" charset="0"/>
+                <a:cs typeface="Courier New" panose="02070309020205020404" pitchFamily="49" charset="0"/>
+              </a:rPr>
+              <a:t>Monit</a:t>
+            </a:r>
+            <a:endParaRPr lang="en-IE" sz="1400" dirty="0">
+              <a:latin typeface="Courier New" panose="02070309020205020404" pitchFamily="49" charset="0"/>
+              <a:cs typeface="Courier New" panose="02070309020205020404" pitchFamily="49" charset="0"/>
+            </a:endParaRPr>
+          </a:p>
+          <a:p>
+            <a:pPr algn="ctr"/>
+            <a:r>
+              <a:rPr lang="en-IE" sz="1400" dirty="0">
+                <a:latin typeface="Courier New" panose="02070309020205020404" pitchFamily="49" charset="0"/>
+                <a:cs typeface="Courier New" panose="02070309020205020404" pitchFamily="49" charset="0"/>
+              </a:rPr>
+              <a:t>Open SSH</a:t>
+            </a:r>
+          </a:p>
+          <a:p>
+            <a:pPr algn="ctr"/>
+            <a:r>
+              <a:rPr lang="en-IE" sz="1400" dirty="0" err="1">
+                <a:latin typeface="Courier New" panose="02070309020205020404" pitchFamily="49" charset="0"/>
+                <a:cs typeface="Courier New" panose="02070309020205020404" pitchFamily="49" charset="0"/>
+              </a:rPr>
+              <a:t>Wk</a:t>
+            </a:r>
+            <a:r>
+              <a:rPr lang="en-IE" sz="1400" dirty="0">
+                <a:latin typeface="Courier New" panose="02070309020205020404" pitchFamily="49" charset="0"/>
+                <a:cs typeface="Courier New" panose="02070309020205020404" pitchFamily="49" charset="0"/>
+              </a:rPr>
+              <a:t> Per. Tests</a:t>
+            </a:r>
+          </a:p>
+        </p:txBody>
+      </p:sp>
       <p:pic>
         <p:nvPicPr>
-          <p:cNvPr id="1030" name="Picture 6" descr="C:\Users\KK\AppData\Local\Microsoft\Windows\Temporary Internet Files\Content.IE5\KASK9R65\Gorilla-server.svg[1].png"/>
+          <p:cNvPr id="1031" name="Picture 7"/>
           <p:cNvPicPr>
             <a:picLocks noChangeAspect="1" noChangeArrowheads="1"/>
           </p:cNvPicPr>
           <p:nvPr/>
         </p:nvPicPr>
         <p:blipFill>
-          <a:blip r:embed="rId5" cstate="print">
+          <a:blip r:embed="rId5">
             <a:extLst>
               <a:ext uri="{28A0092B-C50C-407E-A947-70E740481C1C}">
                 <a14:useLocalDpi xmlns:a14="http://schemas.microsoft.com/office/drawing/2010/main" val="0"/>
@@ -10854,136 +12501,50 @@
         </p:blipFill>
         <p:spPr bwMode="auto">
           <a:xfrm>
-            <a:off x="6051176" y="1235065"/>
-            <a:ext cx="2907096" cy="3407963"/>
+            <a:off x="2474259" y="1235066"/>
+            <a:ext cx="2844574" cy="3516228"/>
           </a:xfrm>
           <a:prstGeom prst="rect">
             <a:avLst/>
           </a:prstGeom>
           <a:noFill/>
+          <a:ln>
+            <a:noFill/>
+          </a:ln>
+          <a:effectLst/>
           <a:extLst>
             <a:ext uri="{909E8E84-426E-40DD-AFC4-6F175D3DCCD1}">
               <a14:hiddenFill xmlns:a14="http://schemas.microsoft.com/office/drawing/2010/main">
                 <a:solidFill>
-                  <a:srgbClr val="FFFFFF"/>
+                  <a:schemeClr val="accent1"/>
                 </a:solidFill>
               </a14:hiddenFill>
             </a:ext>
+            <a:ext uri="{91240B29-F687-4F45-9708-019B960494DF}">
+              <a14:hiddenLine xmlns:a14="http://schemas.microsoft.com/office/drawing/2010/main" w="9525">
+                <a:solidFill>
+                  <a:schemeClr val="tx1"/>
+                </a:solidFill>
+                <a:miter lim="800000"/>
+                <a:headEnd/>
+                <a:tailEnd/>
+              </a14:hiddenLine>
+            </a:ext>
+            <a:ext uri="{AF507438-7753-43E0-B8FC-AC1667EBCBE1}">
+              <a14:hiddenEffects xmlns:a14="http://schemas.microsoft.com/office/drawing/2010/main">
+                <a:effectLst>
+                  <a:outerShdw dist="35921" dir="2700000" algn="ctr" rotWithShape="0">
+                    <a:schemeClr val="bg2"/>
+                  </a:outerShdw>
+                </a:effectLst>
+              </a14:hiddenEffects>
+            </a:ext>
           </a:extLst>
         </p:spPr>
       </p:pic>
-      <p:sp>
-        <p:nvSpPr>
-          <p:cNvPr id="2" name="Title 1">
-            <a:extLst>
-              <a:ext uri="{FF2B5EF4-FFF2-40B4-BE49-F238E27FC236}">
-                <a16:creationId xmlns:a16="http://schemas.microsoft.com/office/drawing/2014/main" id="{F80389EE-9E58-48FF-89C5-3FBADBA31B30}"/>
-              </a:ext>
-            </a:extLst>
-          </p:cNvPr>
-          <p:cNvSpPr>
-            <a:spLocks noGrp="1"/>
-          </p:cNvSpPr>
-          <p:nvPr>
-            <p:ph type="title"/>
-          </p:nvPr>
-        </p:nvSpPr>
-        <p:spPr>
-          <a:xfrm>
-            <a:off x="394447" y="71718"/>
-            <a:ext cx="9690848" cy="787024"/>
-          </a:xfrm>
-        </p:spPr>
-        <p:txBody>
-          <a:bodyPr>
-            <a:normAutofit fontScale="90000"/>
-          </a:bodyPr>
-          <a:lstStyle/>
-          <a:p>
-            <a:r>
-              <a:rPr lang="en-US" sz="2200" b="1" dirty="0">
-                <a:effectLst/>
-              </a:rPr>
-              <a:t>Development Environment </a:t>
-            </a:r>
-            <a:br>
-              <a:rPr lang="en-US" b="1" dirty="0">
-                <a:effectLst/>
-              </a:rPr>
-            </a:br>
-            <a:endParaRPr lang="en-US" dirty="0"/>
-          </a:p>
-        </p:txBody>
-      </p:sp>
-      <p:sp>
-        <p:nvSpPr>
-          <p:cNvPr id="39" name="TextBox 38"/>
-          <p:cNvSpPr txBox="1"/>
-          <p:nvPr/>
-        </p:nvSpPr>
-        <p:spPr>
-          <a:xfrm>
-            <a:off x="5844988" y="735106"/>
-            <a:ext cx="3603812" cy="369332"/>
-          </a:xfrm>
-          <a:prstGeom prst="rect">
-            <a:avLst/>
-          </a:prstGeom>
-          <a:noFill/>
-        </p:spPr>
-        <p:txBody>
-          <a:bodyPr wrap="square" rtlCol="0">
-            <a:spAutoFit/>
-          </a:bodyPr>
-          <a:lstStyle/>
-          <a:p>
-            <a:pPr algn="ctr"/>
-            <a:r>
-              <a:rPr lang="en-IE" b="1" dirty="0">
-                <a:latin typeface="Courier New" panose="02070309020205020404" pitchFamily="49" charset="0"/>
-                <a:cs typeface="Courier New" panose="02070309020205020404" pitchFamily="49" charset="0"/>
-              </a:rPr>
-              <a:t>Dev Server</a:t>
-            </a:r>
-          </a:p>
-        </p:txBody>
-      </p:sp>
-      <p:sp>
-        <p:nvSpPr>
-          <p:cNvPr id="40" name="TextBox 39"/>
-          <p:cNvSpPr txBox="1"/>
-          <p:nvPr/>
-        </p:nvSpPr>
-        <p:spPr>
-          <a:xfrm>
-            <a:off x="2743201" y="784089"/>
-            <a:ext cx="2614252" cy="369332"/>
-          </a:xfrm>
-          <a:prstGeom prst="rect">
-            <a:avLst/>
-          </a:prstGeom>
-          <a:noFill/>
-        </p:spPr>
-        <p:txBody>
-          <a:bodyPr wrap="square" rtlCol="0">
-            <a:spAutoFit/>
-          </a:bodyPr>
-          <a:lstStyle/>
-          <a:p>
-            <a:pPr algn="ctr"/>
-            <a:r>
-              <a:rPr lang="en-IE" b="1" dirty="0">
-                <a:latin typeface="Courier New" panose="02070309020205020404" pitchFamily="49" charset="0"/>
-                <a:cs typeface="Courier New" panose="02070309020205020404" pitchFamily="49" charset="0"/>
-              </a:rPr>
-              <a:t>Jenkins Server</a:t>
-            </a:r>
-          </a:p>
-        </p:txBody>
-      </p:sp>
       <p:pic>
         <p:nvPicPr>
-          <p:cNvPr id="2050" name="Picture 2"/>
+          <p:cNvPr id="1030" name="Picture 6" descr="C:\Users\KK\AppData\Local\Microsoft\Windows\Temporary Internet Files\Content.IE5\KASK9R65\Gorilla-server.svg[1].png"/>
           <p:cNvPicPr>
             <a:picLocks noChangeAspect="1" noChangeArrowheads="1"/>
           </p:cNvPicPr>
@@ -11004,6 +12565,156 @@
         </p:blipFill>
         <p:spPr bwMode="auto">
           <a:xfrm>
+            <a:off x="6051176" y="1235065"/>
+            <a:ext cx="2907096" cy="3407963"/>
+          </a:xfrm>
+          <a:prstGeom prst="rect">
+            <a:avLst/>
+          </a:prstGeom>
+          <a:noFill/>
+          <a:extLst>
+            <a:ext uri="{909E8E84-426E-40DD-AFC4-6F175D3DCCD1}">
+              <a14:hiddenFill xmlns:a14="http://schemas.microsoft.com/office/drawing/2010/main">
+                <a:solidFill>
+                  <a:srgbClr val="FFFFFF"/>
+                </a:solidFill>
+              </a14:hiddenFill>
+            </a:ext>
+          </a:extLst>
+        </p:spPr>
+      </p:pic>
+      <p:sp>
+        <p:nvSpPr>
+          <p:cNvPr id="2" name="Title 1">
+            <a:extLst>
+              <a:ext uri="{FF2B5EF4-FFF2-40B4-BE49-F238E27FC236}">
+                <a16:creationId xmlns:a16="http://schemas.microsoft.com/office/drawing/2014/main" id="{F80389EE-9E58-48FF-89C5-3FBADBA31B30}"/>
+              </a:ext>
+            </a:extLst>
+          </p:cNvPr>
+          <p:cNvSpPr>
+            <a:spLocks noGrp="1"/>
+          </p:cNvSpPr>
+          <p:nvPr>
+            <p:ph type="title"/>
+          </p:nvPr>
+        </p:nvSpPr>
+        <p:spPr>
+          <a:xfrm>
+            <a:off x="394447" y="71718"/>
+            <a:ext cx="9690848" cy="787024"/>
+          </a:xfrm>
+        </p:spPr>
+        <p:txBody>
+          <a:bodyPr>
+            <a:normAutofit fontScale="90000"/>
+          </a:bodyPr>
+          <a:lstStyle/>
+          <a:p>
+            <a:r>
+              <a:rPr lang="en-US" sz="2200" b="1" dirty="0">
+                <a:effectLst/>
+              </a:rPr>
+              <a:t>Development Environment </a:t>
+            </a:r>
+            <a:br>
+              <a:rPr lang="en-US" b="1" dirty="0">
+                <a:effectLst/>
+              </a:rPr>
+            </a:br>
+            <a:endParaRPr lang="en-US" dirty="0"/>
+          </a:p>
+        </p:txBody>
+      </p:sp>
+      <p:sp>
+        <p:nvSpPr>
+          <p:cNvPr id="39" name="TextBox 38"/>
+          <p:cNvSpPr txBox="1"/>
+          <p:nvPr/>
+        </p:nvSpPr>
+        <p:spPr>
+          <a:xfrm>
+            <a:off x="5844988" y="735106"/>
+            <a:ext cx="3603812" cy="369332"/>
+          </a:xfrm>
+          <a:prstGeom prst="rect">
+            <a:avLst/>
+          </a:prstGeom>
+          <a:noFill/>
+        </p:spPr>
+        <p:txBody>
+          <a:bodyPr wrap="square" rtlCol="0">
+            <a:spAutoFit/>
+          </a:bodyPr>
+          <a:lstStyle/>
+          <a:p>
+            <a:pPr algn="ctr"/>
+            <a:r>
+              <a:rPr lang="en-IE" b="1" dirty="0">
+                <a:latin typeface="Courier New" panose="02070309020205020404" pitchFamily="49" charset="0"/>
+                <a:cs typeface="Courier New" panose="02070309020205020404" pitchFamily="49" charset="0"/>
+              </a:rPr>
+              <a:t>Dev Server</a:t>
+            </a:r>
+          </a:p>
+        </p:txBody>
+      </p:sp>
+      <p:sp>
+        <p:nvSpPr>
+          <p:cNvPr id="40" name="TextBox 39"/>
+          <p:cNvSpPr txBox="1"/>
+          <p:nvPr/>
+        </p:nvSpPr>
+        <p:spPr>
+          <a:xfrm>
+            <a:off x="2743201" y="784089"/>
+            <a:ext cx="2614252" cy="369332"/>
+          </a:xfrm>
+          <a:prstGeom prst="rect">
+            <a:avLst/>
+          </a:prstGeom>
+          <a:noFill/>
+        </p:spPr>
+        <p:txBody>
+          <a:bodyPr wrap="square" rtlCol="0">
+            <a:spAutoFit/>
+          </a:bodyPr>
+          <a:lstStyle/>
+          <a:p>
+            <a:pPr algn="ctr"/>
+            <a:r>
+              <a:rPr lang="en-IE" b="1" dirty="0">
+                <a:latin typeface="Courier New" panose="02070309020205020404" pitchFamily="49" charset="0"/>
+                <a:cs typeface="Courier New" panose="02070309020205020404" pitchFamily="49" charset="0"/>
+              </a:rPr>
+              <a:t>Jenkins Server</a:t>
+            </a:r>
+          </a:p>
+        </p:txBody>
+      </p:sp>
+      <p:pic>
+        <p:nvPicPr>
+          <p:cNvPr id="2050" name="Picture 2"/>
+          <p:cNvPicPr>
+            <a:picLocks noChangeAspect="1" noChangeArrowheads="1"/>
+          </p:cNvPicPr>
+          <p:nvPr/>
+        </p:nvPicPr>
+        <p:blipFill>
+          <a:blip r:embed="rId7" cstate="print">
+            <a:extLst>
+              <a:ext uri="{28A0092B-C50C-407E-A947-70E740481C1C}">
+                <a14:useLocalDpi xmlns:a14="http://schemas.microsoft.com/office/drawing/2010/main" val="0"/>
+              </a:ext>
+            </a:extLst>
+          </a:blip>
+          <a:srcRect/>
+          <a:stretch>
+            <a:fillRect/>
+          </a:stretch>
+        </p:blipFill>
+        <p:spPr bwMode="auto">
+          <a:xfrm>
             <a:off x="8606118" y="3371363"/>
             <a:ext cx="2365310" cy="2590888"/>
           </a:xfrm>
@@ -11054,7 +12765,7 @@
           <p:nvPr/>
         </p:nvPicPr>
         <p:blipFill>
-          <a:blip r:embed="rId3">
+          <a:blip r:embed="rId4">
             <a:extLst>
               <a:ext uri="{28A0092B-C50C-407E-A947-70E740481C1C}">
                 <a14:useLocalDpi xmlns:a14="http://schemas.microsoft.com/office/drawing/2010/main" val="0"/>
@@ -11517,7 +13228,7 @@
           </p:nvPr>
         </p:nvPicPr>
         <p:blipFill>
-          <a:blip r:embed="rId2">
+          <a:blip r:embed="rId3">
             <a:extLst>
               <a:ext uri="{28A0092B-C50C-407E-A947-70E740481C1C}">
                 <a14:useLocalDpi xmlns:a14="http://schemas.microsoft.com/office/drawing/2010/main" val="0"/>
@@ -11669,7 +13380,7 @@
           <p:nvPr/>
         </p:nvPicPr>
         <p:blipFill>
-          <a:blip r:embed="rId2" cstate="print"/>
+          <a:blip r:embed="rId3" cstate="print"/>
           <a:srcRect/>
           <a:stretch>
             <a:fillRect/>
@@ -11703,7 +13414,7 @@
           <p:nvPr/>
         </p:nvPicPr>
         <p:blipFill>
-          <a:blip r:embed="rId3">
+          <a:blip r:embed="rId4">
             <a:extLst>
               <a:ext uri="{28A0092B-C50C-407E-A947-70E740481C1C}">
                 <a14:useLocalDpi xmlns:a14="http://schemas.microsoft.com/office/drawing/2010/main" val="0"/>
@@ -12158,4 +13869,299 @@
     </a:ext>
   </a:extLst>
 </a:theme>
+</file>
+
+<file path=ppt/theme/theme2.xml><?xml version="1.0" encoding="utf-8"?>
+<a:theme xmlns:a="http://schemas.openxmlformats.org/drawingml/2006/main" name="Office Theme">
+  <a:themeElements>
+    <a:clrScheme name="Office">
+      <a:dk1>
+        <a:sysClr val="windowText" lastClr="000000"/>
+      </a:dk1>
+      <a:lt1>
+        <a:sysClr val="window" lastClr="FFFFFF"/>
+      </a:lt1>
+      <a:dk2>
+        <a:srgbClr val="44546A"/>
+      </a:dk2>
+      <a:lt2>
+        <a:srgbClr val="E7E6E6"/>
+      </a:lt2>
+      <a:accent1>
+        <a:srgbClr val="4472C4"/>
+      </a:accent1>
+      <a:accent2>
+        <a:srgbClr val="ED7D31"/>
+      </a:accent2>
+      <a:accent3>
+        <a:srgbClr val="A5A5A5"/>
+      </a:accent3>
+      <a:accent4>
+        <a:srgbClr val="FFC000"/>
+      </a:accent4>
+      <a:accent5>
+        <a:srgbClr val="5B9BD5"/>
+      </a:accent5>
+      <a:accent6>
+        <a:srgbClr val="70AD47"/>
+      </a:accent6>
+      <a:hlink>
+        <a:srgbClr val="0563C1"/>
+      </a:hlink>
+      <a:folHlink>
+        <a:srgbClr val="954F72"/>
+      </a:folHlink>
+    </a:clrScheme>
+    <a:fontScheme name="Office">
+      <a:majorFont>
+        <a:latin typeface="Calibri Light" panose="020F0302020204030204"/>
+        <a:ea typeface=""/>
+        <a:cs typeface=""/>
+        <a:font script="Jpan" typeface="游ゴシック Light"/>
+        <a:font script="Hang" typeface="맑은 고딕"/>
+        <a:font script="Hans" typeface="等线 Light"/>
+        <a:font script="Hant" typeface="新細明體"/>
+        <a:font script="Arab" typeface="Times New Roman"/>
+        <a:font script="Hebr" typeface="Times New Roman"/>
+        <a:font script="Thai" typeface="Angsana New"/>
+        <a:font script="Ethi" typeface="Nyala"/>
+        <a:font script="Beng" typeface="Vrinda"/>
+        <a:font script="Gujr" typeface="Shruti"/>
+        <a:font script="Khmr" typeface="MoolBoran"/>
+        <a:font script="Knda" typeface="Tunga"/>
+        <a:font script="Guru" typeface="Raavi"/>
+        <a:font script="Cans" typeface="Euphemia"/>
+        <a:font script="Cher" typeface="Plantagenet Cherokee"/>
+        <a:font script="Yiii" typeface="Microsoft Yi Baiti"/>
+        <a:font script="Tibt" typeface="Microsoft Himalaya"/>
+        <a:font script="Thaa" typeface="MV Boli"/>
+        <a:font script="Deva" typeface="Mangal"/>
+        <a:font script="Telu" typeface="Gautami"/>
+        <a:font script="Taml" typeface="Latha"/>
+        <a:font script="Syrc" typeface="Estrangelo Edessa"/>
+        <a:font script="Orya" typeface="Kalinga"/>
+        <a:font script="Mlym" typeface="Kartika"/>
+        <a:font script="Laoo" typeface="DokChampa"/>
+        <a:font script="Sinh" typeface="Iskoola Pota"/>
+        <a:font script="Mong" typeface="Mongolian Baiti"/>
+        <a:font script="Viet" typeface="Times New Roman"/>
+        <a:font script="Uigh" typeface="Microsoft Uighur"/>
+        <a:font script="Geor" typeface="Sylfaen"/>
+        <a:font script="Armn" typeface="Arial"/>
+        <a:font script="Bugi" typeface="Leelawadee UI"/>
+        <a:font script="Bopo" typeface="Microsoft JhengHei"/>
+        <a:font script="Java" typeface="Javanese Text"/>
+        <a:font script="Lisu" typeface="Segoe UI"/>
+        <a:font script="Mymr" typeface="Myanmar Text"/>
+        <a:font script="Nkoo" typeface="Ebrima"/>
+        <a:font script="Olck" typeface="Nirmala UI"/>
+        <a:font script="Osma" typeface="Ebrima"/>
+        <a:font script="Phag" typeface="Phagspa"/>
+        <a:font script="Syrn" typeface="Estrangelo Edessa"/>
+        <a:font script="Syrj" typeface="Estrangelo Edessa"/>
+        <a:font script="Syre" typeface="Estrangelo Edessa"/>
+        <a:font script="Sora" typeface="Nirmala UI"/>
+        <a:font script="Tale" typeface="Microsoft Tai Le"/>
+        <a:font script="Talu" typeface="Microsoft New Tai Lue"/>
+        <a:font script="Tfng" typeface="Ebrima"/>
+      </a:majorFont>
+      <a:minorFont>
+        <a:latin typeface="Calibri" panose="020F0502020204030204"/>
+        <a:ea typeface=""/>
+        <a:cs typeface=""/>
+        <a:font script="Jpan" typeface="游ゴシック"/>
+        <a:font script="Hang" typeface="맑은 고딕"/>
+        <a:font script="Hans" typeface="等线"/>
+        <a:font script="Hant" typeface="新細明體"/>
+        <a:font script="Arab" typeface="Arial"/>
+        <a:font script="Hebr" typeface="Arial"/>
+        <a:font script="Thai" typeface="Cordia New"/>
+        <a:font script="Ethi" typeface="Nyala"/>
+        <a:font script="Beng" typeface="Vrinda"/>
+        <a:font script="Gujr" typeface="Shruti"/>
+        <a:font script="Khmr" typeface="DaunPenh"/>
+        <a:font script="Knda" typeface="Tunga"/>
+        <a:font script="Guru" typeface="Raavi"/>
+        <a:font script="Cans" typeface="Euphemia"/>
+        <a:font script="Cher" typeface="Plantagenet Cherokee"/>
+        <a:font script="Yiii" typeface="Microsoft Yi Baiti"/>
+        <a:font script="Tibt" typeface="Microsoft Himalaya"/>
+        <a:font script="Thaa" typeface="MV Boli"/>
+        <a:font script="Deva" typeface="Mangal"/>
+        <a:font script="Telu" typeface="Gautami"/>
+        <a:font script="Taml" typeface="Latha"/>
+        <a:font script="Syrc" typeface="Estrangelo Edessa"/>
+        <a:font script="Orya" typeface="Kalinga"/>
+        <a:font script="Mlym" typeface="Kartika"/>
+        <a:font script="Laoo" typeface="DokChampa"/>
+        <a:font script="Sinh" typeface="Iskoola Pota"/>
+        <a:font script="Mong" typeface="Mongolian Baiti"/>
+        <a:font script="Viet" typeface="Arial"/>
+        <a:font script="Uigh" typeface="Microsoft Uighur"/>
+        <a:font script="Geor" typeface="Sylfaen"/>
+        <a:font script="Armn" typeface="Arial"/>
+        <a:font script="Bugi" typeface="Leelawadee UI"/>
+        <a:font script="Bopo" typeface="Microsoft JhengHei"/>
+        <a:font script="Java" typeface="Javanese Text"/>
+        <a:font script="Lisu" typeface="Segoe UI"/>
+        <a:font script="Mymr" typeface="Myanmar Text"/>
+        <a:font script="Nkoo" typeface="Ebrima"/>
+        <a:font script="Olck" typeface="Nirmala UI"/>
+        <a:font script="Osma" typeface="Ebrima"/>
+        <a:font script="Phag" typeface="Phagspa"/>
+        <a:font script="Syrn" typeface="Estrangelo Edessa"/>
+        <a:font script="Syrj" typeface="Estrangelo Edessa"/>
+        <a:font script="Syre" typeface="Estrangelo Edessa"/>
+        <a:font script="Sora" typeface="Nirmala UI"/>
+        <a:font script="Tale" typeface="Microsoft Tai Le"/>
+        <a:font script="Talu" typeface="Microsoft New Tai Lue"/>
+        <a:font script="Tfng" typeface="Ebrima"/>
+      </a:minorFont>
+    </a:fontScheme>
+    <a:fmtScheme name="Office">
+      <a:fillStyleLst>
+        <a:solidFill>
+          <a:schemeClr val="phClr"/>
+        </a:solidFill>
+        <a:gradFill rotWithShape="1">
+          <a:gsLst>
+            <a:gs pos="0">
+              <a:schemeClr val="phClr">
+                <a:lumMod val="110000"/>
+                <a:satMod val="105000"/>
+                <a:tint val="67000"/>
+              </a:schemeClr>
+            </a:gs>
+            <a:gs pos="50000">
+              <a:schemeClr val="phClr">
+                <a:lumMod val="105000"/>
+                <a:satMod val="103000"/>
+                <a:tint val="73000"/>
+              </a:schemeClr>
+            </a:gs>
+            <a:gs pos="100000">
+              <a:schemeClr val="phClr">
+                <a:lumMod val="105000"/>
+                <a:satMod val="109000"/>
+                <a:tint val="81000"/>
+              </a:schemeClr>
+            </a:gs>
+          </a:gsLst>
+          <a:lin ang="5400000" scaled="0"/>
+        </a:gradFill>
+        <a:gradFill rotWithShape="1">
+          <a:gsLst>
+            <a:gs pos="0">
+              <a:schemeClr val="phClr">
+                <a:satMod val="103000"/>
+                <a:lumMod val="102000"/>
+                <a:tint val="94000"/>
+              </a:schemeClr>
+            </a:gs>
+            <a:gs pos="50000">
+              <a:schemeClr val="phClr">
+                <a:satMod val="110000"/>
+                <a:lumMod val="100000"/>
+                <a:shade val="100000"/>
+              </a:schemeClr>
+            </a:gs>
+            <a:gs pos="100000">
+              <a:schemeClr val="phClr">
+                <a:lumMod val="99000"/>
+                <a:satMod val="120000"/>
+                <a:shade val="78000"/>
+              </a:schemeClr>
+            </a:gs>
+          </a:gsLst>
+          <a:lin ang="5400000" scaled="0"/>
+        </a:gradFill>
+      </a:fillStyleLst>
+      <a:lnStyleLst>
+        <a:ln w="6350" cap="flat" cmpd="sng" algn="ctr">
+          <a:solidFill>
+            <a:schemeClr val="phClr"/>
+          </a:solidFill>
+          <a:prstDash val="solid"/>
+          <a:miter lim="800000"/>
+        </a:ln>
+        <a:ln w="12700" cap="flat" cmpd="sng" algn="ctr">
+          <a:solidFill>
+            <a:schemeClr val="phClr"/>
+          </a:solidFill>
+          <a:prstDash val="solid"/>
+          <a:miter lim="800000"/>
+        </a:ln>
+        <a:ln w="19050" cap="flat" cmpd="sng" algn="ctr">
+          <a:solidFill>
+            <a:schemeClr val="phClr"/>
+          </a:solidFill>
+          <a:prstDash val="solid"/>
+          <a:miter lim="800000"/>
+        </a:ln>
+      </a:lnStyleLst>
+      <a:effectStyleLst>
+        <a:effectStyle>
+          <a:effectLst/>
+        </a:effectStyle>
+        <a:effectStyle>
+          <a:effectLst/>
+        </a:effectStyle>
+        <a:effectStyle>
+          <a:effectLst>
+            <a:outerShdw blurRad="57150" dist="19050" dir="5400000" algn="ctr" rotWithShape="0">
+              <a:srgbClr val="000000">
+                <a:alpha val="63000"/>
+              </a:srgbClr>
+            </a:outerShdw>
+          </a:effectLst>
+        </a:effectStyle>
+      </a:effectStyleLst>
+      <a:bgFillStyleLst>
+        <a:solidFill>
+          <a:schemeClr val="phClr"/>
+        </a:solidFill>
+        <a:solidFill>
+          <a:schemeClr val="phClr">
+            <a:tint val="95000"/>
+            <a:satMod val="170000"/>
+          </a:schemeClr>
+        </a:solidFill>
+        <a:gradFill rotWithShape="1">
+          <a:gsLst>
+            <a:gs pos="0">
+              <a:schemeClr val="phClr">
+                <a:tint val="93000"/>
+                <a:satMod val="150000"/>
+                <a:shade val="98000"/>
+                <a:lumMod val="102000"/>
+              </a:schemeClr>
+            </a:gs>
+            <a:gs pos="50000">
+              <a:schemeClr val="phClr">
+                <a:tint val="98000"/>
+                <a:satMod val="130000"/>
+                <a:shade val="90000"/>
+                <a:lumMod val="103000"/>
+              </a:schemeClr>
+            </a:gs>
+            <a:gs pos="100000">
+              <a:schemeClr val="phClr">
+                <a:shade val="63000"/>
+                <a:satMod val="120000"/>
+              </a:schemeClr>
+            </a:gs>
+          </a:gsLst>
+          <a:lin ang="5400000" scaled="0"/>
+        </a:gradFill>
+      </a:bgFillStyleLst>
+    </a:fmtScheme>
+  </a:themeElements>
+  <a:objectDefaults/>
+  <a:extraClrSchemeLst/>
+  <a:extLst>
+    <a:ext uri="{05A4C25C-085E-4340-85A3-A5531E510DB2}">
+      <thm15:themeFamily xmlns:thm15="http://schemas.microsoft.com/office/thememl/2012/main" name="Office Theme" id="{62F939B6-93AF-4DB8-9C6B-D6C7DFDC589F}" vid="{4A3C46E8-61CC-4603-A589-7422A47A8E4A}"/>
+    </a:ext>
+  </a:extLst>
+</a:theme>
 </file>
</xml_diff>